<commit_message>
Finalize Python part 1
</commit_message>
<xml_diff>
--- a/python_course/1_basics_classes/python_cursus_1.pptx
+++ b/python_course/1_basics_classes/python_cursus_1.pptx
@@ -5,7 +5,7 @@
     <p:sldMasterId id="2147483648" r:id="rId1"/>
   </p:sldMasterIdLst>
   <p:notesMasterIdLst>
-    <p:notesMasterId r:id="rId69"/>
+    <p:notesMasterId r:id="rId70"/>
   </p:notesMasterIdLst>
   <p:sldIdLst>
     <p:sldId id="256" r:id="rId2"/>
@@ -62,19 +62,20 @@
     <p:sldId id="313" r:id="rId53"/>
     <p:sldId id="333" r:id="rId54"/>
     <p:sldId id="323" r:id="rId55"/>
-    <p:sldId id="331" r:id="rId56"/>
-    <p:sldId id="324" r:id="rId57"/>
-    <p:sldId id="325" r:id="rId58"/>
-    <p:sldId id="332" r:id="rId59"/>
-    <p:sldId id="326" r:id="rId60"/>
-    <p:sldId id="355" r:id="rId61"/>
-    <p:sldId id="353" r:id="rId62"/>
-    <p:sldId id="354" r:id="rId63"/>
-    <p:sldId id="347" r:id="rId64"/>
-    <p:sldId id="336" r:id="rId65"/>
-    <p:sldId id="348" r:id="rId66"/>
-    <p:sldId id="334" r:id="rId67"/>
-    <p:sldId id="335" r:id="rId68"/>
+    <p:sldId id="356" r:id="rId56"/>
+    <p:sldId id="331" r:id="rId57"/>
+    <p:sldId id="324" r:id="rId58"/>
+    <p:sldId id="325" r:id="rId59"/>
+    <p:sldId id="332" r:id="rId60"/>
+    <p:sldId id="326" r:id="rId61"/>
+    <p:sldId id="355" r:id="rId62"/>
+    <p:sldId id="353" r:id="rId63"/>
+    <p:sldId id="354" r:id="rId64"/>
+    <p:sldId id="347" r:id="rId65"/>
+    <p:sldId id="336" r:id="rId66"/>
+    <p:sldId id="348" r:id="rId67"/>
+    <p:sldId id="334" r:id="rId68"/>
+    <p:sldId id="335" r:id="rId69"/>
   </p:sldIdLst>
   <p:sldSz cx="12192000" cy="6858000"/>
   <p:notesSz cx="6858000" cy="9144000"/>
@@ -263,7 +264,7 @@
           <a:p>
             <a:fld id="{3BADDCAA-88FC-44D4-A91A-DD0530AB88E0}" type="datetimeFigureOut">
               <a:rPr lang="en-NL" smtClean="0"/>
-              <a:t>27/08/2024</a:t>
+              <a:t>11/09/2024</a:t>
             </a:fld>
             <a:endParaRPr lang="en-NL"/>
           </a:p>
@@ -764,7 +765,7 @@
           <a:p>
             <a:fld id="{0EBB069A-003F-4FC0-8534-236B0C5C7B5F}" type="datetimeFigureOut">
               <a:rPr lang="en-NL" smtClean="0"/>
-              <a:t>27/08/2024</a:t>
+              <a:t>11/09/2024</a:t>
             </a:fld>
             <a:endParaRPr lang="en-NL"/>
           </a:p>
@@ -964,7 +965,7 @@
           <a:p>
             <a:fld id="{0EBB069A-003F-4FC0-8534-236B0C5C7B5F}" type="datetimeFigureOut">
               <a:rPr lang="en-NL" smtClean="0"/>
-              <a:t>27/08/2024</a:t>
+              <a:t>11/09/2024</a:t>
             </a:fld>
             <a:endParaRPr lang="en-NL"/>
           </a:p>
@@ -1174,7 +1175,7 @@
           <a:p>
             <a:fld id="{0EBB069A-003F-4FC0-8534-236B0C5C7B5F}" type="datetimeFigureOut">
               <a:rPr lang="en-NL" smtClean="0"/>
-              <a:t>27/08/2024</a:t>
+              <a:t>11/09/2024</a:t>
             </a:fld>
             <a:endParaRPr lang="en-NL"/>
           </a:p>
@@ -1374,7 +1375,7 @@
           <a:p>
             <a:fld id="{0EBB069A-003F-4FC0-8534-236B0C5C7B5F}" type="datetimeFigureOut">
               <a:rPr lang="en-NL" smtClean="0"/>
-              <a:t>27/08/2024</a:t>
+              <a:t>11/09/2024</a:t>
             </a:fld>
             <a:endParaRPr lang="en-NL"/>
           </a:p>
@@ -1650,7 +1651,7 @@
           <a:p>
             <a:fld id="{0EBB069A-003F-4FC0-8534-236B0C5C7B5F}" type="datetimeFigureOut">
               <a:rPr lang="en-NL" smtClean="0"/>
-              <a:t>27/08/2024</a:t>
+              <a:t>11/09/2024</a:t>
             </a:fld>
             <a:endParaRPr lang="en-NL"/>
           </a:p>
@@ -1918,7 +1919,7 @@
           <a:p>
             <a:fld id="{0EBB069A-003F-4FC0-8534-236B0C5C7B5F}" type="datetimeFigureOut">
               <a:rPr lang="en-NL" smtClean="0"/>
-              <a:t>27/08/2024</a:t>
+              <a:t>11/09/2024</a:t>
             </a:fld>
             <a:endParaRPr lang="en-NL"/>
           </a:p>
@@ -2333,7 +2334,7 @@
           <a:p>
             <a:fld id="{0EBB069A-003F-4FC0-8534-236B0C5C7B5F}" type="datetimeFigureOut">
               <a:rPr lang="en-NL" smtClean="0"/>
-              <a:t>27/08/2024</a:t>
+              <a:t>11/09/2024</a:t>
             </a:fld>
             <a:endParaRPr lang="en-NL"/>
           </a:p>
@@ -2475,7 +2476,7 @@
           <a:p>
             <a:fld id="{0EBB069A-003F-4FC0-8534-236B0C5C7B5F}" type="datetimeFigureOut">
               <a:rPr lang="en-NL" smtClean="0"/>
-              <a:t>27/08/2024</a:t>
+              <a:t>11/09/2024</a:t>
             </a:fld>
             <a:endParaRPr lang="en-NL"/>
           </a:p>
@@ -2588,7 +2589,7 @@
           <a:p>
             <a:fld id="{0EBB069A-003F-4FC0-8534-236B0C5C7B5F}" type="datetimeFigureOut">
               <a:rPr lang="en-NL" smtClean="0"/>
-              <a:t>27/08/2024</a:t>
+              <a:t>11/09/2024</a:t>
             </a:fld>
             <a:endParaRPr lang="en-NL"/>
           </a:p>
@@ -2901,7 +2902,7 @@
           <a:p>
             <a:fld id="{0EBB069A-003F-4FC0-8534-236B0C5C7B5F}" type="datetimeFigureOut">
               <a:rPr lang="en-NL" smtClean="0"/>
-              <a:t>27/08/2024</a:t>
+              <a:t>11/09/2024</a:t>
             </a:fld>
             <a:endParaRPr lang="en-NL"/>
           </a:p>
@@ -3190,7 +3191,7 @@
           <a:p>
             <a:fld id="{0EBB069A-003F-4FC0-8534-236B0C5C7B5F}" type="datetimeFigureOut">
               <a:rPr lang="en-NL" smtClean="0"/>
-              <a:t>27/08/2024</a:t>
+              <a:t>11/09/2024</a:t>
             </a:fld>
             <a:endParaRPr lang="en-NL"/>
           </a:p>
@@ -3433,7 +3434,7 @@
           <a:p>
             <a:fld id="{0EBB069A-003F-4FC0-8534-236B0C5C7B5F}" type="datetimeFigureOut">
               <a:rPr lang="en-NL" smtClean="0"/>
-              <a:t>27/08/2024</a:t>
+              <a:t>11/09/2024</a:t>
             </a:fld>
             <a:endParaRPr lang="en-NL"/>
           </a:p>
@@ -26536,7 +26537,7 @@
             </a:pPr>
             <a:r>
               <a:rPr lang="nl-NL" sz="2000" noProof="0" dirty="0"/>
-              <a:t>Vul </a:t>
+              <a:t>Schrijf </a:t>
             </a:r>
             <a:r>
               <a:rPr lang="nl-NL" sz="2000" noProof="0" dirty="0" err="1">
@@ -26554,7 +26555,7 @@
             </a:r>
             <a:r>
               <a:rPr lang="nl-NL" sz="2000" noProof="0" dirty="0"/>
-              <a:t> in om de CSV data in te lezen.</a:t>
+              <a:t> om de CSV data in te lezen.</a:t>
             </a:r>
           </a:p>
           <a:p>
@@ -26569,7 +26570,7 @@
             </a:pPr>
             <a:r>
               <a:rPr lang="nl-NL" sz="2000" noProof="0" dirty="0"/>
-              <a:t>Vul </a:t>
+              <a:t>Schrijf </a:t>
             </a:r>
             <a:r>
               <a:rPr lang="nl-NL" sz="2000" noProof="0" dirty="0" err="1">
@@ -26587,7 +26588,7 @@
             </a:r>
             <a:r>
               <a:rPr lang="nl-NL" sz="2000" noProof="0" dirty="0"/>
-              <a:t> in om namen te maskeren.</a:t>
+              <a:t> om namen te maskeren.</a:t>
             </a:r>
           </a:p>
           <a:p>
@@ -30796,42 +30797,42 @@
               <a:t>  </a:t>
             </a:r>
             <a:r>
-              <a:rPr lang="nl-NL" sz="1400" b="1" dirty="0" err="1">
+              <a:rPr lang="nl-NL" sz="1400" dirty="0" err="1">
                 <a:latin typeface="Courier New" panose="02070309020205020404" pitchFamily="49" charset="0"/>
                 <a:cs typeface="Courier New" panose="02070309020205020404" pitchFamily="49" charset="0"/>
               </a:rPr>
               <a:t>def</a:t>
             </a:r>
             <a:r>
-              <a:rPr lang="nl-NL" sz="1400" b="1" dirty="0">
+              <a:rPr lang="nl-NL" sz="1400" dirty="0">
                 <a:latin typeface="Courier New" panose="02070309020205020404" pitchFamily="49" charset="0"/>
                 <a:cs typeface="Courier New" panose="02070309020205020404" pitchFamily="49" charset="0"/>
               </a:rPr>
               <a:t> </a:t>
             </a:r>
             <a:r>
-              <a:rPr lang="nl-NL" sz="1400" b="1" dirty="0" err="1">
+              <a:rPr lang="nl-NL" sz="1400" dirty="0" err="1">
                 <a:latin typeface="Courier New" panose="02070309020205020404" pitchFamily="49" charset="0"/>
                 <a:cs typeface="Courier New" panose="02070309020205020404" pitchFamily="49" charset="0"/>
               </a:rPr>
               <a:t>full_name</a:t>
             </a:r>
             <a:r>
-              <a:rPr lang="nl-NL" sz="1400" b="1" dirty="0">
+              <a:rPr lang="nl-NL" sz="1400" dirty="0">
                 <a:latin typeface="Courier New" panose="02070309020205020404" pitchFamily="49" charset="0"/>
                 <a:cs typeface="Courier New" panose="02070309020205020404" pitchFamily="49" charset="0"/>
               </a:rPr>
               <a:t>(</a:t>
             </a:r>
             <a:r>
-              <a:rPr lang="nl-NL" sz="1400" b="1" dirty="0" err="1">
+              <a:rPr lang="nl-NL" sz="1400" dirty="0" err="1">
                 <a:latin typeface="Courier New" panose="02070309020205020404" pitchFamily="49" charset="0"/>
                 <a:cs typeface="Courier New" panose="02070309020205020404" pitchFamily="49" charset="0"/>
               </a:rPr>
               <a:t>self</a:t>
             </a:r>
             <a:r>
-              <a:rPr lang="nl-NL" sz="1400" b="1" dirty="0">
+              <a:rPr lang="nl-NL" sz="1400" dirty="0">
                 <a:latin typeface="Courier New" panose="02070309020205020404" pitchFamily="49" charset="0"/>
                 <a:cs typeface="Courier New" panose="02070309020205020404" pitchFamily="49" charset="0"/>
               </a:rPr>
@@ -31009,49 +31010,49 @@
               <a:buNone/>
             </a:pPr>
             <a:r>
-              <a:rPr lang="nl-NL" sz="1400" b="1" dirty="0">
+              <a:rPr lang="nl-NL" sz="1400" dirty="0">
                 <a:latin typeface="Courier New" panose="02070309020205020404" pitchFamily="49" charset="0"/>
                 <a:cs typeface="Courier New" panose="02070309020205020404" pitchFamily="49" charset="0"/>
               </a:rPr>
               <a:t>  </a:t>
             </a:r>
             <a:r>
-              <a:rPr lang="nl-NL" sz="1400" b="1" dirty="0" err="1">
+              <a:rPr lang="nl-NL" sz="1400" dirty="0" err="1">
                 <a:latin typeface="Courier New" panose="02070309020205020404" pitchFamily="49" charset="0"/>
                 <a:cs typeface="Courier New" panose="02070309020205020404" pitchFamily="49" charset="0"/>
               </a:rPr>
               <a:t>def</a:t>
             </a:r>
             <a:r>
-              <a:rPr lang="nl-NL" sz="1400" b="1" dirty="0">
+              <a:rPr lang="nl-NL" sz="1400" dirty="0">
                 <a:latin typeface="Courier New" panose="02070309020205020404" pitchFamily="49" charset="0"/>
                 <a:cs typeface="Courier New" panose="02070309020205020404" pitchFamily="49" charset="0"/>
               </a:rPr>
               <a:t> </a:t>
             </a:r>
             <a:r>
-              <a:rPr lang="nl-NL" sz="1400" b="1" dirty="0" err="1">
+              <a:rPr lang="nl-NL" sz="1400" dirty="0" err="1">
                 <a:latin typeface="Courier New" panose="02070309020205020404" pitchFamily="49" charset="0"/>
                 <a:cs typeface="Courier New" panose="02070309020205020404" pitchFamily="49" charset="0"/>
               </a:rPr>
               <a:t>greeting</a:t>
             </a:r>
             <a:r>
-              <a:rPr lang="nl-NL" sz="1400" b="1" dirty="0">
+              <a:rPr lang="nl-NL" sz="1400" dirty="0">
                 <a:latin typeface="Courier New" panose="02070309020205020404" pitchFamily="49" charset="0"/>
                 <a:cs typeface="Courier New" panose="02070309020205020404" pitchFamily="49" charset="0"/>
               </a:rPr>
               <a:t>(</a:t>
             </a:r>
             <a:r>
-              <a:rPr lang="nl-NL" sz="1400" b="1" dirty="0" err="1">
+              <a:rPr lang="nl-NL" sz="1400" dirty="0" err="1">
                 <a:latin typeface="Courier New" panose="02070309020205020404" pitchFamily="49" charset="0"/>
                 <a:cs typeface="Courier New" panose="02070309020205020404" pitchFamily="49" charset="0"/>
               </a:rPr>
               <a:t>self</a:t>
             </a:r>
             <a:r>
-              <a:rPr lang="nl-NL" sz="1400" b="1" dirty="0">
+              <a:rPr lang="nl-NL" sz="1400" dirty="0">
                 <a:latin typeface="Courier New" panose="02070309020205020404" pitchFamily="49" charset="0"/>
                 <a:cs typeface="Courier New" panose="02070309020205020404" pitchFamily="49" charset="0"/>
               </a:rPr>
@@ -31299,7 +31300,15 @@
             </a:pPr>
             <a:r>
               <a:rPr lang="nl-NL" sz="2000" noProof="0" dirty="0"/>
-              <a:t>Een class is als een soort blauwdruk.</a:t>
+              <a:t>Een </a:t>
+            </a:r>
+            <a:r>
+              <a:rPr lang="nl-NL" sz="2000" u="sng" noProof="0" dirty="0"/>
+              <a:t>class</a:t>
+            </a:r>
+            <a:r>
+              <a:rPr lang="nl-NL" sz="2000" noProof="0" dirty="0"/>
+              <a:t> is als een soort blauwdruk.</a:t>
             </a:r>
           </a:p>
           <a:p>
@@ -31312,16 +31321,22 @@
             <a:pPr marL="0" indent="0">
               <a:buNone/>
             </a:pPr>
+            <a:endParaRPr lang="nl-NL" sz="2000" dirty="0"/>
+          </a:p>
+          <a:p>
+            <a:pPr marL="0" indent="0">
+              <a:buNone/>
+            </a:pPr>
+            <a:endParaRPr lang="nl-NL" sz="2000" dirty="0"/>
+          </a:p>
+          <a:p>
+            <a:pPr marL="0" indent="0">
+              <a:buNone/>
+            </a:pPr>
             <a:r>
               <a:rPr lang="nl-NL" sz="2000" dirty="0"/>
-              <a:t>Door een class te initialiseren maak je een instantie aan.</a:t>
-            </a:r>
-          </a:p>
-          <a:p>
-            <a:pPr marL="0" indent="0">
-              <a:buNone/>
-            </a:pPr>
-            <a:endParaRPr lang="nl-NL" sz="2000" dirty="0"/>
+              <a:t>Initialiseren: class aanroepen vgl. functie.</a:t>
+            </a:r>
           </a:p>
           <a:p>
             <a:pPr marL="0" indent="0">
@@ -31329,22 +31344,24 @@
             </a:pPr>
             <a:r>
               <a:rPr lang="nl-NL" sz="2000" dirty="0"/>
-              <a:t>Initialiseren: class aanroepen (</a:t>
+              <a:t>Maakt uniek </a:t>
+            </a:r>
+            <a:r>
+              <a:rPr lang="nl-NL" sz="2000" u="sng" dirty="0"/>
+              <a:t>object</a:t>
+            </a:r>
+            <a:r>
+              <a:rPr lang="nl-NL" sz="2000" dirty="0"/>
+              <a:t> aan (</a:t>
             </a:r>
             <a:r>
               <a:rPr lang="nl-NL" sz="2000" dirty="0" err="1"/>
-              <a:t>vgl</a:t>
+              <a:t>instance</a:t>
             </a:r>
             <a:r>
               <a:rPr lang="nl-NL" sz="2000" dirty="0"/>
-              <a:t> functie).</a:t>
-            </a:r>
-          </a:p>
-          <a:p>
-            <a:pPr marL="0" indent="0">
-              <a:buNone/>
-            </a:pPr>
-            <a:endParaRPr lang="nl-NL" sz="2000" dirty="0"/>
+              <a:t>).</a:t>
+            </a:r>
           </a:p>
           <a:p>
             <a:pPr marL="0" indent="0">
@@ -31356,24 +31373,15 @@
             <a:pPr marL="0" indent="0">
               <a:buNone/>
             </a:pPr>
+            <a:endParaRPr lang="nl-NL" sz="2000" noProof="0" dirty="0"/>
+          </a:p>
+          <a:p>
+            <a:pPr marL="0" indent="0">
+              <a:buNone/>
+            </a:pPr>
             <a:r>
               <a:rPr lang="nl-NL" sz="2000" noProof="0" dirty="0"/>
-              <a:t>Dit levert een nieuw object op…</a:t>
-            </a:r>
-          </a:p>
-          <a:p>
-            <a:pPr marL="0" indent="0">
-              <a:buNone/>
-            </a:pPr>
-            <a:endParaRPr lang="nl-NL" sz="2000" noProof="0" dirty="0"/>
-          </a:p>
-          <a:p>
-            <a:pPr marL="0" indent="0">
-              <a:buNone/>
-            </a:pPr>
-            <a:r>
-              <a:rPr lang="nl-NL" sz="2000" noProof="0" dirty="0"/>
-              <a:t>Maar ze hebben wel dezelfde attributen.</a:t>
+              <a:t>Maar… hebben nu  dezelfde attributen.</a:t>
             </a:r>
           </a:p>
         </p:txBody>
@@ -32000,7 +32008,7 @@
                 <a:latin typeface="Courier New" panose="02070309020205020404" pitchFamily="49" charset="0"/>
                 <a:cs typeface="Courier New" panose="02070309020205020404" pitchFamily="49" charset="0"/>
               </a:rPr>
-              <a:t># Same attribute values...</a:t>
+              <a:t># But: same attribute values.</a:t>
             </a:r>
           </a:p>
           <a:p>
@@ -32132,14 +32140,6 @@
               <a:rPr lang="nl-NL" sz="3600" noProof="0" dirty="0" err="1"/>
               <a:t>methods</a:t>
             </a:r>
-            <a:r>
-              <a:rPr lang="nl-NL" sz="3600" noProof="0" dirty="0"/>
-              <a:t>: De </a:t>
-            </a:r>
-            <a:r>
-              <a:rPr lang="nl-NL" sz="3600" noProof="0" dirty="0" err="1"/>
-              <a:t>constructor</a:t>
-            </a:r>
             <a:endParaRPr lang="nl-NL" sz="3600" noProof="0" dirty="0"/>
           </a:p>
         </p:txBody>
@@ -32250,6 +32250,59 @@
             <a:r>
               <a:rPr lang="nl-NL" sz="2000" noProof="0" dirty="0"/>
               <a:t> een object met waardes.</a:t>
+            </a:r>
+          </a:p>
+          <a:p>
+            <a:pPr marL="0" indent="0">
+              <a:buNone/>
+            </a:pPr>
+            <a:endParaRPr lang="nl-NL" sz="2000" dirty="0"/>
+          </a:p>
+          <a:p>
+            <a:pPr marL="0" indent="0">
+              <a:buNone/>
+            </a:pPr>
+            <a:r>
+              <a:rPr lang="nl-NL" sz="2000" b="1" noProof="0" dirty="0">
+                <a:latin typeface="Courier New" panose="02070309020205020404" pitchFamily="49" charset="0"/>
+                <a:cs typeface="Courier New" panose="02070309020205020404" pitchFamily="49" charset="0"/>
+              </a:rPr>
+              <a:t>__</a:t>
+            </a:r>
+            <a:r>
+              <a:rPr lang="nl-NL" sz="2000" b="1" noProof="0" dirty="0" err="1">
+                <a:latin typeface="Courier New" panose="02070309020205020404" pitchFamily="49" charset="0"/>
+                <a:cs typeface="Courier New" panose="02070309020205020404" pitchFamily="49" charset="0"/>
+              </a:rPr>
+              <a:t>str</a:t>
+            </a:r>
+            <a:r>
+              <a:rPr lang="nl-NL" sz="2000" b="1" noProof="0" dirty="0">
+                <a:latin typeface="Courier New" panose="02070309020205020404" pitchFamily="49" charset="0"/>
+                <a:cs typeface="Courier New" panose="02070309020205020404" pitchFamily="49" charset="0"/>
+              </a:rPr>
+              <a:t>__</a:t>
+            </a:r>
+            <a:endParaRPr lang="nl-NL" sz="2000" b="1" noProof="0" dirty="0"/>
+          </a:p>
+          <a:p>
+            <a:pPr marL="0" indent="0">
+              <a:buNone/>
+            </a:pPr>
+            <a:r>
+              <a:rPr lang="nl-NL" sz="2000" dirty="0"/>
+              <a:t>Weergave als string, bv. met </a:t>
+            </a:r>
+            <a:r>
+              <a:rPr lang="nl-NL" sz="2000" dirty="0">
+                <a:latin typeface="Courier New" panose="02070309020205020404" pitchFamily="49" charset="0"/>
+                <a:cs typeface="Courier New" panose="02070309020205020404" pitchFamily="49" charset="0"/>
+              </a:rPr>
+              <a:t>print()</a:t>
+            </a:r>
+            <a:r>
+              <a:rPr lang="nl-NL" sz="2000" dirty="0"/>
+              <a:t>.</a:t>
             </a:r>
           </a:p>
           <a:p>
@@ -32502,14 +32555,14 @@
                 <a:latin typeface="Courier New" panose="02070309020205020404" pitchFamily="49" charset="0"/>
                 <a:cs typeface="Courier New" panose="02070309020205020404" pitchFamily="49" charset="0"/>
               </a:rPr>
-              <a:t>  </a:t>
+              <a:t>  def </a:t>
             </a:r>
             <a:r>
               <a:rPr lang="en-US" sz="1400" b="1" dirty="0">
                 <a:latin typeface="Courier New" panose="02070309020205020404" pitchFamily="49" charset="0"/>
                 <a:cs typeface="Courier New" panose="02070309020205020404" pitchFamily="49" charset="0"/>
               </a:rPr>
-              <a:t>def __</a:t>
+              <a:t>__</a:t>
             </a:r>
             <a:r>
               <a:rPr lang="en-US" sz="1400" b="1" dirty="0" err="1">
@@ -32523,17 +32576,24 @@
                 <a:latin typeface="Courier New" panose="02070309020205020404" pitchFamily="49" charset="0"/>
                 <a:cs typeface="Courier New" panose="02070309020205020404" pitchFamily="49" charset="0"/>
               </a:rPr>
-              <a:t>__(self, name, </a:t>
-            </a:r>
-            <a:r>
-              <a:rPr lang="en-US" sz="1400" b="1" dirty="0" err="1">
+              <a:t>__</a:t>
+            </a:r>
+            <a:r>
+              <a:rPr lang="en-US" sz="1400" dirty="0">
+                <a:latin typeface="Courier New" panose="02070309020205020404" pitchFamily="49" charset="0"/>
+                <a:cs typeface="Courier New" panose="02070309020205020404" pitchFamily="49" charset="0"/>
+              </a:rPr>
+              <a:t>(self, name, </a:t>
+            </a:r>
+            <a:r>
+              <a:rPr lang="en-US" sz="1400" dirty="0" err="1">
                 <a:latin typeface="Courier New" panose="02070309020205020404" pitchFamily="49" charset="0"/>
                 <a:cs typeface="Courier New" panose="02070309020205020404" pitchFamily="49" charset="0"/>
               </a:rPr>
               <a:t>lastname</a:t>
             </a:r>
             <a:r>
-              <a:rPr lang="en-US" sz="1400" b="1" dirty="0">
+              <a:rPr lang="en-US" sz="1400" dirty="0">
                 <a:latin typeface="Courier New" panose="02070309020205020404" pitchFamily="49" charset="0"/>
                 <a:cs typeface="Courier New" panose="02070309020205020404" pitchFamily="49" charset="0"/>
               </a:rPr>
@@ -32551,6 +32611,77 @@
               <a:buFont typeface="Arial" panose="020B0604020202020204" pitchFamily="34" charset="0"/>
               <a:buNone/>
             </a:pPr>
+            <a:r>
+              <a:rPr lang="en-US" sz="1400" dirty="0">
+                <a:solidFill>
+                  <a:schemeClr val="accent2">
+                    <a:lumMod val="75000"/>
+                  </a:schemeClr>
+                </a:solidFill>
+                <a:latin typeface="Courier New" panose="02070309020205020404" pitchFamily="49" charset="0"/>
+                <a:cs typeface="Courier New" panose="02070309020205020404" pitchFamily="49" charset="0"/>
+              </a:rPr>
+              <a:t>    """Store values in the object."""</a:t>
+            </a:r>
+          </a:p>
+          <a:p>
+            <a:pPr marL="0" indent="0">
+              <a:lnSpc>
+                <a:spcPct val="100000"/>
+              </a:lnSpc>
+              <a:spcBef>
+                <a:spcPts val="0"/>
+              </a:spcBef>
+              <a:buFont typeface="Arial" panose="020B0604020202020204" pitchFamily="34" charset="0"/>
+              <a:buNone/>
+            </a:pPr>
+            <a:r>
+              <a:rPr lang="en-US" sz="1400" dirty="0">
+                <a:latin typeface="Courier New" panose="02070309020205020404" pitchFamily="49" charset="0"/>
+                <a:cs typeface="Courier New" panose="02070309020205020404" pitchFamily="49" charset="0"/>
+              </a:rPr>
+              <a:t>    self.name = name</a:t>
+            </a:r>
+          </a:p>
+          <a:p>
+            <a:pPr marL="0" indent="0">
+              <a:lnSpc>
+                <a:spcPct val="100000"/>
+              </a:lnSpc>
+              <a:spcBef>
+                <a:spcPts val="0"/>
+              </a:spcBef>
+              <a:buFont typeface="Arial" panose="020B0604020202020204" pitchFamily="34" charset="0"/>
+              <a:buNone/>
+            </a:pPr>
+            <a:r>
+              <a:rPr lang="en-US" sz="1400" dirty="0">
+                <a:latin typeface="Courier New" panose="02070309020205020404" pitchFamily="49" charset="0"/>
+                <a:cs typeface="Courier New" panose="02070309020205020404" pitchFamily="49" charset="0"/>
+              </a:rPr>
+              <a:t>    </a:t>
+            </a:r>
+            <a:r>
+              <a:rPr lang="en-US" sz="1400" dirty="0" err="1">
+                <a:latin typeface="Courier New" panose="02070309020205020404" pitchFamily="49" charset="0"/>
+                <a:cs typeface="Courier New" panose="02070309020205020404" pitchFamily="49" charset="0"/>
+              </a:rPr>
+              <a:t>self.lastname</a:t>
+            </a:r>
+            <a:r>
+              <a:rPr lang="en-US" sz="1400" dirty="0">
+                <a:latin typeface="Courier New" panose="02070309020205020404" pitchFamily="49" charset="0"/>
+                <a:cs typeface="Courier New" panose="02070309020205020404" pitchFamily="49" charset="0"/>
+              </a:rPr>
+              <a:t> = </a:t>
+            </a:r>
+            <a:r>
+              <a:rPr lang="en-US" sz="1400" dirty="0" err="1">
+                <a:latin typeface="Courier New" panose="02070309020205020404" pitchFamily="49" charset="0"/>
+                <a:cs typeface="Courier New" panose="02070309020205020404" pitchFamily="49" charset="0"/>
+              </a:rPr>
+              <a:t>lastname</a:t>
+            </a:r>
             <a:endParaRPr lang="en-US" sz="1400" dirty="0">
               <a:latin typeface="Courier New" panose="02070309020205020404" pitchFamily="49" charset="0"/>
               <a:cs typeface="Courier New" panose="02070309020205020404" pitchFamily="49" charset="0"/>
@@ -32567,100 +32698,6 @@
               <a:buFont typeface="Arial" panose="020B0604020202020204" pitchFamily="34" charset="0"/>
               <a:buNone/>
             </a:pPr>
-            <a:r>
-              <a:rPr lang="en-US" sz="1400" dirty="0">
-                <a:latin typeface="Courier New" panose="02070309020205020404" pitchFamily="49" charset="0"/>
-                <a:cs typeface="Courier New" panose="02070309020205020404" pitchFamily="49" charset="0"/>
-              </a:rPr>
-              <a:t>    </a:t>
-            </a:r>
-            <a:r>
-              <a:rPr lang="en-US" sz="1400" dirty="0">
-                <a:solidFill>
-                  <a:schemeClr val="accent6">
-                    <a:lumMod val="75000"/>
-                  </a:schemeClr>
-                </a:solidFill>
-                <a:latin typeface="Courier New" panose="02070309020205020404" pitchFamily="49" charset="0"/>
-                <a:cs typeface="Courier New" panose="02070309020205020404" pitchFamily="49" charset="0"/>
-              </a:rPr>
-              <a:t># Store values inside the object.</a:t>
-            </a:r>
-          </a:p>
-          <a:p>
-            <a:pPr marL="0" indent="0">
-              <a:lnSpc>
-                <a:spcPct val="100000"/>
-              </a:lnSpc>
-              <a:spcBef>
-                <a:spcPts val="0"/>
-              </a:spcBef>
-              <a:buFont typeface="Arial" panose="020B0604020202020204" pitchFamily="34" charset="0"/>
-              <a:buNone/>
-            </a:pPr>
-            <a:r>
-              <a:rPr lang="en-US" sz="1400" dirty="0">
-                <a:latin typeface="Courier New" panose="02070309020205020404" pitchFamily="49" charset="0"/>
-                <a:cs typeface="Courier New" panose="02070309020205020404" pitchFamily="49" charset="0"/>
-              </a:rPr>
-              <a:t>    self.name = name</a:t>
-            </a:r>
-          </a:p>
-          <a:p>
-            <a:pPr marL="0" indent="0">
-              <a:lnSpc>
-                <a:spcPct val="100000"/>
-              </a:lnSpc>
-              <a:spcBef>
-                <a:spcPts val="0"/>
-              </a:spcBef>
-              <a:buFont typeface="Arial" panose="020B0604020202020204" pitchFamily="34" charset="0"/>
-              <a:buNone/>
-            </a:pPr>
-            <a:r>
-              <a:rPr lang="en-US" sz="1400" dirty="0">
-                <a:latin typeface="Courier New" panose="02070309020205020404" pitchFamily="49" charset="0"/>
-                <a:cs typeface="Courier New" panose="02070309020205020404" pitchFamily="49" charset="0"/>
-              </a:rPr>
-              <a:t>    </a:t>
-            </a:r>
-            <a:r>
-              <a:rPr lang="en-US" sz="1400" dirty="0" err="1">
-                <a:latin typeface="Courier New" panose="02070309020205020404" pitchFamily="49" charset="0"/>
-                <a:cs typeface="Courier New" panose="02070309020205020404" pitchFamily="49" charset="0"/>
-              </a:rPr>
-              <a:t>self.lastname</a:t>
-            </a:r>
-            <a:r>
-              <a:rPr lang="en-US" sz="1400" dirty="0">
-                <a:latin typeface="Courier New" panose="02070309020205020404" pitchFamily="49" charset="0"/>
-                <a:cs typeface="Courier New" panose="02070309020205020404" pitchFamily="49" charset="0"/>
-              </a:rPr>
-              <a:t> = </a:t>
-            </a:r>
-            <a:r>
-              <a:rPr lang="en-US" sz="1400" dirty="0" err="1">
-                <a:latin typeface="Courier New" panose="02070309020205020404" pitchFamily="49" charset="0"/>
-                <a:cs typeface="Courier New" panose="02070309020205020404" pitchFamily="49" charset="0"/>
-              </a:rPr>
-              <a:t>lastname</a:t>
-            </a:r>
-            <a:endParaRPr lang="en-US" sz="1400" dirty="0">
-              <a:latin typeface="Courier New" panose="02070309020205020404" pitchFamily="49" charset="0"/>
-              <a:cs typeface="Courier New" panose="02070309020205020404" pitchFamily="49" charset="0"/>
-            </a:endParaRPr>
-          </a:p>
-          <a:p>
-            <a:pPr marL="0" indent="0">
-              <a:lnSpc>
-                <a:spcPct val="100000"/>
-              </a:lnSpc>
-              <a:spcBef>
-                <a:spcPts val="0"/>
-              </a:spcBef>
-              <a:buFont typeface="Arial" panose="020B0604020202020204" pitchFamily="34" charset="0"/>
-              <a:buNone/>
-            </a:pPr>
             <a:endParaRPr lang="en-US" sz="1400" b="1" dirty="0">
               <a:latin typeface="Courier New" panose="02070309020205020404" pitchFamily="49" charset="0"/>
               <a:cs typeface="Courier New" panose="02070309020205020404" pitchFamily="49" charset="0"/>
@@ -32677,10 +32714,168 @@
               <a:buFont typeface="Arial" panose="020B0604020202020204" pitchFamily="34" charset="0"/>
               <a:buNone/>
             </a:pPr>
-            <a:endParaRPr lang="en-US" sz="1400" dirty="0">
-              <a:latin typeface="Courier New" panose="02070309020205020404" pitchFamily="49" charset="0"/>
-              <a:cs typeface="Courier New" panose="02070309020205020404" pitchFamily="49" charset="0"/>
-            </a:endParaRPr>
+            <a:r>
+              <a:rPr lang="en-US" sz="1400" dirty="0">
+                <a:latin typeface="Courier New" panose="02070309020205020404" pitchFamily="49" charset="0"/>
+                <a:cs typeface="Courier New" panose="02070309020205020404" pitchFamily="49" charset="0"/>
+              </a:rPr>
+              <a:t>  def </a:t>
+            </a:r>
+            <a:r>
+              <a:rPr lang="en-US" sz="1400" b="1" dirty="0">
+                <a:latin typeface="Courier New" panose="02070309020205020404" pitchFamily="49" charset="0"/>
+                <a:cs typeface="Courier New" panose="02070309020205020404" pitchFamily="49" charset="0"/>
+              </a:rPr>
+              <a:t>__str__</a:t>
+            </a:r>
+            <a:r>
+              <a:rPr lang="en-US" sz="1400" dirty="0">
+                <a:latin typeface="Courier New" panose="02070309020205020404" pitchFamily="49" charset="0"/>
+                <a:cs typeface="Courier New" panose="02070309020205020404" pitchFamily="49" charset="0"/>
+              </a:rPr>
+              <a:t>(self):</a:t>
+            </a:r>
+          </a:p>
+          <a:p>
+            <a:pPr marL="0" indent="0">
+              <a:lnSpc>
+                <a:spcPct val="100000"/>
+              </a:lnSpc>
+              <a:spcBef>
+                <a:spcPts val="0"/>
+              </a:spcBef>
+              <a:buFont typeface="Arial" panose="020B0604020202020204" pitchFamily="34" charset="0"/>
+              <a:buNone/>
+            </a:pPr>
+            <a:r>
+              <a:rPr lang="en-US" sz="1400" dirty="0">
+                <a:solidFill>
+                  <a:schemeClr val="accent2">
+                    <a:lumMod val="75000"/>
+                  </a:schemeClr>
+                </a:solidFill>
+                <a:latin typeface="Courier New" panose="02070309020205020404" pitchFamily="49" charset="0"/>
+                <a:cs typeface="Courier New" panose="02070309020205020404" pitchFamily="49" charset="0"/>
+              </a:rPr>
+              <a:t>    """Return the full name."""</a:t>
+            </a:r>
+          </a:p>
+          <a:p>
+            <a:pPr marL="0" indent="0">
+              <a:lnSpc>
+                <a:spcPct val="100000"/>
+              </a:lnSpc>
+              <a:spcBef>
+                <a:spcPts val="0"/>
+              </a:spcBef>
+              <a:buFont typeface="Arial" panose="020B0604020202020204" pitchFamily="34" charset="0"/>
+              <a:buNone/>
+            </a:pPr>
+            <a:r>
+              <a:rPr lang="en-US" sz="1400" dirty="0">
+                <a:latin typeface="Courier New" panose="02070309020205020404" pitchFamily="49" charset="0"/>
+                <a:cs typeface="Courier New" panose="02070309020205020404" pitchFamily="49" charset="0"/>
+              </a:rPr>
+              <a:t>    return </a:t>
+            </a:r>
+            <a:r>
+              <a:rPr lang="en-US" sz="1400" dirty="0">
+                <a:solidFill>
+                  <a:schemeClr val="accent1">
+                    <a:lumMod val="75000"/>
+                  </a:schemeClr>
+                </a:solidFill>
+                <a:latin typeface="Courier New" panose="02070309020205020404" pitchFamily="49" charset="0"/>
+                <a:cs typeface="Courier New" panose="02070309020205020404" pitchFamily="49" charset="0"/>
+              </a:rPr>
+              <a:t>f</a:t>
+            </a:r>
+            <a:r>
+              <a:rPr lang="en-US" sz="1400" dirty="0">
+                <a:solidFill>
+                  <a:schemeClr val="accent2">
+                    <a:lumMod val="75000"/>
+                  </a:schemeClr>
+                </a:solidFill>
+                <a:latin typeface="Courier New" panose="02070309020205020404" pitchFamily="49" charset="0"/>
+                <a:cs typeface="Courier New" panose="02070309020205020404" pitchFamily="49" charset="0"/>
+              </a:rPr>
+              <a:t>"</a:t>
+            </a:r>
+            <a:r>
+              <a:rPr lang="en-US" sz="1400" dirty="0">
+                <a:latin typeface="Courier New" panose="02070309020205020404" pitchFamily="49" charset="0"/>
+                <a:cs typeface="Courier New" panose="02070309020205020404" pitchFamily="49" charset="0"/>
+              </a:rPr>
+              <a:t>{</a:t>
+            </a:r>
+            <a:r>
+              <a:rPr lang="en-US" sz="1400" dirty="0">
+                <a:solidFill>
+                  <a:schemeClr val="accent1">
+                    <a:lumMod val="75000"/>
+                  </a:schemeClr>
+                </a:solidFill>
+                <a:latin typeface="Courier New" panose="02070309020205020404" pitchFamily="49" charset="0"/>
+                <a:cs typeface="Courier New" panose="02070309020205020404" pitchFamily="49" charset="0"/>
+              </a:rPr>
+              <a:t>self.name}</a:t>
+            </a:r>
+            <a:r>
+              <a:rPr lang="en-US" sz="1400" dirty="0">
+                <a:latin typeface="Courier New" panose="02070309020205020404" pitchFamily="49" charset="0"/>
+                <a:cs typeface="Courier New" panose="02070309020205020404" pitchFamily="49" charset="0"/>
+              </a:rPr>
+              <a:t> </a:t>
+            </a:r>
+            <a:r>
+              <a:rPr lang="en-US" sz="1400" dirty="0">
+                <a:solidFill>
+                  <a:schemeClr val="accent1">
+                    <a:lumMod val="75000"/>
+                  </a:schemeClr>
+                </a:solidFill>
+                <a:latin typeface="Courier New" panose="02070309020205020404" pitchFamily="49" charset="0"/>
+                <a:cs typeface="Courier New" panose="02070309020205020404" pitchFamily="49" charset="0"/>
+              </a:rPr>
+              <a:t>{</a:t>
+            </a:r>
+            <a:r>
+              <a:rPr lang="en-US" sz="1400" dirty="0" err="1">
+                <a:solidFill>
+                  <a:schemeClr val="accent1">
+                    <a:lumMod val="75000"/>
+                  </a:schemeClr>
+                </a:solidFill>
+                <a:latin typeface="Courier New" panose="02070309020205020404" pitchFamily="49" charset="0"/>
+                <a:cs typeface="Courier New" panose="02070309020205020404" pitchFamily="49" charset="0"/>
+              </a:rPr>
+              <a:t>self.lastname</a:t>
+            </a:r>
+            <a:r>
+              <a:rPr lang="en-US" sz="1400" dirty="0">
+                <a:solidFill>
+                  <a:schemeClr val="accent1">
+                    <a:lumMod val="75000"/>
+                  </a:schemeClr>
+                </a:solidFill>
+                <a:latin typeface="Courier New" panose="02070309020205020404" pitchFamily="49" charset="0"/>
+                <a:cs typeface="Courier New" panose="02070309020205020404" pitchFamily="49" charset="0"/>
+              </a:rPr>
+              <a:t>}</a:t>
+            </a:r>
+            <a:r>
+              <a:rPr lang="en-US" sz="1400" dirty="0">
+                <a:solidFill>
+                  <a:schemeClr val="accent2">
+                    <a:lumMod val="75000"/>
+                  </a:schemeClr>
+                </a:solidFill>
+                <a:latin typeface="Courier New" panose="02070309020205020404" pitchFamily="49" charset="0"/>
+                <a:cs typeface="Courier New" panose="02070309020205020404" pitchFamily="49" charset="0"/>
+              </a:rPr>
+              <a:t>"</a:t>
+            </a:r>
           </a:p>
           <a:p>
             <a:pPr marL="0" indent="0">
@@ -32766,7 +32961,31 @@
                 <a:latin typeface="Courier New" panose="02070309020205020404" pitchFamily="49" charset="0"/>
                 <a:cs typeface="Courier New" panose="02070309020205020404" pitchFamily="49" charset="0"/>
               </a:rPr>
-              <a:t># Initialize two persons</a:t>
+              <a:t># Initialize person, calls __</a:t>
+            </a:r>
+            <a:r>
+              <a:rPr lang="en-US" sz="1400" dirty="0" err="1">
+                <a:solidFill>
+                  <a:schemeClr val="accent6">
+                    <a:lumMod val="75000"/>
+                  </a:schemeClr>
+                </a:solidFill>
+                <a:latin typeface="Courier New" panose="02070309020205020404" pitchFamily="49" charset="0"/>
+                <a:cs typeface="Courier New" panose="02070309020205020404" pitchFamily="49" charset="0"/>
+              </a:rPr>
+              <a:t>init</a:t>
+            </a:r>
+            <a:r>
+              <a:rPr lang="en-US" sz="1400" dirty="0">
+                <a:solidFill>
+                  <a:schemeClr val="accent6">
+                    <a:lumMod val="75000"/>
+                  </a:schemeClr>
+                </a:solidFill>
+                <a:latin typeface="Courier New" panose="02070309020205020404" pitchFamily="49" charset="0"/>
+                <a:cs typeface="Courier New" panose="02070309020205020404" pitchFamily="49" charset="0"/>
+              </a:rPr>
+              <a:t>__.</a:t>
             </a:r>
           </a:p>
           <a:p>
@@ -32826,36 +33045,75 @@
               </a:spcBef>
               <a:buNone/>
             </a:pPr>
+            <a:endParaRPr lang="en-US" sz="1400" b="1" dirty="0">
+              <a:latin typeface="Courier New" panose="02070309020205020404" pitchFamily="49" charset="0"/>
+              <a:cs typeface="Courier New" panose="02070309020205020404" pitchFamily="49" charset="0"/>
+            </a:endParaRPr>
+          </a:p>
+          <a:p>
+            <a:pPr marL="0" indent="0">
+              <a:lnSpc>
+                <a:spcPct val="100000"/>
+              </a:lnSpc>
+              <a:spcBef>
+                <a:spcPts val="0"/>
+              </a:spcBef>
+              <a:buNone/>
+            </a:pPr>
+            <a:endParaRPr lang="en-US" sz="1400" b="1" dirty="0">
+              <a:latin typeface="Courier New" panose="02070309020205020404" pitchFamily="49" charset="0"/>
+              <a:cs typeface="Courier New" panose="02070309020205020404" pitchFamily="49" charset="0"/>
+            </a:endParaRPr>
+          </a:p>
+          <a:p>
+            <a:pPr marL="0" indent="0">
+              <a:lnSpc>
+                <a:spcPct val="100000"/>
+              </a:lnSpc>
+              <a:spcBef>
+                <a:spcPts val="0"/>
+              </a:spcBef>
+              <a:buNone/>
+            </a:pPr>
+            <a:r>
+              <a:rPr lang="en-US" sz="1400" dirty="0">
+                <a:solidFill>
+                  <a:schemeClr val="accent6">
+                    <a:lumMod val="75000"/>
+                  </a:schemeClr>
+                </a:solidFill>
+                <a:latin typeface="Courier New" panose="02070309020205020404" pitchFamily="49" charset="0"/>
+                <a:cs typeface="Courier New" panose="02070309020205020404" pitchFamily="49" charset="0"/>
+              </a:rPr>
+              <a:t># Print person, calls __str__.</a:t>
+            </a:r>
+          </a:p>
+          <a:p>
+            <a:pPr marL="0" indent="0">
+              <a:lnSpc>
+                <a:spcPct val="100000"/>
+              </a:lnSpc>
+              <a:spcBef>
+                <a:spcPts val="0"/>
+              </a:spcBef>
+              <a:buNone/>
+            </a:pPr>
+            <a:r>
+              <a:rPr lang="en-US" sz="1400" dirty="0">
+                <a:latin typeface="Courier New" panose="02070309020205020404" pitchFamily="49" charset="0"/>
+                <a:cs typeface="Courier New" panose="02070309020205020404" pitchFamily="49" charset="0"/>
+              </a:rPr>
+              <a:t>print(</a:t>
+            </a:r>
             <a:r>
               <a:rPr lang="en-US" sz="1400" dirty="0" err="1">
                 <a:latin typeface="Courier New" panose="02070309020205020404" pitchFamily="49" charset="0"/>
                 <a:cs typeface="Courier New" panose="02070309020205020404" pitchFamily="49" charset="0"/>
               </a:rPr>
-              <a:t>jane_doe</a:t>
+              <a:t>john_doe</a:t>
             </a:r>
             <a:r>
               <a:rPr lang="en-US" sz="1400" dirty="0">
-                <a:latin typeface="Courier New" panose="02070309020205020404" pitchFamily="49" charset="0"/>
-                <a:cs typeface="Courier New" panose="02070309020205020404" pitchFamily="49" charset="0"/>
-              </a:rPr>
-              <a:t> = </a:t>
-            </a:r>
-            <a:r>
-              <a:rPr lang="en-US" sz="1400" b="1" dirty="0">
-                <a:latin typeface="Courier New" panose="02070309020205020404" pitchFamily="49" charset="0"/>
-                <a:cs typeface="Courier New" panose="02070309020205020404" pitchFamily="49" charset="0"/>
-              </a:rPr>
-              <a:t>Person(</a:t>
-            </a:r>
-            <a:r>
-              <a:rPr lang="en-US" sz="1400" dirty="0">
-                <a:latin typeface="Courier New" panose="02070309020205020404" pitchFamily="49" charset="0"/>
-                <a:cs typeface="Courier New" panose="02070309020205020404" pitchFamily="49" charset="0"/>
-              </a:rPr>
-              <a:t>"Jane", "Doe"</a:t>
-            </a:r>
-            <a:r>
-              <a:rPr lang="en-US" sz="1400" b="1" dirty="0">
                 <a:latin typeface="Courier New" panose="02070309020205020404" pitchFamily="49" charset="0"/>
                 <a:cs typeface="Courier New" panose="02070309020205020404" pitchFamily="49" charset="0"/>
               </a:rPr>
@@ -32961,19 +33219,15 @@
           <a:lstStyle/>
           <a:p>
             <a:r>
-              <a:rPr lang="nl-NL" sz="3600" dirty="0"/>
-              <a:t>Meer </a:t>
-            </a:r>
-            <a:r>
-              <a:rPr lang="nl-NL" sz="3600" dirty="0" err="1"/>
-              <a:t>dunder</a:t>
-            </a:r>
-            <a:r>
-              <a:rPr lang="nl-NL" sz="3600" dirty="0"/>
+              <a:rPr lang="nl-NL" sz="3600" noProof="0" dirty="0" err="1"/>
+              <a:t>Dunder</a:t>
+            </a:r>
+            <a:r>
+              <a:rPr lang="nl-NL" sz="3600" noProof="0" dirty="0"/>
               <a:t> </a:t>
             </a:r>
             <a:r>
-              <a:rPr lang="nl-NL" sz="3600" dirty="0" err="1"/>
+              <a:rPr lang="nl-NL" sz="3600" noProof="0" dirty="0" err="1"/>
               <a:t>methods</a:t>
             </a:r>
             <a:endParaRPr lang="nl-NL" sz="3600" noProof="0" dirty="0"/>
@@ -33012,6 +33266,1209 @@
               <a:buNone/>
             </a:pPr>
             <a:r>
+              <a:rPr lang="nl-NL" sz="2000" dirty="0"/>
+              <a:t>Je kunt zelf een object maken waar je doorheen kunt itereren met:</a:t>
+            </a:r>
+            <a:endParaRPr lang="nl-NL" sz="2000" noProof="0" dirty="0"/>
+          </a:p>
+          <a:p>
+            <a:pPr marL="0" indent="0">
+              <a:buNone/>
+            </a:pPr>
+            <a:endParaRPr lang="nl-NL" sz="2000" dirty="0"/>
+          </a:p>
+          <a:p>
+            <a:pPr marL="0" indent="0">
+              <a:buNone/>
+            </a:pPr>
+            <a:r>
+              <a:rPr lang="nl-NL" sz="2000" b="1" noProof="0" dirty="0">
+                <a:latin typeface="Courier New" panose="02070309020205020404" pitchFamily="49" charset="0"/>
+                <a:cs typeface="Courier New" panose="02070309020205020404" pitchFamily="49" charset="0"/>
+              </a:rPr>
+              <a:t>__</a:t>
+            </a:r>
+            <a:r>
+              <a:rPr lang="nl-NL" sz="2000" b="1" noProof="0" dirty="0" err="1">
+                <a:latin typeface="Courier New" panose="02070309020205020404" pitchFamily="49" charset="0"/>
+                <a:cs typeface="Courier New" panose="02070309020205020404" pitchFamily="49" charset="0"/>
+              </a:rPr>
+              <a:t>iter</a:t>
+            </a:r>
+            <a:r>
+              <a:rPr lang="nl-NL" sz="2000" b="1" noProof="0" dirty="0">
+                <a:latin typeface="Courier New" panose="02070309020205020404" pitchFamily="49" charset="0"/>
+                <a:cs typeface="Courier New" panose="02070309020205020404" pitchFamily="49" charset="0"/>
+              </a:rPr>
+              <a:t>__</a:t>
+            </a:r>
+            <a:endParaRPr lang="nl-NL" sz="2000" b="1" noProof="0" dirty="0"/>
+          </a:p>
+          <a:p>
+            <a:pPr marL="0" indent="0">
+              <a:buNone/>
+            </a:pPr>
+            <a:r>
+              <a:rPr lang="nl-NL" sz="2000" noProof="0" dirty="0"/>
+              <a:t>Aangeroepen bij start iteratie.</a:t>
+            </a:r>
+          </a:p>
+          <a:p>
+            <a:pPr marL="0" indent="0">
+              <a:buNone/>
+            </a:pPr>
+            <a:endParaRPr lang="nl-NL" sz="2000" dirty="0"/>
+          </a:p>
+          <a:p>
+            <a:pPr marL="0" indent="0">
+              <a:buNone/>
+            </a:pPr>
+            <a:r>
+              <a:rPr lang="nl-NL" sz="2000" b="1" noProof="0" dirty="0">
+                <a:latin typeface="Courier New" panose="02070309020205020404" pitchFamily="49" charset="0"/>
+                <a:cs typeface="Courier New" panose="02070309020205020404" pitchFamily="49" charset="0"/>
+              </a:rPr>
+              <a:t>__next__</a:t>
+            </a:r>
+            <a:endParaRPr lang="nl-NL" sz="2000" b="1" noProof="0" dirty="0"/>
+          </a:p>
+          <a:p>
+            <a:pPr marL="0" indent="0">
+              <a:buNone/>
+            </a:pPr>
+            <a:r>
+              <a:rPr lang="nl-NL" sz="2000" dirty="0"/>
+              <a:t>Geeft het volgende item terug.</a:t>
+            </a:r>
+          </a:p>
+          <a:p>
+            <a:pPr marL="0" indent="0">
+              <a:buNone/>
+            </a:pPr>
+            <a:endParaRPr lang="nl-NL" sz="2000" dirty="0"/>
+          </a:p>
+          <a:p>
+            <a:pPr marL="0" indent="0">
+              <a:buNone/>
+            </a:pPr>
+            <a:r>
+              <a:rPr lang="nl-NL" sz="2000" b="1" dirty="0" err="1"/>
+              <a:t>StopIteration</a:t>
+            </a:r>
+            <a:endParaRPr lang="nl-NL" sz="2000" dirty="0"/>
+          </a:p>
+          <a:p>
+            <a:pPr marL="0" indent="0">
+              <a:buNone/>
+            </a:pPr>
+            <a:r>
+              <a:rPr lang="nl-NL" sz="2000" dirty="0"/>
+              <a:t>Geeft aan dat elementen op zijn.</a:t>
+            </a:r>
+          </a:p>
+        </p:txBody>
+      </p:sp>
+      <p:sp>
+        <p:nvSpPr>
+          <p:cNvPr id="4" name="Content Placeholder 2">
+            <a:extLst>
+              <a:ext uri="{FF2B5EF4-FFF2-40B4-BE49-F238E27FC236}">
+                <a16:creationId xmlns:a16="http://schemas.microsoft.com/office/drawing/2014/main" id="{98EFE1E9-4D56-5081-678F-F94DE9C3DCC6}"/>
+              </a:ext>
+            </a:extLst>
+          </p:cNvPr>
+          <p:cNvSpPr txBox="1">
+            <a:spLocks/>
+          </p:cNvSpPr>
+          <p:nvPr/>
+        </p:nvSpPr>
+        <p:spPr>
+          <a:xfrm>
+            <a:off x="6095999" y="1456267"/>
+            <a:ext cx="5063067" cy="4720696"/>
+          </a:xfrm>
+          <a:prstGeom prst="rect">
+            <a:avLst/>
+          </a:prstGeom>
+        </p:spPr>
+        <p:txBody>
+          <a:bodyPr vert="horz" lIns="91440" tIns="45720" rIns="91440" bIns="45720" rtlCol="0">
+            <a:normAutofit fontScale="92500" lnSpcReduction="10000"/>
+          </a:bodyPr>
+          <a:lstStyle>
+            <a:lvl1pPr marL="228600" indent="-228600" algn="l" defTabSz="914400" rtl="0" eaLnBrk="1" latinLnBrk="0" hangingPunct="1">
+              <a:lnSpc>
+                <a:spcPct val="90000"/>
+              </a:lnSpc>
+              <a:spcBef>
+                <a:spcPts val="1000"/>
+              </a:spcBef>
+              <a:buFont typeface="Arial" panose="020B0604020202020204" pitchFamily="34" charset="0"/>
+              <a:buChar char="•"/>
+              <a:defRPr sz="2800" kern="1200">
+                <a:solidFill>
+                  <a:schemeClr val="tx1"/>
+                </a:solidFill>
+                <a:latin typeface="+mn-lt"/>
+                <a:ea typeface="+mn-ea"/>
+                <a:cs typeface="+mn-cs"/>
+              </a:defRPr>
+            </a:lvl1pPr>
+            <a:lvl2pPr marL="685800" indent="-228600" algn="l" defTabSz="914400" rtl="0" eaLnBrk="1" latinLnBrk="0" hangingPunct="1">
+              <a:lnSpc>
+                <a:spcPct val="90000"/>
+              </a:lnSpc>
+              <a:spcBef>
+                <a:spcPts val="500"/>
+              </a:spcBef>
+              <a:buFont typeface="Arial" panose="020B0604020202020204" pitchFamily="34" charset="0"/>
+              <a:buChar char="•"/>
+              <a:defRPr sz="2400" kern="1200">
+                <a:solidFill>
+                  <a:schemeClr val="tx1"/>
+                </a:solidFill>
+                <a:latin typeface="+mn-lt"/>
+                <a:ea typeface="+mn-ea"/>
+                <a:cs typeface="+mn-cs"/>
+              </a:defRPr>
+            </a:lvl2pPr>
+            <a:lvl3pPr marL="1143000" indent="-228600" algn="l" defTabSz="914400" rtl="0" eaLnBrk="1" latinLnBrk="0" hangingPunct="1">
+              <a:lnSpc>
+                <a:spcPct val="90000"/>
+              </a:lnSpc>
+              <a:spcBef>
+                <a:spcPts val="500"/>
+              </a:spcBef>
+              <a:buFont typeface="Arial" panose="020B0604020202020204" pitchFamily="34" charset="0"/>
+              <a:buChar char="•"/>
+              <a:defRPr sz="2000" kern="1200">
+                <a:solidFill>
+                  <a:schemeClr val="tx1"/>
+                </a:solidFill>
+                <a:latin typeface="+mn-lt"/>
+                <a:ea typeface="+mn-ea"/>
+                <a:cs typeface="+mn-cs"/>
+              </a:defRPr>
+            </a:lvl3pPr>
+            <a:lvl4pPr marL="1600200" indent="-228600" algn="l" defTabSz="914400" rtl="0" eaLnBrk="1" latinLnBrk="0" hangingPunct="1">
+              <a:lnSpc>
+                <a:spcPct val="90000"/>
+              </a:lnSpc>
+              <a:spcBef>
+                <a:spcPts val="500"/>
+              </a:spcBef>
+              <a:buFont typeface="Arial" panose="020B0604020202020204" pitchFamily="34" charset="0"/>
+              <a:buChar char="•"/>
+              <a:defRPr sz="1800" kern="1200">
+                <a:solidFill>
+                  <a:schemeClr val="tx1"/>
+                </a:solidFill>
+                <a:latin typeface="+mn-lt"/>
+                <a:ea typeface="+mn-ea"/>
+                <a:cs typeface="+mn-cs"/>
+              </a:defRPr>
+            </a:lvl4pPr>
+            <a:lvl5pPr marL="2057400" indent="-228600" algn="l" defTabSz="914400" rtl="0" eaLnBrk="1" latinLnBrk="0" hangingPunct="1">
+              <a:lnSpc>
+                <a:spcPct val="90000"/>
+              </a:lnSpc>
+              <a:spcBef>
+                <a:spcPts val="500"/>
+              </a:spcBef>
+              <a:buFont typeface="Arial" panose="020B0604020202020204" pitchFamily="34" charset="0"/>
+              <a:buChar char="•"/>
+              <a:defRPr sz="1800" kern="1200">
+                <a:solidFill>
+                  <a:schemeClr val="tx1"/>
+                </a:solidFill>
+                <a:latin typeface="+mn-lt"/>
+                <a:ea typeface="+mn-ea"/>
+                <a:cs typeface="+mn-cs"/>
+              </a:defRPr>
+            </a:lvl5pPr>
+            <a:lvl6pPr marL="2514600" indent="-228600" algn="l" defTabSz="914400" rtl="0" eaLnBrk="1" latinLnBrk="0" hangingPunct="1">
+              <a:lnSpc>
+                <a:spcPct val="90000"/>
+              </a:lnSpc>
+              <a:spcBef>
+                <a:spcPts val="500"/>
+              </a:spcBef>
+              <a:buFont typeface="Arial" panose="020B0604020202020204" pitchFamily="34" charset="0"/>
+              <a:buChar char="•"/>
+              <a:defRPr sz="1800" kern="1200">
+                <a:solidFill>
+                  <a:schemeClr val="tx1"/>
+                </a:solidFill>
+                <a:latin typeface="+mn-lt"/>
+                <a:ea typeface="+mn-ea"/>
+                <a:cs typeface="+mn-cs"/>
+              </a:defRPr>
+            </a:lvl6pPr>
+            <a:lvl7pPr marL="2971800" indent="-228600" algn="l" defTabSz="914400" rtl="0" eaLnBrk="1" latinLnBrk="0" hangingPunct="1">
+              <a:lnSpc>
+                <a:spcPct val="90000"/>
+              </a:lnSpc>
+              <a:spcBef>
+                <a:spcPts val="500"/>
+              </a:spcBef>
+              <a:buFont typeface="Arial" panose="020B0604020202020204" pitchFamily="34" charset="0"/>
+              <a:buChar char="•"/>
+              <a:defRPr sz="1800" kern="1200">
+                <a:solidFill>
+                  <a:schemeClr val="tx1"/>
+                </a:solidFill>
+                <a:latin typeface="+mn-lt"/>
+                <a:ea typeface="+mn-ea"/>
+                <a:cs typeface="+mn-cs"/>
+              </a:defRPr>
+            </a:lvl7pPr>
+            <a:lvl8pPr marL="3429000" indent="-228600" algn="l" defTabSz="914400" rtl="0" eaLnBrk="1" latinLnBrk="0" hangingPunct="1">
+              <a:lnSpc>
+                <a:spcPct val="90000"/>
+              </a:lnSpc>
+              <a:spcBef>
+                <a:spcPts val="500"/>
+              </a:spcBef>
+              <a:buFont typeface="Arial" panose="020B0604020202020204" pitchFamily="34" charset="0"/>
+              <a:buChar char="•"/>
+              <a:defRPr sz="1800" kern="1200">
+                <a:solidFill>
+                  <a:schemeClr val="tx1"/>
+                </a:solidFill>
+                <a:latin typeface="+mn-lt"/>
+                <a:ea typeface="+mn-ea"/>
+                <a:cs typeface="+mn-cs"/>
+              </a:defRPr>
+            </a:lvl8pPr>
+            <a:lvl9pPr marL="3886200" indent="-228600" algn="l" defTabSz="914400" rtl="0" eaLnBrk="1" latinLnBrk="0" hangingPunct="1">
+              <a:lnSpc>
+                <a:spcPct val="90000"/>
+              </a:lnSpc>
+              <a:spcBef>
+                <a:spcPts val="500"/>
+              </a:spcBef>
+              <a:buFont typeface="Arial" panose="020B0604020202020204" pitchFamily="34" charset="0"/>
+              <a:buChar char="•"/>
+              <a:defRPr sz="1800" kern="1200">
+                <a:solidFill>
+                  <a:schemeClr val="tx1"/>
+                </a:solidFill>
+                <a:latin typeface="+mn-lt"/>
+                <a:ea typeface="+mn-ea"/>
+                <a:cs typeface="+mn-cs"/>
+              </a:defRPr>
+            </a:lvl9pPr>
+          </a:lstStyle>
+          <a:p>
+            <a:pPr marL="0" indent="0">
+              <a:lnSpc>
+                <a:spcPct val="100000"/>
+              </a:lnSpc>
+              <a:spcBef>
+                <a:spcPts val="0"/>
+              </a:spcBef>
+              <a:buFont typeface="Arial" panose="020B0604020202020204" pitchFamily="34" charset="0"/>
+              <a:buNone/>
+            </a:pPr>
+            <a:r>
+              <a:rPr lang="en-US" sz="1400" b="1" dirty="0">
+                <a:latin typeface="Courier New" panose="02070309020205020404" pitchFamily="49" charset="0"/>
+                <a:cs typeface="Courier New" panose="02070309020205020404" pitchFamily="49" charset="0"/>
+              </a:rPr>
+              <a:t>class </a:t>
+            </a:r>
+            <a:r>
+              <a:rPr lang="en-US" sz="1400" b="1" dirty="0" err="1">
+                <a:latin typeface="Courier New" panose="02070309020205020404" pitchFamily="49" charset="0"/>
+                <a:cs typeface="Courier New" panose="02070309020205020404" pitchFamily="49" charset="0"/>
+              </a:rPr>
+              <a:t>RandomLetters</a:t>
+            </a:r>
+            <a:r>
+              <a:rPr lang="en-US" sz="1400" b="1" dirty="0">
+                <a:latin typeface="Courier New" panose="02070309020205020404" pitchFamily="49" charset="0"/>
+                <a:cs typeface="Courier New" panose="02070309020205020404" pitchFamily="49" charset="0"/>
+              </a:rPr>
+              <a:t>:</a:t>
+            </a:r>
+          </a:p>
+          <a:p>
+            <a:pPr marL="0" indent="0">
+              <a:lnSpc>
+                <a:spcPct val="100000"/>
+              </a:lnSpc>
+              <a:spcBef>
+                <a:spcPts val="0"/>
+              </a:spcBef>
+              <a:buFont typeface="Arial" panose="020B0604020202020204" pitchFamily="34" charset="0"/>
+              <a:buNone/>
+            </a:pPr>
+            <a:endParaRPr lang="en-US" sz="1400" dirty="0">
+              <a:latin typeface="Courier New" panose="02070309020205020404" pitchFamily="49" charset="0"/>
+              <a:cs typeface="Courier New" panose="02070309020205020404" pitchFamily="49" charset="0"/>
+            </a:endParaRPr>
+          </a:p>
+          <a:p>
+            <a:pPr marL="0" indent="0">
+              <a:lnSpc>
+                <a:spcPct val="100000"/>
+              </a:lnSpc>
+              <a:spcBef>
+                <a:spcPts val="0"/>
+              </a:spcBef>
+              <a:buFont typeface="Arial" panose="020B0604020202020204" pitchFamily="34" charset="0"/>
+              <a:buNone/>
+            </a:pPr>
+            <a:r>
+              <a:rPr lang="en-US" sz="1400" dirty="0">
+                <a:latin typeface="Courier New" panose="02070309020205020404" pitchFamily="49" charset="0"/>
+                <a:cs typeface="Courier New" panose="02070309020205020404" pitchFamily="49" charset="0"/>
+              </a:rPr>
+              <a:t>  def </a:t>
+            </a:r>
+            <a:r>
+              <a:rPr lang="en-US" sz="1400" b="1" dirty="0">
+                <a:latin typeface="Courier New" panose="02070309020205020404" pitchFamily="49" charset="0"/>
+                <a:cs typeface="Courier New" panose="02070309020205020404" pitchFamily="49" charset="0"/>
+              </a:rPr>
+              <a:t>__</a:t>
+            </a:r>
+            <a:r>
+              <a:rPr lang="en-US" sz="1400" b="1" dirty="0" err="1">
+                <a:latin typeface="Courier New" panose="02070309020205020404" pitchFamily="49" charset="0"/>
+                <a:cs typeface="Courier New" panose="02070309020205020404" pitchFamily="49" charset="0"/>
+              </a:rPr>
+              <a:t>init</a:t>
+            </a:r>
+            <a:r>
+              <a:rPr lang="en-US" sz="1400" b="1" dirty="0">
+                <a:latin typeface="Courier New" panose="02070309020205020404" pitchFamily="49" charset="0"/>
+                <a:cs typeface="Courier New" panose="02070309020205020404" pitchFamily="49" charset="0"/>
+              </a:rPr>
+              <a:t>__</a:t>
+            </a:r>
+            <a:r>
+              <a:rPr lang="en-US" sz="1400" dirty="0">
+                <a:latin typeface="Courier New" panose="02070309020205020404" pitchFamily="49" charset="0"/>
+                <a:cs typeface="Courier New" panose="02070309020205020404" pitchFamily="49" charset="0"/>
+              </a:rPr>
+              <a:t>(self, n): </a:t>
+            </a:r>
+          </a:p>
+          <a:p>
+            <a:pPr marL="0" indent="0">
+              <a:lnSpc>
+                <a:spcPct val="100000"/>
+              </a:lnSpc>
+              <a:spcBef>
+                <a:spcPts val="0"/>
+              </a:spcBef>
+              <a:buFont typeface="Arial" panose="020B0604020202020204" pitchFamily="34" charset="0"/>
+              <a:buNone/>
+            </a:pPr>
+            <a:r>
+              <a:rPr lang="en-US" sz="1400" dirty="0">
+                <a:latin typeface="Courier New" panose="02070309020205020404" pitchFamily="49" charset="0"/>
+                <a:cs typeface="Courier New" panose="02070309020205020404" pitchFamily="49" charset="0"/>
+              </a:rPr>
+              <a:t>    </a:t>
+            </a:r>
+            <a:r>
+              <a:rPr lang="en-US" sz="1400" dirty="0" err="1">
+                <a:latin typeface="Courier New" panose="02070309020205020404" pitchFamily="49" charset="0"/>
+                <a:cs typeface="Courier New" panose="02070309020205020404" pitchFamily="49" charset="0"/>
+              </a:rPr>
+              <a:t>self.n</a:t>
+            </a:r>
+            <a:r>
+              <a:rPr lang="en-US" sz="1400" dirty="0">
+                <a:latin typeface="Courier New" panose="02070309020205020404" pitchFamily="49" charset="0"/>
+                <a:cs typeface="Courier New" panose="02070309020205020404" pitchFamily="49" charset="0"/>
+              </a:rPr>
+              <a:t> = n</a:t>
+            </a:r>
+          </a:p>
+          <a:p>
+            <a:pPr marL="0" indent="0">
+              <a:lnSpc>
+                <a:spcPct val="100000"/>
+              </a:lnSpc>
+              <a:spcBef>
+                <a:spcPts val="0"/>
+              </a:spcBef>
+              <a:buFont typeface="Arial" panose="020B0604020202020204" pitchFamily="34" charset="0"/>
+              <a:buNone/>
+            </a:pPr>
+            <a:endParaRPr lang="en-US" sz="1400" b="1" dirty="0">
+              <a:latin typeface="Courier New" panose="02070309020205020404" pitchFamily="49" charset="0"/>
+              <a:cs typeface="Courier New" panose="02070309020205020404" pitchFamily="49" charset="0"/>
+            </a:endParaRPr>
+          </a:p>
+          <a:p>
+            <a:pPr marL="0" indent="0">
+              <a:lnSpc>
+                <a:spcPct val="100000"/>
+              </a:lnSpc>
+              <a:spcBef>
+                <a:spcPts val="0"/>
+              </a:spcBef>
+              <a:buFont typeface="Arial" panose="020B0604020202020204" pitchFamily="34" charset="0"/>
+              <a:buNone/>
+            </a:pPr>
+            <a:r>
+              <a:rPr lang="en-US" sz="1400" dirty="0">
+                <a:latin typeface="Courier New" panose="02070309020205020404" pitchFamily="49" charset="0"/>
+                <a:cs typeface="Courier New" panose="02070309020205020404" pitchFamily="49" charset="0"/>
+              </a:rPr>
+              <a:t>  def </a:t>
+            </a:r>
+            <a:r>
+              <a:rPr lang="en-US" sz="1400" b="1" dirty="0">
+                <a:latin typeface="Courier New" panose="02070309020205020404" pitchFamily="49" charset="0"/>
+                <a:cs typeface="Courier New" panose="02070309020205020404" pitchFamily="49" charset="0"/>
+              </a:rPr>
+              <a:t>__</a:t>
+            </a:r>
+            <a:r>
+              <a:rPr lang="en-US" sz="1400" b="1" dirty="0" err="1">
+                <a:latin typeface="Courier New" panose="02070309020205020404" pitchFamily="49" charset="0"/>
+                <a:cs typeface="Courier New" panose="02070309020205020404" pitchFamily="49" charset="0"/>
+              </a:rPr>
+              <a:t>iter</a:t>
+            </a:r>
+            <a:r>
+              <a:rPr lang="en-US" sz="1400" b="1" dirty="0">
+                <a:latin typeface="Courier New" panose="02070309020205020404" pitchFamily="49" charset="0"/>
+                <a:cs typeface="Courier New" panose="02070309020205020404" pitchFamily="49" charset="0"/>
+              </a:rPr>
+              <a:t>__</a:t>
+            </a:r>
+            <a:r>
+              <a:rPr lang="en-US" sz="1400" dirty="0">
+                <a:latin typeface="Courier New" panose="02070309020205020404" pitchFamily="49" charset="0"/>
+                <a:cs typeface="Courier New" panose="02070309020205020404" pitchFamily="49" charset="0"/>
+              </a:rPr>
+              <a:t>(self):</a:t>
+            </a:r>
+          </a:p>
+          <a:p>
+            <a:pPr marL="0" indent="0">
+              <a:lnSpc>
+                <a:spcPct val="100000"/>
+              </a:lnSpc>
+              <a:spcBef>
+                <a:spcPts val="0"/>
+              </a:spcBef>
+              <a:buFont typeface="Arial" panose="020B0604020202020204" pitchFamily="34" charset="0"/>
+              <a:buNone/>
+            </a:pPr>
+            <a:r>
+              <a:rPr lang="en-US" sz="1400" dirty="0">
+                <a:solidFill>
+                  <a:schemeClr val="accent2">
+                    <a:lumMod val="75000"/>
+                  </a:schemeClr>
+                </a:solidFill>
+                <a:latin typeface="Courier New" panose="02070309020205020404" pitchFamily="49" charset="0"/>
+                <a:cs typeface="Courier New" panose="02070309020205020404" pitchFamily="49" charset="0"/>
+              </a:rPr>
+              <a:t>    """Draw random letters."""</a:t>
+            </a:r>
+          </a:p>
+          <a:p>
+            <a:pPr marL="0" indent="0">
+              <a:lnSpc>
+                <a:spcPct val="100000"/>
+              </a:lnSpc>
+              <a:spcBef>
+                <a:spcPts val="0"/>
+              </a:spcBef>
+              <a:buFont typeface="Arial" panose="020B0604020202020204" pitchFamily="34" charset="0"/>
+              <a:buNone/>
+            </a:pPr>
+            <a:r>
+              <a:rPr lang="en-US" sz="1400" dirty="0">
+                <a:latin typeface="Courier New" panose="02070309020205020404" pitchFamily="49" charset="0"/>
+                <a:cs typeface="Courier New" panose="02070309020205020404" pitchFamily="49" charset="0"/>
+              </a:rPr>
+              <a:t>    </a:t>
+            </a:r>
+            <a:r>
+              <a:rPr lang="en-US" sz="1400" dirty="0" err="1">
+                <a:latin typeface="Courier New" panose="02070309020205020404" pitchFamily="49" charset="0"/>
+                <a:cs typeface="Courier New" panose="02070309020205020404" pitchFamily="49" charset="0"/>
+              </a:rPr>
+              <a:t>self.letters</a:t>
+            </a:r>
+            <a:r>
+              <a:rPr lang="en-US" sz="1400" dirty="0">
+                <a:latin typeface="Courier New" panose="02070309020205020404" pitchFamily="49" charset="0"/>
+                <a:cs typeface="Courier New" panose="02070309020205020404" pitchFamily="49" charset="0"/>
+              </a:rPr>
+              <a:t> = </a:t>
+            </a:r>
+            <a:r>
+              <a:rPr lang="en-US" sz="1400" dirty="0" err="1">
+                <a:latin typeface="Courier New" panose="02070309020205020404" pitchFamily="49" charset="0"/>
+                <a:cs typeface="Courier New" panose="02070309020205020404" pitchFamily="49" charset="0"/>
+              </a:rPr>
+              <a:t>random.sample</a:t>
+            </a:r>
+            <a:r>
+              <a:rPr lang="en-US" sz="1400" dirty="0">
+                <a:latin typeface="Courier New" panose="02070309020205020404" pitchFamily="49" charset="0"/>
+                <a:cs typeface="Courier New" panose="02070309020205020404" pitchFamily="49" charset="0"/>
+              </a:rPr>
+              <a:t>(</a:t>
+            </a:r>
+          </a:p>
+          <a:p>
+            <a:pPr marL="0" indent="0">
+              <a:lnSpc>
+                <a:spcPct val="100000"/>
+              </a:lnSpc>
+              <a:spcBef>
+                <a:spcPts val="0"/>
+              </a:spcBef>
+              <a:buFont typeface="Arial" panose="020B0604020202020204" pitchFamily="34" charset="0"/>
+              <a:buNone/>
+            </a:pPr>
+            <a:r>
+              <a:rPr lang="en-US" sz="1400" dirty="0">
+                <a:latin typeface="Courier New" panose="02070309020205020404" pitchFamily="49" charset="0"/>
+                <a:cs typeface="Courier New" panose="02070309020205020404" pitchFamily="49" charset="0"/>
+              </a:rPr>
+              <a:t>      </a:t>
+            </a:r>
+            <a:r>
+              <a:rPr lang="en-US" sz="1400" dirty="0" err="1">
+                <a:latin typeface="Courier New" panose="02070309020205020404" pitchFamily="49" charset="0"/>
+                <a:cs typeface="Courier New" panose="02070309020205020404" pitchFamily="49" charset="0"/>
+              </a:rPr>
+              <a:t>string.ascii_uppercase</a:t>
+            </a:r>
+            <a:r>
+              <a:rPr lang="en-US" sz="1400" dirty="0">
+                <a:latin typeface="Courier New" panose="02070309020205020404" pitchFamily="49" charset="0"/>
+                <a:cs typeface="Courier New" panose="02070309020205020404" pitchFamily="49" charset="0"/>
+              </a:rPr>
+              <a:t>, </a:t>
+            </a:r>
+            <a:r>
+              <a:rPr lang="en-US" sz="1400" dirty="0" err="1">
+                <a:latin typeface="Courier New" panose="02070309020205020404" pitchFamily="49" charset="0"/>
+                <a:cs typeface="Courier New" panose="02070309020205020404" pitchFamily="49" charset="0"/>
+              </a:rPr>
+              <a:t>self.n</a:t>
+            </a:r>
+            <a:endParaRPr lang="en-US" sz="1400" dirty="0">
+              <a:latin typeface="Courier New" panose="02070309020205020404" pitchFamily="49" charset="0"/>
+              <a:cs typeface="Courier New" panose="02070309020205020404" pitchFamily="49" charset="0"/>
+            </a:endParaRPr>
+          </a:p>
+          <a:p>
+            <a:pPr marL="0" indent="0">
+              <a:lnSpc>
+                <a:spcPct val="100000"/>
+              </a:lnSpc>
+              <a:spcBef>
+                <a:spcPts val="0"/>
+              </a:spcBef>
+              <a:buFont typeface="Arial" panose="020B0604020202020204" pitchFamily="34" charset="0"/>
+              <a:buNone/>
+            </a:pPr>
+            <a:r>
+              <a:rPr lang="en-US" sz="1400" dirty="0">
+                <a:latin typeface="Courier New" panose="02070309020205020404" pitchFamily="49" charset="0"/>
+                <a:cs typeface="Courier New" panose="02070309020205020404" pitchFamily="49" charset="0"/>
+              </a:rPr>
+              <a:t>    )</a:t>
+            </a:r>
+          </a:p>
+          <a:p>
+            <a:pPr marL="0" indent="0">
+              <a:lnSpc>
+                <a:spcPct val="100000"/>
+              </a:lnSpc>
+              <a:spcBef>
+                <a:spcPts val="0"/>
+              </a:spcBef>
+              <a:buFont typeface="Arial" panose="020B0604020202020204" pitchFamily="34" charset="0"/>
+              <a:buNone/>
+            </a:pPr>
+            <a:r>
+              <a:rPr lang="en-US" sz="1400" dirty="0">
+                <a:latin typeface="Courier New" panose="02070309020205020404" pitchFamily="49" charset="0"/>
+                <a:cs typeface="Courier New" panose="02070309020205020404" pitchFamily="49" charset="0"/>
+              </a:rPr>
+              <a:t>    return self</a:t>
+            </a:r>
+          </a:p>
+          <a:p>
+            <a:pPr marL="0" indent="0">
+              <a:lnSpc>
+                <a:spcPct val="100000"/>
+              </a:lnSpc>
+              <a:spcBef>
+                <a:spcPts val="0"/>
+              </a:spcBef>
+              <a:buFont typeface="Arial" panose="020B0604020202020204" pitchFamily="34" charset="0"/>
+              <a:buNone/>
+            </a:pPr>
+            <a:endParaRPr lang="en-US" sz="1400" dirty="0">
+              <a:solidFill>
+                <a:schemeClr val="accent6">
+                  <a:lumMod val="75000"/>
+                </a:schemeClr>
+              </a:solidFill>
+              <a:latin typeface="Courier New" panose="02070309020205020404" pitchFamily="49" charset="0"/>
+              <a:cs typeface="Courier New" panose="02070309020205020404" pitchFamily="49" charset="0"/>
+            </a:endParaRPr>
+          </a:p>
+          <a:p>
+            <a:pPr marL="0" indent="0">
+              <a:lnSpc>
+                <a:spcPct val="100000"/>
+              </a:lnSpc>
+              <a:spcBef>
+                <a:spcPts val="0"/>
+              </a:spcBef>
+              <a:buFont typeface="Arial" panose="020B0604020202020204" pitchFamily="34" charset="0"/>
+              <a:buNone/>
+            </a:pPr>
+            <a:r>
+              <a:rPr lang="en-US" sz="1400" dirty="0">
+                <a:latin typeface="Courier New" panose="02070309020205020404" pitchFamily="49" charset="0"/>
+                <a:cs typeface="Courier New" panose="02070309020205020404" pitchFamily="49" charset="0"/>
+              </a:rPr>
+              <a:t>  def </a:t>
+            </a:r>
+            <a:r>
+              <a:rPr lang="en-US" sz="1400" b="1" dirty="0">
+                <a:latin typeface="Courier New" panose="02070309020205020404" pitchFamily="49" charset="0"/>
+                <a:cs typeface="Courier New" panose="02070309020205020404" pitchFamily="49" charset="0"/>
+              </a:rPr>
+              <a:t>__next__</a:t>
+            </a:r>
+            <a:r>
+              <a:rPr lang="en-US" sz="1400" dirty="0">
+                <a:latin typeface="Courier New" panose="02070309020205020404" pitchFamily="49" charset="0"/>
+                <a:cs typeface="Courier New" panose="02070309020205020404" pitchFamily="49" charset="0"/>
+              </a:rPr>
+              <a:t>(self):</a:t>
+            </a:r>
+          </a:p>
+          <a:p>
+            <a:pPr marL="0" indent="0">
+              <a:lnSpc>
+                <a:spcPct val="100000"/>
+              </a:lnSpc>
+              <a:spcBef>
+                <a:spcPts val="0"/>
+              </a:spcBef>
+              <a:buFont typeface="Arial" panose="020B0604020202020204" pitchFamily="34" charset="0"/>
+              <a:buNone/>
+            </a:pPr>
+            <a:r>
+              <a:rPr lang="en-US" sz="1400" dirty="0">
+                <a:solidFill>
+                  <a:schemeClr val="accent2">
+                    <a:lumMod val="75000"/>
+                  </a:schemeClr>
+                </a:solidFill>
+                <a:latin typeface="Courier New" panose="02070309020205020404" pitchFamily="49" charset="0"/>
+                <a:cs typeface="Courier New" panose="02070309020205020404" pitchFamily="49" charset="0"/>
+              </a:rPr>
+              <a:t>    """Return next letter."""</a:t>
+            </a:r>
+          </a:p>
+          <a:p>
+            <a:pPr marL="0" indent="0">
+              <a:lnSpc>
+                <a:spcPct val="100000"/>
+              </a:lnSpc>
+              <a:spcBef>
+                <a:spcPts val="0"/>
+              </a:spcBef>
+              <a:buFont typeface="Arial" panose="020B0604020202020204" pitchFamily="34" charset="0"/>
+              <a:buNone/>
+            </a:pPr>
+            <a:r>
+              <a:rPr lang="en-US" sz="1400" dirty="0">
+                <a:latin typeface="Courier New" panose="02070309020205020404" pitchFamily="49" charset="0"/>
+                <a:cs typeface="Courier New" panose="02070309020205020404" pitchFamily="49" charset="0"/>
+              </a:rPr>
+              <a:t>    if </a:t>
+            </a:r>
+            <a:r>
+              <a:rPr lang="en-US" sz="1400" dirty="0" err="1">
+                <a:latin typeface="Courier New" panose="02070309020205020404" pitchFamily="49" charset="0"/>
+                <a:cs typeface="Courier New" panose="02070309020205020404" pitchFamily="49" charset="0"/>
+              </a:rPr>
+              <a:t>len</a:t>
+            </a:r>
+            <a:r>
+              <a:rPr lang="en-US" sz="1400" dirty="0">
+                <a:latin typeface="Courier New" panose="02070309020205020404" pitchFamily="49" charset="0"/>
+                <a:cs typeface="Courier New" panose="02070309020205020404" pitchFamily="49" charset="0"/>
+              </a:rPr>
+              <a:t>(</a:t>
+            </a:r>
+            <a:r>
+              <a:rPr lang="en-US" sz="1400" dirty="0" err="1">
+                <a:latin typeface="Courier New" panose="02070309020205020404" pitchFamily="49" charset="0"/>
+                <a:cs typeface="Courier New" panose="02070309020205020404" pitchFamily="49" charset="0"/>
+              </a:rPr>
+              <a:t>self.letters</a:t>
+            </a:r>
+            <a:r>
+              <a:rPr lang="en-US" sz="1400" dirty="0">
+                <a:latin typeface="Courier New" panose="02070309020205020404" pitchFamily="49" charset="0"/>
+                <a:cs typeface="Courier New" panose="02070309020205020404" pitchFamily="49" charset="0"/>
+              </a:rPr>
+              <a:t>):</a:t>
+            </a:r>
+          </a:p>
+          <a:p>
+            <a:pPr marL="0" indent="0">
+              <a:lnSpc>
+                <a:spcPct val="100000"/>
+              </a:lnSpc>
+              <a:spcBef>
+                <a:spcPts val="0"/>
+              </a:spcBef>
+              <a:buFont typeface="Arial" panose="020B0604020202020204" pitchFamily="34" charset="0"/>
+              <a:buNone/>
+            </a:pPr>
+            <a:r>
+              <a:rPr lang="en-US" sz="1400" dirty="0">
+                <a:latin typeface="Courier New" panose="02070309020205020404" pitchFamily="49" charset="0"/>
+                <a:cs typeface="Courier New" panose="02070309020205020404" pitchFamily="49" charset="0"/>
+              </a:rPr>
+              <a:t>       return </a:t>
+            </a:r>
+            <a:r>
+              <a:rPr lang="en-US" sz="1400" dirty="0" err="1">
+                <a:latin typeface="Courier New" panose="02070309020205020404" pitchFamily="49" charset="0"/>
+                <a:cs typeface="Courier New" panose="02070309020205020404" pitchFamily="49" charset="0"/>
+              </a:rPr>
+              <a:t>self.letters.pop</a:t>
+            </a:r>
+            <a:r>
+              <a:rPr lang="en-US" sz="1400" dirty="0">
+                <a:latin typeface="Courier New" panose="02070309020205020404" pitchFamily="49" charset="0"/>
+                <a:cs typeface="Courier New" panose="02070309020205020404" pitchFamily="49" charset="0"/>
+              </a:rPr>
+              <a:t>()</a:t>
+            </a:r>
+          </a:p>
+          <a:p>
+            <a:pPr marL="0" indent="0">
+              <a:lnSpc>
+                <a:spcPct val="100000"/>
+              </a:lnSpc>
+              <a:spcBef>
+                <a:spcPts val="0"/>
+              </a:spcBef>
+              <a:buFont typeface="Arial" panose="020B0604020202020204" pitchFamily="34" charset="0"/>
+              <a:buNone/>
+            </a:pPr>
+            <a:endParaRPr lang="en-US" sz="1400" dirty="0">
+              <a:latin typeface="Courier New" panose="02070309020205020404" pitchFamily="49" charset="0"/>
+              <a:cs typeface="Courier New" panose="02070309020205020404" pitchFamily="49" charset="0"/>
+            </a:endParaRPr>
+          </a:p>
+          <a:p>
+            <a:pPr marL="0" indent="0">
+              <a:lnSpc>
+                <a:spcPct val="100000"/>
+              </a:lnSpc>
+              <a:spcBef>
+                <a:spcPts val="0"/>
+              </a:spcBef>
+              <a:buFont typeface="Arial" panose="020B0604020202020204" pitchFamily="34" charset="0"/>
+              <a:buNone/>
+            </a:pPr>
+            <a:r>
+              <a:rPr lang="en-US" sz="1400" dirty="0">
+                <a:latin typeface="Courier New" panose="02070309020205020404" pitchFamily="49" charset="0"/>
+                <a:cs typeface="Courier New" panose="02070309020205020404" pitchFamily="49" charset="0"/>
+              </a:rPr>
+              <a:t>    raise </a:t>
+            </a:r>
+            <a:r>
+              <a:rPr lang="en-US" sz="1400" dirty="0" err="1">
+                <a:latin typeface="Courier New" panose="02070309020205020404" pitchFamily="49" charset="0"/>
+                <a:cs typeface="Courier New" panose="02070309020205020404" pitchFamily="49" charset="0"/>
+              </a:rPr>
+              <a:t>StopIteration</a:t>
+            </a:r>
+            <a:endParaRPr lang="en-US" sz="1400" dirty="0">
+              <a:latin typeface="Courier New" panose="02070309020205020404" pitchFamily="49" charset="0"/>
+              <a:cs typeface="Courier New" panose="02070309020205020404" pitchFamily="49" charset="0"/>
+            </a:endParaRPr>
+          </a:p>
+          <a:p>
+            <a:pPr marL="0" indent="0">
+              <a:lnSpc>
+                <a:spcPct val="100000"/>
+              </a:lnSpc>
+              <a:spcBef>
+                <a:spcPts val="0"/>
+              </a:spcBef>
+              <a:buFont typeface="Arial" panose="020B0604020202020204" pitchFamily="34" charset="0"/>
+              <a:buNone/>
+            </a:pPr>
+            <a:endParaRPr lang="en-US" sz="1400" dirty="0">
+              <a:solidFill>
+                <a:schemeClr val="accent6">
+                  <a:lumMod val="75000"/>
+                </a:schemeClr>
+              </a:solidFill>
+              <a:latin typeface="Courier New" panose="02070309020205020404" pitchFamily="49" charset="0"/>
+              <a:cs typeface="Courier New" panose="02070309020205020404" pitchFamily="49" charset="0"/>
+            </a:endParaRPr>
+          </a:p>
+          <a:p>
+            <a:pPr marL="0" indent="0">
+              <a:lnSpc>
+                <a:spcPct val="100000"/>
+              </a:lnSpc>
+              <a:spcBef>
+                <a:spcPts val="0"/>
+              </a:spcBef>
+              <a:buFont typeface="Arial" panose="020B0604020202020204" pitchFamily="34" charset="0"/>
+              <a:buNone/>
+            </a:pPr>
+            <a:endParaRPr lang="en-US" sz="1400" dirty="0">
+              <a:solidFill>
+                <a:schemeClr val="accent6">
+                  <a:lumMod val="75000"/>
+                </a:schemeClr>
+              </a:solidFill>
+              <a:latin typeface="Courier New" panose="02070309020205020404" pitchFamily="49" charset="0"/>
+              <a:cs typeface="Courier New" panose="02070309020205020404" pitchFamily="49" charset="0"/>
+            </a:endParaRPr>
+          </a:p>
+          <a:p>
+            <a:pPr marL="0" indent="0">
+              <a:lnSpc>
+                <a:spcPct val="100000"/>
+              </a:lnSpc>
+              <a:spcBef>
+                <a:spcPts val="0"/>
+              </a:spcBef>
+              <a:buFont typeface="Arial" panose="020B0604020202020204" pitchFamily="34" charset="0"/>
+              <a:buNone/>
+            </a:pPr>
+            <a:endParaRPr lang="en-US" sz="1400" dirty="0">
+              <a:solidFill>
+                <a:schemeClr val="accent6">
+                  <a:lumMod val="75000"/>
+                </a:schemeClr>
+              </a:solidFill>
+              <a:latin typeface="Courier New" panose="02070309020205020404" pitchFamily="49" charset="0"/>
+              <a:cs typeface="Courier New" panose="02070309020205020404" pitchFamily="49" charset="0"/>
+            </a:endParaRPr>
+          </a:p>
+          <a:p>
+            <a:pPr marL="0" indent="0">
+              <a:lnSpc>
+                <a:spcPct val="100000"/>
+              </a:lnSpc>
+              <a:spcBef>
+                <a:spcPts val="0"/>
+              </a:spcBef>
+              <a:buFont typeface="Arial" panose="020B0604020202020204" pitchFamily="34" charset="0"/>
+              <a:buNone/>
+            </a:pPr>
+            <a:r>
+              <a:rPr lang="en-US" sz="1400" dirty="0">
+                <a:solidFill>
+                  <a:schemeClr val="accent6">
+                    <a:lumMod val="75000"/>
+                  </a:schemeClr>
+                </a:solidFill>
+                <a:latin typeface="Courier New" panose="02070309020205020404" pitchFamily="49" charset="0"/>
+                <a:cs typeface="Courier New" panose="02070309020205020404" pitchFamily="49" charset="0"/>
+              </a:rPr>
+              <a:t># Loop through random letters.</a:t>
+            </a:r>
+          </a:p>
+          <a:p>
+            <a:pPr marL="0" indent="0">
+              <a:lnSpc>
+                <a:spcPct val="100000"/>
+              </a:lnSpc>
+              <a:spcBef>
+                <a:spcPts val="0"/>
+              </a:spcBef>
+              <a:buFont typeface="Arial" panose="020B0604020202020204" pitchFamily="34" charset="0"/>
+              <a:buNone/>
+            </a:pPr>
+            <a:r>
+              <a:rPr lang="en-US" sz="1400" dirty="0">
+                <a:solidFill>
+                  <a:schemeClr val="accent6">
+                    <a:lumMod val="75000"/>
+                  </a:schemeClr>
+                </a:solidFill>
+                <a:latin typeface="Courier New" panose="02070309020205020404" pitchFamily="49" charset="0"/>
+                <a:cs typeface="Courier New" panose="02070309020205020404" pitchFamily="49" charset="0"/>
+              </a:rPr>
+              <a:t># Calls __</a:t>
+            </a:r>
+            <a:r>
+              <a:rPr lang="en-US" sz="1400" dirty="0" err="1">
+                <a:solidFill>
+                  <a:schemeClr val="accent6">
+                    <a:lumMod val="75000"/>
+                  </a:schemeClr>
+                </a:solidFill>
+                <a:latin typeface="Courier New" panose="02070309020205020404" pitchFamily="49" charset="0"/>
+                <a:cs typeface="Courier New" panose="02070309020205020404" pitchFamily="49" charset="0"/>
+              </a:rPr>
+              <a:t>init</a:t>
+            </a:r>
+            <a:r>
+              <a:rPr lang="en-US" sz="1400" dirty="0">
+                <a:solidFill>
+                  <a:schemeClr val="accent6">
+                    <a:lumMod val="75000"/>
+                  </a:schemeClr>
+                </a:solidFill>
+                <a:latin typeface="Courier New" panose="02070309020205020404" pitchFamily="49" charset="0"/>
+                <a:cs typeface="Courier New" panose="02070309020205020404" pitchFamily="49" charset="0"/>
+              </a:rPr>
+              <a:t>__ =&gt; __</a:t>
+            </a:r>
+            <a:r>
+              <a:rPr lang="en-US" sz="1400" dirty="0" err="1">
+                <a:solidFill>
+                  <a:schemeClr val="accent6">
+                    <a:lumMod val="75000"/>
+                  </a:schemeClr>
+                </a:solidFill>
+                <a:latin typeface="Courier New" panose="02070309020205020404" pitchFamily="49" charset="0"/>
+                <a:cs typeface="Courier New" panose="02070309020205020404" pitchFamily="49" charset="0"/>
+              </a:rPr>
+              <a:t>iter</a:t>
+            </a:r>
+            <a:r>
+              <a:rPr lang="en-US" sz="1400" dirty="0">
+                <a:solidFill>
+                  <a:schemeClr val="accent6">
+                    <a:lumMod val="75000"/>
+                  </a:schemeClr>
+                </a:solidFill>
+                <a:latin typeface="Courier New" panose="02070309020205020404" pitchFamily="49" charset="0"/>
+                <a:cs typeface="Courier New" panose="02070309020205020404" pitchFamily="49" charset="0"/>
+              </a:rPr>
+              <a:t>__ =&gt; __next__</a:t>
+            </a:r>
+          </a:p>
+          <a:p>
+            <a:pPr marL="0" indent="0">
+              <a:lnSpc>
+                <a:spcPct val="100000"/>
+              </a:lnSpc>
+              <a:spcBef>
+                <a:spcPts val="0"/>
+              </a:spcBef>
+              <a:buFont typeface="Arial" panose="020B0604020202020204" pitchFamily="34" charset="0"/>
+              <a:buNone/>
+            </a:pPr>
+            <a:r>
+              <a:rPr lang="en-US" sz="1400" dirty="0">
+                <a:latin typeface="Courier New" panose="02070309020205020404" pitchFamily="49" charset="0"/>
+                <a:cs typeface="Courier New" panose="02070309020205020404" pitchFamily="49" charset="0"/>
+              </a:rPr>
+              <a:t>for letter in </a:t>
+            </a:r>
+            <a:r>
+              <a:rPr lang="en-US" sz="1400" b="1" dirty="0" err="1">
+                <a:latin typeface="Courier New" panose="02070309020205020404" pitchFamily="49" charset="0"/>
+                <a:cs typeface="Courier New" panose="02070309020205020404" pitchFamily="49" charset="0"/>
+              </a:rPr>
+              <a:t>RandomLetters</a:t>
+            </a:r>
+            <a:r>
+              <a:rPr lang="en-US" sz="1400" dirty="0">
+                <a:latin typeface="Courier New" panose="02070309020205020404" pitchFamily="49" charset="0"/>
+                <a:cs typeface="Courier New" panose="02070309020205020404" pitchFamily="49" charset="0"/>
+              </a:rPr>
+              <a:t>(10):</a:t>
+            </a:r>
+          </a:p>
+          <a:p>
+            <a:pPr marL="0" indent="0">
+              <a:lnSpc>
+                <a:spcPct val="100000"/>
+              </a:lnSpc>
+              <a:spcBef>
+                <a:spcPts val="0"/>
+              </a:spcBef>
+              <a:buFont typeface="Arial" panose="020B0604020202020204" pitchFamily="34" charset="0"/>
+              <a:buNone/>
+            </a:pPr>
+            <a:r>
+              <a:rPr lang="en-US" sz="1400" dirty="0">
+                <a:latin typeface="Courier New" panose="02070309020205020404" pitchFamily="49" charset="0"/>
+                <a:cs typeface="Courier New" panose="02070309020205020404" pitchFamily="49" charset="0"/>
+              </a:rPr>
+              <a:t>  print(letter)</a:t>
+            </a:r>
+          </a:p>
+        </p:txBody>
+      </p:sp>
+      <p:cxnSp>
+        <p:nvCxnSpPr>
+          <p:cNvPr id="6" name="Straight Connector 5">
+            <a:extLst>
+              <a:ext uri="{FF2B5EF4-FFF2-40B4-BE49-F238E27FC236}">
+                <a16:creationId xmlns:a16="http://schemas.microsoft.com/office/drawing/2014/main" id="{7F162173-AD9E-1ED9-F92B-186066229DD6}"/>
+              </a:ext>
+            </a:extLst>
+          </p:cNvPr>
+          <p:cNvCxnSpPr>
+            <a:cxnSpLocks/>
+          </p:cNvCxnSpPr>
+          <p:nvPr/>
+        </p:nvCxnSpPr>
+        <p:spPr>
+          <a:xfrm>
+            <a:off x="5655733" y="1456267"/>
+            <a:ext cx="0" cy="4809066"/>
+          </a:xfrm>
+          <a:prstGeom prst="line">
+            <a:avLst/>
+          </a:prstGeom>
+        </p:spPr>
+        <p:style>
+          <a:lnRef idx="3">
+            <a:schemeClr val="dk1"/>
+          </a:lnRef>
+          <a:fillRef idx="0">
+            <a:schemeClr val="dk1"/>
+          </a:fillRef>
+          <a:effectRef idx="2">
+            <a:schemeClr val="dk1"/>
+          </a:effectRef>
+          <a:fontRef idx="minor">
+            <a:schemeClr val="tx1"/>
+          </a:fontRef>
+        </p:style>
+      </p:cxnSp>
+    </p:spTree>
+    <p:extLst>
+      <p:ext uri="{BB962C8B-B14F-4D97-AF65-F5344CB8AC3E}">
+        <p14:creationId xmlns:p14="http://schemas.microsoft.com/office/powerpoint/2010/main" val="713754194"/>
+      </p:ext>
+    </p:extLst>
+  </p:cSld>
+  <p:clrMapOvr>
+    <a:masterClrMapping/>
+  </p:clrMapOvr>
+</p:sld>
+</file>
+
+<file path=ppt/slides/slide56.xml><?xml version="1.0" encoding="utf-8"?>
+<p:sld xmlns:a="http://schemas.openxmlformats.org/drawingml/2006/main" xmlns:r="http://schemas.openxmlformats.org/officeDocument/2006/relationships" xmlns:p="http://schemas.openxmlformats.org/presentationml/2006/main">
+  <p:cSld>
+    <p:spTree>
+      <p:nvGrpSpPr>
+        <p:cNvPr id="1" name=""/>
+        <p:cNvGrpSpPr/>
+        <p:nvPr/>
+      </p:nvGrpSpPr>
+      <p:grpSpPr>
+        <a:xfrm>
+          <a:off x="0" y="0"/>
+          <a:ext cx="0" cy="0"/>
+          <a:chOff x="0" y="0"/>
+          <a:chExt cx="0" cy="0"/>
+        </a:xfrm>
+      </p:grpSpPr>
+      <p:sp>
+        <p:nvSpPr>
+          <p:cNvPr id="2" name="Title 1">
+            <a:extLst>
+              <a:ext uri="{FF2B5EF4-FFF2-40B4-BE49-F238E27FC236}">
+                <a16:creationId xmlns:a16="http://schemas.microsoft.com/office/drawing/2014/main" id="{39A1D606-8DD1-369C-5C09-471CDD551AD5}"/>
+              </a:ext>
+            </a:extLst>
+          </p:cNvPr>
+          <p:cNvSpPr>
+            <a:spLocks noGrp="1"/>
+          </p:cNvSpPr>
+          <p:nvPr>
+            <p:ph type="title"/>
+          </p:nvPr>
+        </p:nvSpPr>
+        <p:spPr>
+          <a:xfrm>
+            <a:off x="838200" y="365126"/>
+            <a:ext cx="10515600" cy="718608"/>
+          </a:xfrm>
+        </p:spPr>
+        <p:txBody>
+          <a:bodyPr>
+            <a:normAutofit/>
+          </a:bodyPr>
+          <a:lstStyle/>
+          <a:p>
+            <a:r>
+              <a:rPr lang="nl-NL" sz="3600" dirty="0"/>
+              <a:t>Meer </a:t>
+            </a:r>
+            <a:r>
+              <a:rPr lang="nl-NL" sz="3600" dirty="0" err="1"/>
+              <a:t>dunder</a:t>
+            </a:r>
+            <a:r>
+              <a:rPr lang="nl-NL" sz="3600" dirty="0"/>
+              <a:t> </a:t>
+            </a:r>
+            <a:r>
+              <a:rPr lang="nl-NL" sz="3600" dirty="0" err="1"/>
+              <a:t>methods</a:t>
+            </a:r>
+            <a:endParaRPr lang="nl-NL" sz="3600" noProof="0" dirty="0"/>
+          </a:p>
+        </p:txBody>
+      </p:sp>
+      <p:sp>
+        <p:nvSpPr>
+          <p:cNvPr id="3" name="Content Placeholder 2">
+            <a:extLst>
+              <a:ext uri="{FF2B5EF4-FFF2-40B4-BE49-F238E27FC236}">
+                <a16:creationId xmlns:a16="http://schemas.microsoft.com/office/drawing/2014/main" id="{F4C2D286-E049-0AAB-1360-B7157E11AD7E}"/>
+              </a:ext>
+            </a:extLst>
+          </p:cNvPr>
+          <p:cNvSpPr>
+            <a:spLocks noGrp="1"/>
+          </p:cNvSpPr>
+          <p:nvPr>
+            <p:ph idx="1"/>
+          </p:nvPr>
+        </p:nvSpPr>
+        <p:spPr>
+          <a:xfrm>
+            <a:off x="838200" y="1456267"/>
+            <a:ext cx="4571999" cy="4720696"/>
+          </a:xfrm>
+        </p:spPr>
+        <p:txBody>
+          <a:bodyPr>
+            <a:normAutofit/>
+          </a:bodyPr>
+          <a:lstStyle/>
+          <a:p>
+            <a:pPr marL="0" indent="0">
+              <a:buNone/>
+            </a:pPr>
+            <a:r>
               <a:rPr lang="nl-NL" sz="2000" b="1" noProof="0" dirty="0">
                 <a:latin typeface="Courier New" panose="02070309020205020404" pitchFamily="49" charset="0"/>
                 <a:cs typeface="Courier New" panose="02070309020205020404" pitchFamily="49" charset="0"/>
@@ -33064,53 +34521,6 @@
             <a:endParaRPr lang="nl-NL" sz="2000" dirty="0">
               <a:cs typeface="Courier New" panose="02070309020205020404" pitchFamily="49" charset="0"/>
             </a:endParaRPr>
-          </a:p>
-          <a:p>
-            <a:pPr marL="0" indent="0">
-              <a:buNone/>
-            </a:pPr>
-            <a:r>
-              <a:rPr lang="nl-NL" sz="2000" b="1" noProof="0" dirty="0">
-                <a:latin typeface="Courier New" panose="02070309020205020404" pitchFamily="49" charset="0"/>
-                <a:cs typeface="Courier New" panose="02070309020205020404" pitchFamily="49" charset="0"/>
-              </a:rPr>
-              <a:t>__</a:t>
-            </a:r>
-            <a:r>
-              <a:rPr lang="nl-NL" sz="2000" b="1" noProof="0" dirty="0" err="1">
-                <a:latin typeface="Courier New" panose="02070309020205020404" pitchFamily="49" charset="0"/>
-                <a:cs typeface="Courier New" panose="02070309020205020404" pitchFamily="49" charset="0"/>
-              </a:rPr>
-              <a:t>str</a:t>
-            </a:r>
-            <a:r>
-              <a:rPr lang="nl-NL" sz="2000" b="1" noProof="0" dirty="0">
-                <a:latin typeface="Courier New" panose="02070309020205020404" pitchFamily="49" charset="0"/>
-                <a:cs typeface="Courier New" panose="02070309020205020404" pitchFamily="49" charset="0"/>
-              </a:rPr>
-              <a:t>__</a:t>
-            </a:r>
-            <a:endParaRPr lang="nl-NL" sz="2000" b="1" noProof="0" dirty="0"/>
-          </a:p>
-          <a:p>
-            <a:pPr marL="0" indent="0">
-              <a:buNone/>
-            </a:pPr>
-            <a:r>
-              <a:rPr lang="nl-NL" sz="2000" dirty="0"/>
-              <a:t>Weergave als string, bv. met </a:t>
-            </a:r>
-            <a:r>
-              <a:rPr lang="nl-NL" sz="2000" dirty="0">
-                <a:latin typeface="Courier New" panose="02070309020205020404" pitchFamily="49" charset="0"/>
-                <a:cs typeface="Courier New" panose="02070309020205020404" pitchFamily="49" charset="0"/>
-              </a:rPr>
-              <a:t>print()</a:t>
-            </a:r>
-            <a:r>
-              <a:rPr lang="nl-NL" sz="2000" dirty="0"/>
-              <a:t>.</a:t>
-            </a:r>
           </a:p>
           <a:p>
             <a:pPr marL="0" indent="0">
@@ -33219,7 +34629,7 @@
         </p:spPr>
         <p:txBody>
           <a:bodyPr vert="horz" lIns="91440" tIns="45720" rIns="91440" bIns="45720" rtlCol="0">
-            <a:normAutofit lnSpcReduction="10000"/>
+            <a:normAutofit/>
           </a:bodyPr>
           <a:lstStyle>
             <a:lvl1pPr marL="228600" indent="-228600" algn="l" defTabSz="914400" rtl="0" eaLnBrk="1" latinLnBrk="0" hangingPunct="1">
@@ -33397,7 +34807,7 @@
               <a:buNone/>
             </a:pPr>
             <a:r>
-              <a:rPr lang="en-US" sz="1300" b="1" dirty="0">
+              <a:rPr lang="en-US" sz="1300" dirty="0">
                 <a:latin typeface="Courier New" panose="02070309020205020404" pitchFamily="49" charset="0"/>
                 <a:cs typeface="Courier New" panose="02070309020205020404" pitchFamily="49" charset="0"/>
               </a:rPr>
@@ -33432,35 +34842,35 @@
               <a:buNone/>
             </a:pPr>
             <a:r>
-              <a:rPr lang="en-US" sz="1300" b="1" dirty="0">
+              <a:rPr lang="en-US" sz="1300" dirty="0">
                 <a:latin typeface="Courier New" panose="02070309020205020404" pitchFamily="49" charset="0"/>
                 <a:cs typeface="Courier New" panose="02070309020205020404" pitchFamily="49" charset="0"/>
               </a:rPr>
               <a:t>  def __</a:t>
             </a:r>
             <a:r>
-              <a:rPr lang="en-US" sz="1300" b="1" dirty="0" err="1">
+              <a:rPr lang="en-US" sz="1300" dirty="0" err="1">
                 <a:latin typeface="Courier New" panose="02070309020205020404" pitchFamily="49" charset="0"/>
                 <a:cs typeface="Courier New" panose="02070309020205020404" pitchFamily="49" charset="0"/>
               </a:rPr>
               <a:t>init</a:t>
             </a:r>
             <a:r>
-              <a:rPr lang="en-US" sz="1300" b="1" dirty="0">
+              <a:rPr lang="en-US" sz="1300" dirty="0">
                 <a:latin typeface="Courier New" panose="02070309020205020404" pitchFamily="49" charset="0"/>
                 <a:cs typeface="Courier New" panose="02070309020205020404" pitchFamily="49" charset="0"/>
               </a:rPr>
               <a:t>__(self, dx, </a:t>
             </a:r>
             <a:r>
-              <a:rPr lang="en-US" sz="1300" b="1" dirty="0" err="1">
+              <a:rPr lang="en-US" sz="1300" dirty="0" err="1">
                 <a:latin typeface="Courier New" panose="02070309020205020404" pitchFamily="49" charset="0"/>
                 <a:cs typeface="Courier New" panose="02070309020205020404" pitchFamily="49" charset="0"/>
               </a:rPr>
               <a:t>dy</a:t>
             </a:r>
             <a:r>
-              <a:rPr lang="en-US" sz="1300" b="1" dirty="0">
+              <a:rPr lang="en-US" sz="1300" dirty="0">
                 <a:latin typeface="Courier New" panose="02070309020205020404" pitchFamily="49" charset="0"/>
                 <a:cs typeface="Courier New" panose="02070309020205020404" pitchFamily="49" charset="0"/>
               </a:rPr>
@@ -33579,7 +34989,28 @@
                 <a:latin typeface="Courier New" panose="02070309020205020404" pitchFamily="49" charset="0"/>
                 <a:cs typeface="Courier New" panose="02070309020205020404" pitchFamily="49" charset="0"/>
               </a:rPr>
-              <a:t>  def __add__(self, other): </a:t>
+              <a:t>  </a:t>
+            </a:r>
+            <a:r>
+              <a:rPr lang="en-US" sz="1300" dirty="0">
+                <a:latin typeface="Courier New" panose="02070309020205020404" pitchFamily="49" charset="0"/>
+                <a:cs typeface="Courier New" panose="02070309020205020404" pitchFamily="49" charset="0"/>
+              </a:rPr>
+              <a:t>def </a:t>
+            </a:r>
+            <a:r>
+              <a:rPr lang="en-US" sz="1300" b="1" dirty="0">
+                <a:latin typeface="Courier New" panose="02070309020205020404" pitchFamily="49" charset="0"/>
+                <a:cs typeface="Courier New" panose="02070309020205020404" pitchFamily="49" charset="0"/>
+              </a:rPr>
+              <a:t>__add__</a:t>
+            </a:r>
+            <a:r>
+              <a:rPr lang="en-US" sz="1300" dirty="0">
+                <a:latin typeface="Courier New" panose="02070309020205020404" pitchFamily="49" charset="0"/>
+                <a:cs typeface="Courier New" panose="02070309020205020404" pitchFamily="49" charset="0"/>
+              </a:rPr>
+              <a:t>(self, other): </a:t>
             </a:r>
           </a:p>
           <a:p>
@@ -33617,7 +35048,7 @@
                 <a:latin typeface="Courier New" panose="02070309020205020404" pitchFamily="49" charset="0"/>
                 <a:cs typeface="Courier New" panose="02070309020205020404" pitchFamily="49" charset="0"/>
               </a:rPr>
-              <a:t>       </a:t>
+              <a:t>      </a:t>
             </a:r>
             <a:r>
               <a:rPr lang="en-US" sz="1300" dirty="0" err="1">
@@ -33645,7 +35076,26 @@
                 <a:latin typeface="Courier New" panose="02070309020205020404" pitchFamily="49" charset="0"/>
                 <a:cs typeface="Courier New" panose="02070309020205020404" pitchFamily="49" charset="0"/>
               </a:rPr>
-              <a:t>, </a:t>
+              <a:t>,</a:t>
+            </a:r>
+          </a:p>
+          <a:p>
+            <a:pPr marL="0" indent="0">
+              <a:lnSpc>
+                <a:spcPct val="120000"/>
+              </a:lnSpc>
+              <a:spcBef>
+                <a:spcPts val="0"/>
+              </a:spcBef>
+              <a:buFont typeface="Arial" panose="020B0604020202020204" pitchFamily="34" charset="0"/>
+              <a:buNone/>
+            </a:pPr>
+            <a:r>
+              <a:rPr lang="en-US" sz="1300" dirty="0">
+                <a:latin typeface="Courier New" panose="02070309020205020404" pitchFamily="49" charset="0"/>
+                <a:cs typeface="Courier New" panose="02070309020205020404" pitchFamily="49" charset="0"/>
+              </a:rPr>
+              <a:t>      </a:t>
             </a:r>
             <a:r>
               <a:rPr lang="en-US" sz="1300" dirty="0" err="1">
@@ -33710,192 +35160,6 @@
               </a:rPr>
               <a:t>  </a:t>
             </a:r>
-          </a:p>
-          <a:p>
-            <a:pPr marL="0" indent="0">
-              <a:lnSpc>
-                <a:spcPct val="120000"/>
-              </a:lnSpc>
-              <a:spcBef>
-                <a:spcPts val="0"/>
-              </a:spcBef>
-              <a:buFont typeface="Arial" panose="020B0604020202020204" pitchFamily="34" charset="0"/>
-              <a:buNone/>
-            </a:pPr>
-            <a:r>
-              <a:rPr lang="en-US" sz="1300" b="1" dirty="0">
-                <a:latin typeface="Courier New" panose="02070309020205020404" pitchFamily="49" charset="0"/>
-                <a:cs typeface="Courier New" panose="02070309020205020404" pitchFamily="49" charset="0"/>
-              </a:rPr>
-              <a:t>  def __str__(self):</a:t>
-            </a:r>
-          </a:p>
-          <a:p>
-            <a:pPr marL="0" indent="0">
-              <a:lnSpc>
-                <a:spcPct val="120000"/>
-              </a:lnSpc>
-              <a:spcBef>
-                <a:spcPts val="0"/>
-              </a:spcBef>
-              <a:buFont typeface="Arial" panose="020B0604020202020204" pitchFamily="34" charset="0"/>
-              <a:buNone/>
-            </a:pPr>
-            <a:r>
-              <a:rPr lang="en-US" sz="1300" dirty="0">
-                <a:latin typeface="Courier New" panose="02070309020205020404" pitchFamily="49" charset="0"/>
-                <a:cs typeface="Courier New" panose="02070309020205020404" pitchFamily="49" charset="0"/>
-              </a:rPr>
-              <a:t>    return </a:t>
-            </a:r>
-            <a:r>
-              <a:rPr lang="en-US" sz="1300" dirty="0">
-                <a:solidFill>
-                  <a:schemeClr val="accent1">
-                    <a:lumMod val="75000"/>
-                  </a:schemeClr>
-                </a:solidFill>
-                <a:latin typeface="Courier New" panose="02070309020205020404" pitchFamily="49" charset="0"/>
-                <a:cs typeface="Courier New" panose="02070309020205020404" pitchFamily="49" charset="0"/>
-              </a:rPr>
-              <a:t>f</a:t>
-            </a:r>
-            <a:r>
-              <a:rPr lang="en-US" sz="1300" dirty="0">
-                <a:solidFill>
-                  <a:schemeClr val="accent2">
-                    <a:lumMod val="75000"/>
-                  </a:schemeClr>
-                </a:solidFill>
-                <a:latin typeface="Courier New" panose="02070309020205020404" pitchFamily="49" charset="0"/>
-                <a:cs typeface="Courier New" panose="02070309020205020404" pitchFamily="49" charset="0"/>
-              </a:rPr>
-              <a:t>"(</a:t>
-            </a:r>
-            <a:r>
-              <a:rPr lang="en-US" sz="1300" dirty="0">
-                <a:solidFill>
-                  <a:schemeClr val="accent1">
-                    <a:lumMod val="75000"/>
-                  </a:schemeClr>
-                </a:solidFill>
-                <a:latin typeface="Courier New" panose="02070309020205020404" pitchFamily="49" charset="0"/>
-                <a:cs typeface="Courier New" panose="02070309020205020404" pitchFamily="49" charset="0"/>
-              </a:rPr>
-              <a:t>{</a:t>
-            </a:r>
-            <a:r>
-              <a:rPr lang="en-US" sz="1300" dirty="0" err="1">
-                <a:solidFill>
-                  <a:schemeClr val="accent1">
-                    <a:lumMod val="75000"/>
-                  </a:schemeClr>
-                </a:solidFill>
-                <a:latin typeface="Courier New" panose="02070309020205020404" pitchFamily="49" charset="0"/>
-                <a:cs typeface="Courier New" panose="02070309020205020404" pitchFamily="49" charset="0"/>
-              </a:rPr>
-              <a:t>self.dx</a:t>
-            </a:r>
-            <a:r>
-              <a:rPr lang="en-US" sz="1300" dirty="0">
-                <a:solidFill>
-                  <a:schemeClr val="accent1">
-                    <a:lumMod val="75000"/>
-                  </a:schemeClr>
-                </a:solidFill>
-                <a:latin typeface="Courier New" panose="02070309020205020404" pitchFamily="49" charset="0"/>
-                <a:cs typeface="Courier New" panose="02070309020205020404" pitchFamily="49" charset="0"/>
-              </a:rPr>
-              <a:t>}</a:t>
-            </a:r>
-            <a:r>
-              <a:rPr lang="en-US" sz="1300" dirty="0">
-                <a:solidFill>
-                  <a:schemeClr val="accent2">
-                    <a:lumMod val="75000"/>
-                  </a:schemeClr>
-                </a:solidFill>
-                <a:latin typeface="Courier New" panose="02070309020205020404" pitchFamily="49" charset="0"/>
-                <a:cs typeface="Courier New" panose="02070309020205020404" pitchFamily="49" charset="0"/>
-              </a:rPr>
-              <a:t>, </a:t>
-            </a:r>
-            <a:r>
-              <a:rPr lang="en-US" sz="1300" dirty="0">
-                <a:solidFill>
-                  <a:schemeClr val="accent1">
-                    <a:lumMod val="75000"/>
-                  </a:schemeClr>
-                </a:solidFill>
-                <a:latin typeface="Courier New" panose="02070309020205020404" pitchFamily="49" charset="0"/>
-                <a:cs typeface="Courier New" panose="02070309020205020404" pitchFamily="49" charset="0"/>
-              </a:rPr>
-              <a:t>{</a:t>
-            </a:r>
-            <a:r>
-              <a:rPr lang="en-US" sz="1300" dirty="0" err="1">
-                <a:solidFill>
-                  <a:schemeClr val="accent1">
-                    <a:lumMod val="75000"/>
-                  </a:schemeClr>
-                </a:solidFill>
-                <a:latin typeface="Courier New" panose="02070309020205020404" pitchFamily="49" charset="0"/>
-                <a:cs typeface="Courier New" panose="02070309020205020404" pitchFamily="49" charset="0"/>
-              </a:rPr>
-              <a:t>self.dy</a:t>
-            </a:r>
-            <a:r>
-              <a:rPr lang="en-US" sz="1300" dirty="0">
-                <a:solidFill>
-                  <a:schemeClr val="accent1">
-                    <a:lumMod val="75000"/>
-                  </a:schemeClr>
-                </a:solidFill>
-                <a:latin typeface="Courier New" panose="02070309020205020404" pitchFamily="49" charset="0"/>
-                <a:cs typeface="Courier New" panose="02070309020205020404" pitchFamily="49" charset="0"/>
-              </a:rPr>
-              <a:t>}</a:t>
-            </a:r>
-            <a:r>
-              <a:rPr lang="en-US" sz="1300" dirty="0">
-                <a:solidFill>
-                  <a:schemeClr val="accent2">
-                    <a:lumMod val="75000"/>
-                  </a:schemeClr>
-                </a:solidFill>
-                <a:latin typeface="Courier New" panose="02070309020205020404" pitchFamily="49" charset="0"/>
-                <a:cs typeface="Courier New" panose="02070309020205020404" pitchFamily="49" charset="0"/>
-              </a:rPr>
-              <a:t>)"</a:t>
-            </a:r>
-          </a:p>
-          <a:p>
-            <a:pPr marL="0" indent="0">
-              <a:lnSpc>
-                <a:spcPct val="120000"/>
-              </a:lnSpc>
-              <a:spcBef>
-                <a:spcPts val="0"/>
-              </a:spcBef>
-              <a:buFont typeface="Arial" panose="020B0604020202020204" pitchFamily="34" charset="0"/>
-              <a:buNone/>
-            </a:pPr>
-            <a:endParaRPr lang="en-US" sz="1300" dirty="0">
-              <a:latin typeface="Courier New" panose="02070309020205020404" pitchFamily="49" charset="0"/>
-              <a:cs typeface="Courier New" panose="02070309020205020404" pitchFamily="49" charset="0"/>
-            </a:endParaRPr>
-          </a:p>
-          <a:p>
-            <a:pPr marL="0" indent="0">
-              <a:lnSpc>
-                <a:spcPct val="120000"/>
-              </a:lnSpc>
-              <a:spcBef>
-                <a:spcPts val="0"/>
-              </a:spcBef>
-              <a:buFont typeface="Arial" panose="020B0604020202020204" pitchFamily="34" charset="0"/>
-              <a:buNone/>
-            </a:pPr>
             <a:endParaRPr lang="en-US" sz="1300" dirty="0">
               <a:solidFill>
                 <a:schemeClr val="accent6">
@@ -34117,7 +35381,7 @@
 </p:sld>
 </file>
 
-<file path=ppt/slides/slide56.xml><?xml version="1.0" encoding="utf-8"?>
+<file path=ppt/slides/slide57.xml><?xml version="1.0" encoding="utf-8"?>
 <p:sld xmlns:a="http://schemas.openxmlformats.org/drawingml/2006/main" xmlns:r="http://schemas.openxmlformats.org/officeDocument/2006/relationships" xmlns:p="http://schemas.openxmlformats.org/presentationml/2006/main">
   <p:cSld>
     <p:spTree>
@@ -34201,26 +35465,23 @@
               <a:buNone/>
             </a:pPr>
             <a:r>
-              <a:rPr lang="nl-NL" sz="1800" b="1" noProof="0" dirty="0"/>
-              <a:t>Underscore: </a:t>
-            </a:r>
-            <a:r>
               <a:rPr lang="nl-NL" sz="1800" b="1" noProof="0" dirty="0" err="1"/>
-              <a:t>priv</a:t>
+              <a:t>Priv</a:t>
             </a:r>
             <a:r>
               <a:rPr lang="nl-NL" sz="1800" b="1" dirty="0"/>
-              <a:t>é</a:t>
+              <a:t>é attribuut</a:t>
             </a:r>
             <a:endParaRPr lang="nl-NL" sz="1800" b="1" noProof="0" dirty="0"/>
           </a:p>
           <a:p>
-            <a:pPr marL="0" indent="0">
-              <a:buNone/>
+            <a:pPr>
+              <a:buFontTx/>
+              <a:buChar char="-"/>
             </a:pPr>
             <a:r>
               <a:rPr lang="nl-NL" sz="1800" dirty="0"/>
-              <a:t>Een </a:t>
+              <a:t>Beginnen met een enkele </a:t>
             </a:r>
             <a:r>
               <a:rPr lang="nl-NL" sz="1800" dirty="0" err="1"/>
@@ -34228,37 +35489,27 @@
             </a:r>
             <a:r>
               <a:rPr lang="nl-NL" sz="1800" dirty="0"/>
-              <a:t> geeft aan dat het attribuut of methode privé is.</a:t>
-            </a:r>
-          </a:p>
-          <a:p>
-            <a:pPr marL="0" indent="0">
-              <a:buNone/>
-            </a:pPr>
-            <a:endParaRPr lang="nl-NL" sz="1800" dirty="0"/>
-          </a:p>
-          <a:p>
-            <a:pPr marL="0" indent="0">
-              <a:buNone/>
+              <a:t>.</a:t>
+            </a:r>
+          </a:p>
+          <a:p>
+            <a:pPr>
+              <a:buFontTx/>
+              <a:buChar char="-"/>
             </a:pPr>
             <a:r>
               <a:rPr lang="nl-NL" sz="1800" dirty="0"/>
-              <a:t>Privé attributen en methodes worden intern gebruikt door de class.</a:t>
-            </a:r>
-          </a:p>
-          <a:p>
-            <a:pPr marL="0" indent="0">
-              <a:buNone/>
-            </a:pPr>
-            <a:endParaRPr lang="nl-NL" sz="1800" dirty="0"/>
-          </a:p>
-          <a:p>
-            <a:pPr marL="0" indent="0">
-              <a:buNone/>
+              <a:t>Worden intern gebruikt door de class.</a:t>
+            </a:r>
+          </a:p>
+          <a:p>
+            <a:pPr>
+              <a:buFontTx/>
+              <a:buChar char="-"/>
             </a:pPr>
             <a:r>
               <a:rPr lang="nl-NL" sz="1800" dirty="0"/>
-              <a:t>Conventie: gebruik privé methodes niet omdat implementatie kan wijzigen.</a:t>
+              <a:t>Conventie: niet extern aanroepen, want kunnen wijzigen.</a:t>
             </a:r>
           </a:p>
           <a:p>
@@ -34279,25 +35530,42 @@
             </a:pPr>
             <a:r>
               <a:rPr lang="nl-NL" sz="1800" b="1" dirty="0"/>
-              <a:t>Twee </a:t>
-            </a:r>
-            <a:r>
-              <a:rPr lang="nl-NL" sz="1800" b="1" dirty="0" err="1"/>
-              <a:t>underscores</a:t>
-            </a:r>
-            <a:r>
-              <a:rPr lang="nl-NL" sz="1800" b="1" dirty="0"/>
-              <a:t>: onbereikbaar</a:t>
-            </a:r>
-          </a:p>
-          <a:p>
-            <a:pPr marL="0" indent="0">
-              <a:buNone/>
+              <a:t>Afgeschermd attribuut</a:t>
+            </a:r>
+          </a:p>
+          <a:p>
+            <a:pPr>
+              <a:buFontTx/>
+              <a:buChar char="-"/>
             </a:pPr>
             <a:r>
               <a:rPr lang="nl-NL" sz="1800" dirty="0"/>
-              <a:t>De attributen en methodes zijn onbereikbaar buiten de class. </a:t>
-            </a:r>
+              <a:t>Beginnen met dubbele </a:t>
+            </a:r>
+            <a:r>
+              <a:rPr lang="nl-NL" sz="1800" dirty="0" err="1"/>
+              <a:t>underscore</a:t>
+            </a:r>
+            <a:r>
+              <a:rPr lang="nl-NL" sz="1800" dirty="0"/>
+              <a:t>.</a:t>
+            </a:r>
+          </a:p>
+          <a:p>
+            <a:pPr>
+              <a:buFontTx/>
+              <a:buChar char="-"/>
+            </a:pPr>
+            <a:r>
+              <a:rPr lang="nl-NL" sz="1800" dirty="0"/>
+              <a:t>Niet (direct) extern aan te roepen.</a:t>
+            </a:r>
+          </a:p>
+          <a:p>
+            <a:pPr>
+              <a:buFontTx/>
+              <a:buChar char="-"/>
+            </a:pPr>
             <a:endParaRPr lang="nl-NL" sz="1800" noProof="0" dirty="0"/>
           </a:p>
         </p:txBody>
@@ -34547,7 +35815,28 @@
                 <a:latin typeface="Courier New" panose="02070309020205020404" pitchFamily="49" charset="0"/>
                 <a:cs typeface="Courier New" panose="02070309020205020404" pitchFamily="49" charset="0"/>
               </a:rPr>
-              <a:t>  def _private(self): </a:t>
+              <a:t>  </a:t>
+            </a:r>
+            <a:r>
+              <a:rPr lang="en-US" sz="1200" dirty="0">
+                <a:latin typeface="Courier New" panose="02070309020205020404" pitchFamily="49" charset="0"/>
+                <a:cs typeface="Courier New" panose="02070309020205020404" pitchFamily="49" charset="0"/>
+              </a:rPr>
+              <a:t>def </a:t>
+            </a:r>
+            <a:r>
+              <a:rPr lang="en-US" sz="1200" b="1" dirty="0">
+                <a:latin typeface="Courier New" panose="02070309020205020404" pitchFamily="49" charset="0"/>
+                <a:cs typeface="Courier New" panose="02070309020205020404" pitchFamily="49" charset="0"/>
+              </a:rPr>
+              <a:t>_private</a:t>
+            </a:r>
+            <a:r>
+              <a:rPr lang="en-US" sz="1200" dirty="0">
+                <a:latin typeface="Courier New" panose="02070309020205020404" pitchFamily="49" charset="0"/>
+                <a:cs typeface="Courier New" panose="02070309020205020404" pitchFamily="49" charset="0"/>
+              </a:rPr>
+              <a:t>(self): </a:t>
             </a:r>
           </a:p>
           <a:p>
@@ -34620,14 +35909,21 @@
                 <a:latin typeface="Courier New" panose="02070309020205020404" pitchFamily="49" charset="0"/>
                 <a:cs typeface="Courier New" panose="02070309020205020404" pitchFamily="49" charset="0"/>
               </a:rPr>
-              <a:t>  </a:t>
+              <a:t>  def </a:t>
             </a:r>
             <a:r>
               <a:rPr lang="en-US" sz="1200" b="1" dirty="0">
                 <a:latin typeface="Courier New" panose="02070309020205020404" pitchFamily="49" charset="0"/>
                 <a:cs typeface="Courier New" panose="02070309020205020404" pitchFamily="49" charset="0"/>
               </a:rPr>
-              <a:t>def __restricted(self):</a:t>
+              <a:t>__restricted</a:t>
+            </a:r>
+            <a:r>
+              <a:rPr lang="en-US" sz="1200" dirty="0">
+                <a:latin typeface="Courier New" panose="02070309020205020404" pitchFamily="49" charset="0"/>
+                <a:cs typeface="Courier New" panose="02070309020205020404" pitchFamily="49" charset="0"/>
+              </a:rPr>
+              <a:t>(self):</a:t>
             </a:r>
           </a:p>
           <a:p>
@@ -34696,11 +35992,25 @@
               <a:buNone/>
             </a:pPr>
             <a:r>
+              <a:rPr lang="en-US" sz="1200" dirty="0">
+                <a:latin typeface="Courier New" panose="02070309020205020404" pitchFamily="49" charset="0"/>
+                <a:cs typeface="Courier New" panose="02070309020205020404" pitchFamily="49" charset="0"/>
+              </a:rPr>
+              <a:t>  def </a:t>
+            </a:r>
+            <a:r>
               <a:rPr lang="en-US" sz="1200" b="1" dirty="0">
                 <a:latin typeface="Courier New" panose="02070309020205020404" pitchFamily="49" charset="0"/>
                 <a:cs typeface="Courier New" panose="02070309020205020404" pitchFamily="49" charset="0"/>
               </a:rPr>
-              <a:t>  def public(self):</a:t>
+              <a:t>indirect</a:t>
+            </a:r>
+            <a:r>
+              <a:rPr lang="en-US" sz="1200" dirty="0">
+                <a:latin typeface="Courier New" panose="02070309020205020404" pitchFamily="49" charset="0"/>
+                <a:cs typeface="Courier New" panose="02070309020205020404" pitchFamily="49" charset="0"/>
+              </a:rPr>
+              <a:t>(self):</a:t>
             </a:r>
           </a:p>
           <a:p>
@@ -34834,7 +36144,7 @@
                 <a:latin typeface="Courier New" panose="02070309020205020404" pitchFamily="49" charset="0"/>
                 <a:cs typeface="Courier New" panose="02070309020205020404" pitchFamily="49" charset="0"/>
               </a:rPr>
-              <a:t># Call all methods.</a:t>
+              <a:t># Calling methods.</a:t>
             </a:r>
           </a:p>
           <a:p>
@@ -35017,14 +36327,14 @@
                 <a:latin typeface="Courier New" panose="02070309020205020404" pitchFamily="49" charset="0"/>
                 <a:cs typeface="Courier New" panose="02070309020205020404" pitchFamily="49" charset="0"/>
               </a:rPr>
-              <a:t>x.public</a:t>
+              <a:t>x.indirect</a:t>
             </a:r>
             <a:r>
               <a:rPr lang="en-US" sz="1200" dirty="0">
                 <a:latin typeface="Courier New" panose="02070309020205020404" pitchFamily="49" charset="0"/>
                 <a:cs typeface="Courier New" panose="02070309020205020404" pitchFamily="49" charset="0"/>
               </a:rPr>
-              <a:t>()         </a:t>
+              <a:t>()       </a:t>
             </a:r>
             <a:r>
               <a:rPr lang="en-US" sz="1200" dirty="0">
@@ -35092,7 +36402,7 @@
 </p:sld>
 </file>
 
-<file path=ppt/slides/slide57.xml><?xml version="1.0" encoding="utf-8"?>
+<file path=ppt/slides/slide58.xml><?xml version="1.0" encoding="utf-8"?>
 <p:sld xmlns:a="http://schemas.openxmlformats.org/drawingml/2006/main" xmlns:r="http://schemas.openxmlformats.org/officeDocument/2006/relationships" xmlns:p="http://schemas.openxmlformats.org/presentationml/2006/main">
   <p:cSld>
     <p:spTree>
@@ -35185,12 +36495,6 @@
             <a:pPr marL="0" indent="0">
               <a:buNone/>
             </a:pPr>
-            <a:endParaRPr lang="nl-NL" sz="2000" noProof="0" dirty="0"/>
-          </a:p>
-          <a:p>
-            <a:pPr marL="0" indent="0">
-              <a:buNone/>
-            </a:pPr>
             <a:r>
               <a:rPr lang="nl-NL" sz="2000" noProof="0" dirty="0">
                 <a:latin typeface="Courier New" panose="02070309020205020404" pitchFamily="49" charset="0"/>
@@ -35209,11 +36513,11 @@
             </a:pPr>
             <a:r>
               <a:rPr lang="nl-NL" sz="2000" noProof="0" dirty="0"/>
-              <a:t>Statische methodes</a:t>
+              <a:t>Methode</a:t>
             </a:r>
             <a:r>
               <a:rPr lang="nl-NL" sz="2000" dirty="0"/>
-              <a:t> waarin </a:t>
+              <a:t> waarin toegang tot </a:t>
             </a:r>
             <a:r>
               <a:rPr lang="nl-NL" sz="2000" dirty="0" err="1">
@@ -35224,7 +36528,7 @@
             </a:r>
             <a:r>
               <a:rPr lang="nl-NL" sz="2000" dirty="0"/>
-              <a:t> niet nodig / beschikbaar is.</a:t>
+              <a:t> niet nodig is.</a:t>
             </a:r>
             <a:endParaRPr lang="nl-NL" sz="2000" noProof="0" dirty="0"/>
           </a:p>
@@ -35256,7 +36560,7 @@
             </a:pPr>
             <a:r>
               <a:rPr lang="nl-NL" sz="2000" noProof="0" dirty="0"/>
-              <a:t>Methodes die met de class werken. Eerste argument verwijst naar de class zelf.</a:t>
+              <a:t>Methodes die op de class werken. Eerste argument verwijst naar de class zelf.</a:t>
             </a:r>
           </a:p>
         </p:txBody>
@@ -35530,35 +36834,35 @@
               <a:buNone/>
             </a:pPr>
             <a:r>
-              <a:rPr lang="nl-NL" sz="1400" b="1" dirty="0">
+              <a:rPr lang="nl-NL" sz="1400" dirty="0">
                 <a:latin typeface="Courier New" panose="02070309020205020404" pitchFamily="49" charset="0"/>
                 <a:cs typeface="Courier New" panose="02070309020205020404" pitchFamily="49" charset="0"/>
               </a:rPr>
               <a:t>  </a:t>
             </a:r>
             <a:r>
-              <a:rPr lang="nl-NL" sz="1400" b="1" dirty="0" err="1">
+              <a:rPr lang="nl-NL" sz="1400" dirty="0" err="1">
                 <a:latin typeface="Courier New" panose="02070309020205020404" pitchFamily="49" charset="0"/>
                 <a:cs typeface="Courier New" panose="02070309020205020404" pitchFamily="49" charset="0"/>
               </a:rPr>
               <a:t>def</a:t>
             </a:r>
             <a:r>
-              <a:rPr lang="nl-NL" sz="1400" b="1" dirty="0">
+              <a:rPr lang="nl-NL" sz="1400" dirty="0">
                 <a:latin typeface="Courier New" panose="02070309020205020404" pitchFamily="49" charset="0"/>
                 <a:cs typeface="Courier New" panose="02070309020205020404" pitchFamily="49" charset="0"/>
               </a:rPr>
               <a:t> _</a:t>
             </a:r>
             <a:r>
-              <a:rPr lang="nl-NL" sz="1400" b="1" dirty="0" err="1">
+              <a:rPr lang="nl-NL" sz="1400" dirty="0" err="1">
                 <a:latin typeface="Courier New" panose="02070309020205020404" pitchFamily="49" charset="0"/>
                 <a:cs typeface="Courier New" panose="02070309020205020404" pitchFamily="49" charset="0"/>
               </a:rPr>
               <a:t>is_valid_name</a:t>
             </a:r>
             <a:r>
-              <a:rPr lang="nl-NL" sz="1400" b="1" dirty="0">
+              <a:rPr lang="nl-NL" sz="1400" dirty="0">
                 <a:latin typeface="Courier New" panose="02070309020205020404" pitchFamily="49" charset="0"/>
                 <a:cs typeface="Courier New" panose="02070309020205020404" pitchFamily="49" charset="0"/>
               </a:rPr>
@@ -35690,56 +36994,56 @@
               <a:t>  </a:t>
             </a:r>
             <a:r>
+              <a:rPr lang="nl-NL" sz="1400" dirty="0" err="1">
+                <a:latin typeface="Courier New" panose="02070309020205020404" pitchFamily="49" charset="0"/>
+                <a:cs typeface="Courier New" panose="02070309020205020404" pitchFamily="49" charset="0"/>
+              </a:rPr>
+              <a:t>def</a:t>
+            </a:r>
+            <a:r>
+              <a:rPr lang="nl-NL" sz="1400" dirty="0">
+                <a:latin typeface="Courier New" panose="02070309020205020404" pitchFamily="49" charset="0"/>
+                <a:cs typeface="Courier New" panose="02070309020205020404" pitchFamily="49" charset="0"/>
+              </a:rPr>
+              <a:t> </a:t>
+            </a:r>
+            <a:r>
+              <a:rPr lang="nl-NL" sz="1400" dirty="0" err="1">
+                <a:latin typeface="Courier New" panose="02070309020205020404" pitchFamily="49" charset="0"/>
+                <a:cs typeface="Courier New" panose="02070309020205020404" pitchFamily="49" charset="0"/>
+              </a:rPr>
+              <a:t>from_str</a:t>
+            </a:r>
+            <a:r>
+              <a:rPr lang="nl-NL" sz="1400" dirty="0">
+                <a:latin typeface="Courier New" panose="02070309020205020404" pitchFamily="49" charset="0"/>
+                <a:cs typeface="Courier New" panose="02070309020205020404" pitchFamily="49" charset="0"/>
+              </a:rPr>
+              <a:t>(</a:t>
+            </a:r>
+            <a:r>
               <a:rPr lang="nl-NL" sz="1400" b="1" dirty="0" err="1">
                 <a:latin typeface="Courier New" panose="02070309020205020404" pitchFamily="49" charset="0"/>
                 <a:cs typeface="Courier New" panose="02070309020205020404" pitchFamily="49" charset="0"/>
               </a:rPr>
-              <a:t>def</a:t>
-            </a:r>
-            <a:r>
-              <a:rPr lang="nl-NL" sz="1400" b="1" dirty="0">
-                <a:latin typeface="Courier New" panose="02070309020205020404" pitchFamily="49" charset="0"/>
-                <a:cs typeface="Courier New" panose="02070309020205020404" pitchFamily="49" charset="0"/>
-              </a:rPr>
-              <a:t> </a:t>
-            </a:r>
-            <a:r>
-              <a:rPr lang="nl-NL" sz="1400" b="1" dirty="0" err="1">
-                <a:latin typeface="Courier New" panose="02070309020205020404" pitchFamily="49" charset="0"/>
-                <a:cs typeface="Courier New" panose="02070309020205020404" pitchFamily="49" charset="0"/>
-              </a:rPr>
-              <a:t>from_str</a:t>
-            </a:r>
-            <a:r>
-              <a:rPr lang="nl-NL" sz="1400" b="1" dirty="0">
-                <a:latin typeface="Courier New" panose="02070309020205020404" pitchFamily="49" charset="0"/>
-                <a:cs typeface="Courier New" panose="02070309020205020404" pitchFamily="49" charset="0"/>
-              </a:rPr>
-              <a:t>(</a:t>
-            </a:r>
-            <a:r>
-              <a:rPr lang="nl-NL" sz="1400" b="1" dirty="0" err="1">
-                <a:latin typeface="Courier New" panose="02070309020205020404" pitchFamily="49" charset="0"/>
-                <a:cs typeface="Courier New" panose="02070309020205020404" pitchFamily="49" charset="0"/>
-              </a:rPr>
               <a:t>cls</a:t>
             </a:r>
             <a:r>
-              <a:rPr lang="nl-NL" sz="1400" b="1" dirty="0">
+              <a:rPr lang="nl-NL" sz="1400" dirty="0">
                 <a:latin typeface="Courier New" panose="02070309020205020404" pitchFamily="49" charset="0"/>
                 <a:cs typeface="Courier New" panose="02070309020205020404" pitchFamily="49" charset="0"/>
               </a:rPr>
               <a:t>, </a:t>
             </a:r>
             <a:r>
-              <a:rPr lang="nl-NL" sz="1400" b="1" dirty="0" err="1">
+              <a:rPr lang="nl-NL" sz="1400" dirty="0" err="1">
                 <a:latin typeface="Courier New" panose="02070309020205020404" pitchFamily="49" charset="0"/>
                 <a:cs typeface="Courier New" panose="02070309020205020404" pitchFamily="49" charset="0"/>
               </a:rPr>
               <a:t>person_str</a:t>
             </a:r>
             <a:r>
-              <a:rPr lang="nl-NL" sz="1400" b="1" dirty="0">
+              <a:rPr lang="nl-NL" sz="1400" dirty="0">
                 <a:latin typeface="Courier New" panose="02070309020205020404" pitchFamily="49" charset="0"/>
                 <a:cs typeface="Courier New" panose="02070309020205020404" pitchFamily="49" charset="0"/>
               </a:rPr>
@@ -36115,427 +37419,6 @@
 </p:sld>
 </file>
 
-<file path=ppt/slides/slide58.xml><?xml version="1.0" encoding="utf-8"?>
-<p:sld xmlns:a="http://schemas.openxmlformats.org/drawingml/2006/main" xmlns:r="http://schemas.openxmlformats.org/officeDocument/2006/relationships" xmlns:p="http://schemas.openxmlformats.org/presentationml/2006/main">
-  <p:cSld>
-    <p:spTree>
-      <p:nvGrpSpPr>
-        <p:cNvPr id="1" name=""/>
-        <p:cNvGrpSpPr/>
-        <p:nvPr/>
-      </p:nvGrpSpPr>
-      <p:grpSpPr>
-        <a:xfrm>
-          <a:off x="0" y="0"/>
-          <a:ext cx="0" cy="0"/>
-          <a:chOff x="0" y="0"/>
-          <a:chExt cx="0" cy="0"/>
-        </a:xfrm>
-      </p:grpSpPr>
-      <p:sp>
-        <p:nvSpPr>
-          <p:cNvPr id="2" name="Title 1">
-            <a:extLst>
-              <a:ext uri="{FF2B5EF4-FFF2-40B4-BE49-F238E27FC236}">
-                <a16:creationId xmlns:a16="http://schemas.microsoft.com/office/drawing/2014/main" id="{39A1D606-8DD1-369C-5C09-471CDD551AD5}"/>
-              </a:ext>
-            </a:extLst>
-          </p:cNvPr>
-          <p:cNvSpPr>
-            <a:spLocks noGrp="1"/>
-          </p:cNvSpPr>
-          <p:nvPr>
-            <p:ph type="title"/>
-          </p:nvPr>
-        </p:nvSpPr>
-        <p:spPr>
-          <a:xfrm>
-            <a:off x="838200" y="365126"/>
-            <a:ext cx="10515600" cy="718608"/>
-          </a:xfrm>
-        </p:spPr>
-        <p:txBody>
-          <a:bodyPr>
-            <a:normAutofit/>
-          </a:bodyPr>
-          <a:lstStyle/>
-          <a:p>
-            <a:r>
-              <a:rPr lang="nl-NL" sz="3600" noProof="0" dirty="0"/>
-              <a:t>Oefeningen IV</a:t>
-            </a:r>
-          </a:p>
-        </p:txBody>
-      </p:sp>
-      <p:sp>
-        <p:nvSpPr>
-          <p:cNvPr id="3" name="Content Placeholder 2">
-            <a:extLst>
-              <a:ext uri="{FF2B5EF4-FFF2-40B4-BE49-F238E27FC236}">
-                <a16:creationId xmlns:a16="http://schemas.microsoft.com/office/drawing/2014/main" id="{F4C2D286-E049-0AAB-1360-B7157E11AD7E}"/>
-              </a:ext>
-            </a:extLst>
-          </p:cNvPr>
-          <p:cNvSpPr>
-            <a:spLocks noGrp="1"/>
-          </p:cNvSpPr>
-          <p:nvPr>
-            <p:ph idx="1"/>
-          </p:nvPr>
-        </p:nvSpPr>
-        <p:spPr>
-          <a:xfrm>
-            <a:off x="838200" y="1456267"/>
-            <a:ext cx="10375900" cy="4720696"/>
-          </a:xfrm>
-        </p:spPr>
-        <p:txBody>
-          <a:bodyPr>
-            <a:normAutofit/>
-          </a:bodyPr>
-          <a:lstStyle/>
-          <a:p>
-            <a:pPr marL="457200" indent="-457200">
-              <a:buFont typeface="Arial" panose="020B0604020202020204" pitchFamily="34" charset="0"/>
-              <a:buAutoNum type="arabicPeriod"/>
-            </a:pPr>
-            <a:r>
-              <a:rPr lang="nl-NL" sz="2000" dirty="0"/>
-              <a:t>Open Notebook </a:t>
-            </a:r>
-            <a:r>
-              <a:rPr lang="nl-NL" sz="2000" dirty="0" err="1">
-                <a:latin typeface="Courier New" panose="02070309020205020404" pitchFamily="49" charset="0"/>
-                <a:cs typeface="Courier New" panose="02070309020205020404" pitchFamily="49" charset="0"/>
-              </a:rPr>
-              <a:t>exercises</a:t>
-            </a:r>
-            <a:r>
-              <a:rPr lang="nl-NL" sz="2000" dirty="0">
-                <a:latin typeface="Courier New" panose="02070309020205020404" pitchFamily="49" charset="0"/>
-                <a:cs typeface="Courier New" panose="02070309020205020404" pitchFamily="49" charset="0"/>
-              </a:rPr>
-              <a:t>/4_fuzzy_dict.ipynb</a:t>
-            </a:r>
-          </a:p>
-          <a:p>
-            <a:pPr marL="457200" indent="-457200">
-              <a:buFont typeface="Arial" panose="020B0604020202020204" pitchFamily="34" charset="0"/>
-              <a:buAutoNum type="arabicPeriod"/>
-            </a:pPr>
-            <a:endParaRPr lang="nl-NL" sz="2000" dirty="0"/>
-          </a:p>
-          <a:p>
-            <a:pPr marL="457200" indent="-457200">
-              <a:buFont typeface="Arial" panose="020B0604020202020204" pitchFamily="34" charset="0"/>
-              <a:buAutoNum type="arabicPeriod"/>
-            </a:pPr>
-            <a:r>
-              <a:rPr lang="nl-NL" sz="2000" dirty="0" err="1">
-                <a:latin typeface="Courier New" panose="02070309020205020404" pitchFamily="49" charset="0"/>
-                <a:cs typeface="Courier New" panose="02070309020205020404" pitchFamily="49" charset="0"/>
-              </a:rPr>
-              <a:t>FuzzyDict</a:t>
-            </a:r>
-            <a:r>
-              <a:rPr lang="nl-NL" sz="2000" dirty="0">
-                <a:latin typeface="Courier New" panose="02070309020205020404" pitchFamily="49" charset="0"/>
-                <a:cs typeface="Courier New" panose="02070309020205020404" pitchFamily="49" charset="0"/>
-              </a:rPr>
-              <a:t>;</a:t>
-            </a:r>
-            <a:r>
-              <a:rPr lang="nl-NL" sz="2000" dirty="0"/>
-              <a:t> </a:t>
-            </a:r>
-            <a:r>
-              <a:rPr lang="nl-NL" sz="2000" dirty="0" err="1"/>
-              <a:t>dict</a:t>
-            </a:r>
-            <a:r>
-              <a:rPr lang="nl-NL" sz="2000" dirty="0"/>
-              <a:t> dat niet hoofdlettergevoelig is:</a:t>
-            </a:r>
-          </a:p>
-          <a:p>
-            <a:pPr lvl="1"/>
-            <a:r>
-              <a:rPr lang="nl-NL" sz="2000" dirty="0" err="1">
-                <a:latin typeface="Courier New" panose="02070309020205020404" pitchFamily="49" charset="0"/>
-                <a:cs typeface="Courier New" panose="02070309020205020404" pitchFamily="49" charset="0"/>
-              </a:rPr>
-              <a:t>fuzzydict</a:t>
-            </a:r>
-            <a:r>
-              <a:rPr lang="nl-NL" sz="2000" dirty="0">
-                <a:latin typeface="Courier New" panose="02070309020205020404" pitchFamily="49" charset="0"/>
-                <a:cs typeface="Courier New" panose="02070309020205020404" pitchFamily="49" charset="0"/>
-              </a:rPr>
-              <a:t>[</a:t>
-            </a:r>
-            <a:r>
-              <a:rPr lang="nl-NL" sz="2000" dirty="0">
-                <a:solidFill>
-                  <a:schemeClr val="accent2">
-                    <a:lumMod val="75000"/>
-                  </a:schemeClr>
-                </a:solidFill>
-                <a:latin typeface="Courier New" panose="02070309020205020404" pitchFamily="49" charset="0"/>
-                <a:cs typeface="Courier New" panose="02070309020205020404" pitchFamily="49" charset="0"/>
-              </a:rPr>
-              <a:t>"NAAM"</a:t>
-            </a:r>
-            <a:r>
-              <a:rPr lang="nl-NL" sz="2000" dirty="0">
-                <a:latin typeface="Courier New" panose="02070309020205020404" pitchFamily="49" charset="0"/>
-                <a:cs typeface="Courier New" panose="02070309020205020404" pitchFamily="49" charset="0"/>
-              </a:rPr>
-              <a:t>]</a:t>
-            </a:r>
-            <a:r>
-              <a:rPr lang="nl-NL" sz="2000" dirty="0"/>
-              <a:t> is gelijk aan </a:t>
-            </a:r>
-            <a:r>
-              <a:rPr lang="nl-NL" sz="2000" dirty="0" err="1">
-                <a:latin typeface="Courier New" panose="02070309020205020404" pitchFamily="49" charset="0"/>
-                <a:cs typeface="Courier New" panose="02070309020205020404" pitchFamily="49" charset="0"/>
-              </a:rPr>
-              <a:t>fuzzydict</a:t>
-            </a:r>
-            <a:r>
-              <a:rPr lang="nl-NL" sz="2000" dirty="0">
-                <a:latin typeface="Courier New" panose="02070309020205020404" pitchFamily="49" charset="0"/>
-                <a:cs typeface="Courier New" panose="02070309020205020404" pitchFamily="49" charset="0"/>
-              </a:rPr>
-              <a:t>[</a:t>
-            </a:r>
-            <a:r>
-              <a:rPr lang="nl-NL" sz="2000" dirty="0">
-                <a:solidFill>
-                  <a:schemeClr val="accent2">
-                    <a:lumMod val="75000"/>
-                  </a:schemeClr>
-                </a:solidFill>
-                <a:latin typeface="Courier New" panose="02070309020205020404" pitchFamily="49" charset="0"/>
-                <a:cs typeface="Courier New" panose="02070309020205020404" pitchFamily="49" charset="0"/>
-              </a:rPr>
-              <a:t>"naam"</a:t>
-            </a:r>
-            <a:r>
-              <a:rPr lang="nl-NL" sz="2000" dirty="0">
-                <a:latin typeface="Courier New" panose="02070309020205020404" pitchFamily="49" charset="0"/>
-                <a:cs typeface="Courier New" panose="02070309020205020404" pitchFamily="49" charset="0"/>
-              </a:rPr>
-              <a:t>]</a:t>
-            </a:r>
-            <a:r>
-              <a:rPr lang="nl-NL" sz="2000" dirty="0">
-                <a:cs typeface="Courier New" panose="02070309020205020404" pitchFamily="49" charset="0"/>
-              </a:rPr>
-              <a:t>.</a:t>
-            </a:r>
-            <a:endParaRPr lang="nl-NL" sz="2000" dirty="0"/>
-          </a:p>
-          <a:p>
-            <a:pPr lvl="1"/>
-            <a:r>
-              <a:rPr lang="nl-NL" sz="2000" dirty="0">
-                <a:cs typeface="Courier New" panose="02070309020205020404" pitchFamily="49" charset="0"/>
-              </a:rPr>
-              <a:t>Zowel bij ophalen als wegschrijven van waardes.</a:t>
-            </a:r>
-            <a:endParaRPr lang="nl-NL" sz="2000" dirty="0"/>
-          </a:p>
-          <a:p>
-            <a:pPr marL="457200" indent="-457200">
-              <a:buFont typeface="Arial" panose="020B0604020202020204" pitchFamily="34" charset="0"/>
-              <a:buAutoNum type="arabicPeriod"/>
-            </a:pPr>
-            <a:endParaRPr lang="nl-NL" sz="2000" dirty="0"/>
-          </a:p>
-          <a:p>
-            <a:pPr marL="457200" indent="-457200">
-              <a:buFont typeface="Arial" panose="020B0604020202020204" pitchFamily="34" charset="0"/>
-              <a:buAutoNum type="arabicPeriod"/>
-            </a:pPr>
-            <a:r>
-              <a:rPr lang="nl-NL" sz="2000" dirty="0"/>
-              <a:t>Gebruik:</a:t>
-            </a:r>
-          </a:p>
-          <a:p>
-            <a:pPr marL="0" indent="0">
-              <a:buNone/>
-            </a:pPr>
-            <a:r>
-              <a:rPr lang="nl-NL" sz="2000" dirty="0">
-                <a:latin typeface="Courier New" panose="02070309020205020404" pitchFamily="49" charset="0"/>
-                <a:cs typeface="Courier New" panose="02070309020205020404" pitchFamily="49" charset="0"/>
-              </a:rPr>
-              <a:t>   __</a:t>
-            </a:r>
-            <a:r>
-              <a:rPr lang="nl-NL" sz="2000" dirty="0" err="1">
-                <a:latin typeface="Courier New" panose="02070309020205020404" pitchFamily="49" charset="0"/>
-                <a:cs typeface="Courier New" panose="02070309020205020404" pitchFamily="49" charset="0"/>
-              </a:rPr>
-              <a:t>getitem</a:t>
-            </a:r>
-            <a:r>
-              <a:rPr lang="nl-NL" sz="2000" dirty="0">
-                <a:latin typeface="Courier New" panose="02070309020205020404" pitchFamily="49" charset="0"/>
-                <a:cs typeface="Courier New" panose="02070309020205020404" pitchFamily="49" charset="0"/>
-              </a:rPr>
-              <a:t>__</a:t>
-            </a:r>
-            <a:r>
-              <a:rPr lang="nl-NL" sz="2000" dirty="0"/>
-              <a:t> om waardes op te halen.</a:t>
-            </a:r>
-          </a:p>
-          <a:p>
-            <a:pPr marL="0" indent="0">
-              <a:buNone/>
-            </a:pPr>
-            <a:r>
-              <a:rPr lang="nl-NL" sz="2000" dirty="0">
-                <a:latin typeface="Courier New" panose="02070309020205020404" pitchFamily="49" charset="0"/>
-                <a:cs typeface="Courier New" panose="02070309020205020404" pitchFamily="49" charset="0"/>
-              </a:rPr>
-              <a:t>   __</a:t>
-            </a:r>
-            <a:r>
-              <a:rPr lang="nl-NL" sz="2000" dirty="0" err="1">
-                <a:latin typeface="Courier New" panose="02070309020205020404" pitchFamily="49" charset="0"/>
-                <a:cs typeface="Courier New" panose="02070309020205020404" pitchFamily="49" charset="0"/>
-              </a:rPr>
-              <a:t>setitem</a:t>
-            </a:r>
-            <a:r>
-              <a:rPr lang="nl-NL" sz="2000" dirty="0">
-                <a:latin typeface="Courier New" panose="02070309020205020404" pitchFamily="49" charset="0"/>
-                <a:cs typeface="Courier New" panose="02070309020205020404" pitchFamily="49" charset="0"/>
-              </a:rPr>
-              <a:t>__</a:t>
-            </a:r>
-            <a:r>
-              <a:rPr lang="nl-NL" sz="2000" dirty="0"/>
-              <a:t> om waardes op te slaan.</a:t>
-            </a:r>
-          </a:p>
-          <a:p>
-            <a:pPr marL="0" indent="0">
-              <a:buNone/>
-            </a:pPr>
-            <a:endParaRPr lang="nl-NL" sz="2000" dirty="0"/>
-          </a:p>
-          <a:p>
-            <a:pPr marL="457200" indent="-457200">
-              <a:buAutoNum type="arabicPeriod" startAt="4"/>
-            </a:pPr>
-            <a:r>
-              <a:rPr lang="nl-NL" sz="2000" dirty="0"/>
-              <a:t>Bonus voor implementeren van methodes:</a:t>
-            </a:r>
-          </a:p>
-          <a:p>
-            <a:pPr marL="0" indent="0">
-              <a:buNone/>
-            </a:pPr>
-            <a:r>
-              <a:rPr lang="nl-NL" sz="2000" dirty="0">
-                <a:latin typeface="Courier New" panose="02070309020205020404" pitchFamily="49" charset="0"/>
-                <a:cs typeface="Courier New" panose="02070309020205020404" pitchFamily="49" charset="0"/>
-              </a:rPr>
-              <a:t>   __</a:t>
-            </a:r>
-            <a:r>
-              <a:rPr lang="nl-NL" sz="2000" dirty="0" err="1">
-                <a:latin typeface="Courier New" panose="02070309020205020404" pitchFamily="49" charset="0"/>
-                <a:cs typeface="Courier New" panose="02070309020205020404" pitchFamily="49" charset="0"/>
-              </a:rPr>
-              <a:t>str</a:t>
-            </a:r>
-            <a:r>
-              <a:rPr lang="nl-NL" sz="2000" dirty="0">
-                <a:latin typeface="Courier New" panose="02070309020205020404" pitchFamily="49" charset="0"/>
-                <a:cs typeface="Courier New" panose="02070309020205020404" pitchFamily="49" charset="0"/>
-              </a:rPr>
-              <a:t>__, __</a:t>
-            </a:r>
-            <a:r>
-              <a:rPr lang="nl-NL" sz="2000" dirty="0" err="1">
-                <a:latin typeface="Courier New" panose="02070309020205020404" pitchFamily="49" charset="0"/>
-                <a:cs typeface="Courier New" panose="02070309020205020404" pitchFamily="49" charset="0"/>
-              </a:rPr>
-              <a:t>repr</a:t>
-            </a:r>
-            <a:r>
-              <a:rPr lang="nl-NL" sz="2000" dirty="0">
-                <a:latin typeface="Courier New" panose="02070309020205020404" pitchFamily="49" charset="0"/>
-                <a:cs typeface="Courier New" panose="02070309020205020404" pitchFamily="49" charset="0"/>
-              </a:rPr>
-              <a:t>__, __</a:t>
-            </a:r>
-            <a:r>
-              <a:rPr lang="nl-NL" sz="2000" dirty="0" err="1">
-                <a:latin typeface="Courier New" panose="02070309020205020404" pitchFamily="49" charset="0"/>
-                <a:cs typeface="Courier New" panose="02070309020205020404" pitchFamily="49" charset="0"/>
-              </a:rPr>
-              <a:t>len</a:t>
-            </a:r>
-            <a:r>
-              <a:rPr lang="nl-NL" sz="2000" dirty="0">
-                <a:latin typeface="Courier New" panose="02070309020205020404" pitchFamily="49" charset="0"/>
-                <a:cs typeface="Courier New" panose="02070309020205020404" pitchFamily="49" charset="0"/>
-              </a:rPr>
-              <a:t>__, </a:t>
-            </a:r>
-            <a:r>
-              <a:rPr lang="nl-NL" sz="2000" dirty="0" err="1">
-                <a:latin typeface="Courier New" panose="02070309020205020404" pitchFamily="49" charset="0"/>
-                <a:cs typeface="Courier New" panose="02070309020205020404" pitchFamily="49" charset="0"/>
-              </a:rPr>
-              <a:t>keys</a:t>
-            </a:r>
-            <a:r>
-              <a:rPr lang="nl-NL" sz="2000" dirty="0">
-                <a:latin typeface="Courier New" panose="02070309020205020404" pitchFamily="49" charset="0"/>
-                <a:cs typeface="Courier New" panose="02070309020205020404" pitchFamily="49" charset="0"/>
-              </a:rPr>
-              <a:t>, </a:t>
-            </a:r>
-            <a:r>
-              <a:rPr lang="nl-NL" sz="2000" dirty="0" err="1">
-                <a:latin typeface="Courier New" panose="02070309020205020404" pitchFamily="49" charset="0"/>
-                <a:cs typeface="Courier New" panose="02070309020205020404" pitchFamily="49" charset="0"/>
-              </a:rPr>
-              <a:t>values</a:t>
-            </a:r>
-            <a:r>
-              <a:rPr lang="nl-NL" sz="2000" dirty="0">
-                <a:latin typeface="Courier New" panose="02070309020205020404" pitchFamily="49" charset="0"/>
-                <a:cs typeface="Courier New" panose="02070309020205020404" pitchFamily="49" charset="0"/>
-              </a:rPr>
-              <a:t>, items</a:t>
-            </a:r>
-          </a:p>
-        </p:txBody>
-      </p:sp>
-    </p:spTree>
-    <p:extLst>
-      <p:ext uri="{BB962C8B-B14F-4D97-AF65-F5344CB8AC3E}">
-        <p14:creationId xmlns:p14="http://schemas.microsoft.com/office/powerpoint/2010/main" val="4287688984"/>
-      </p:ext>
-    </p:extLst>
-  </p:cSld>
-  <p:clrMapOvr>
-    <a:masterClrMapping/>
-  </p:clrMapOvr>
-</p:sld>
-</file>
-
 <file path=ppt/slides/slide59.xml><?xml version="1.0" encoding="utf-8"?>
 <p:sld xmlns:a="http://schemas.openxmlformats.org/drawingml/2006/main" xmlns:r="http://schemas.openxmlformats.org/officeDocument/2006/relationships" xmlns:p="http://schemas.openxmlformats.org/presentationml/2006/main">
   <p:cSld>
@@ -36583,143 +37466,17 @@
           <a:p>
             <a:r>
               <a:rPr lang="nl-NL" sz="3600" noProof="0" dirty="0"/>
-              <a:t>Overerving</a:t>
+              <a:t>Oefeningen IV</a:t>
             </a:r>
           </a:p>
         </p:txBody>
       </p:sp>
       <p:sp>
         <p:nvSpPr>
-          <p:cNvPr id="8" name="Rectangle 7">
+          <p:cNvPr id="3" name="Content Placeholder 2">
             <a:extLst>
               <a:ext uri="{FF2B5EF4-FFF2-40B4-BE49-F238E27FC236}">
-                <a16:creationId xmlns:a16="http://schemas.microsoft.com/office/drawing/2014/main" id="{8F8A90BB-468A-6D0A-002C-262602B18B4B}"/>
-              </a:ext>
-            </a:extLst>
-          </p:cNvPr>
-          <p:cNvSpPr/>
-          <p:nvPr/>
-        </p:nvSpPr>
-        <p:spPr>
-          <a:xfrm>
-            <a:off x="8119533" y="724430"/>
-            <a:ext cx="2368547" cy="2189973"/>
-          </a:xfrm>
-          <a:prstGeom prst="rect">
-            <a:avLst/>
-          </a:prstGeom>
-        </p:spPr>
-        <p:style>
-          <a:lnRef idx="1">
-            <a:schemeClr val="accent3"/>
-          </a:lnRef>
-          <a:fillRef idx="2">
-            <a:schemeClr val="accent3"/>
-          </a:fillRef>
-          <a:effectRef idx="1">
-            <a:schemeClr val="accent3"/>
-          </a:effectRef>
-          <a:fontRef idx="minor">
-            <a:schemeClr val="dk1"/>
-          </a:fontRef>
-        </p:style>
-        <p:txBody>
-          <a:bodyPr lIns="180000" tIns="180000" rIns="180000" bIns="180000" rtlCol="0" anchor="t"/>
-          <a:lstStyle/>
-          <a:p>
-            <a:pPr algn="ctr"/>
-            <a:r>
-              <a:rPr lang="nl-NL" sz="1400" b="1" dirty="0" err="1">
-                <a:latin typeface="Courier New" panose="02070309020205020404" pitchFamily="49" charset="0"/>
-                <a:cs typeface="Courier New" panose="02070309020205020404" pitchFamily="49" charset="0"/>
-              </a:rPr>
-              <a:t>TextReader</a:t>
-            </a:r>
-            <a:endParaRPr lang="nl-NL" sz="1400" b="1" dirty="0">
-              <a:latin typeface="Courier New" panose="02070309020205020404" pitchFamily="49" charset="0"/>
-              <a:cs typeface="Courier New" panose="02070309020205020404" pitchFamily="49" charset="0"/>
-            </a:endParaRPr>
-          </a:p>
-          <a:p>
-            <a:endParaRPr lang="nl-NL" sz="1400" dirty="0">
-              <a:latin typeface="Courier New" panose="02070309020205020404" pitchFamily="49" charset="0"/>
-              <a:cs typeface="Courier New" panose="02070309020205020404" pitchFamily="49" charset="0"/>
-            </a:endParaRPr>
-          </a:p>
-          <a:p>
-            <a:r>
-              <a:rPr lang="nl-NL" sz="1400" dirty="0">
-                <a:latin typeface="Courier New" panose="02070309020205020404" pitchFamily="49" charset="0"/>
-                <a:cs typeface="Courier New" panose="02070309020205020404" pitchFamily="49" charset="0"/>
-              </a:rPr>
-              <a:t>- </a:t>
-            </a:r>
-            <a:r>
-              <a:rPr lang="nl-NL" sz="1400" dirty="0" err="1">
-                <a:latin typeface="Courier New" panose="02070309020205020404" pitchFamily="49" charset="0"/>
-                <a:cs typeface="Courier New" panose="02070309020205020404" pitchFamily="49" charset="0"/>
-              </a:rPr>
-              <a:t>file_path</a:t>
-            </a:r>
-            <a:endParaRPr lang="nl-NL" sz="1400" dirty="0">
-              <a:latin typeface="Courier New" panose="02070309020205020404" pitchFamily="49" charset="0"/>
-              <a:cs typeface="Courier New" panose="02070309020205020404" pitchFamily="49" charset="0"/>
-            </a:endParaRPr>
-          </a:p>
-          <a:p>
-            <a:r>
-              <a:rPr lang="nl-NL" sz="1400" dirty="0">
-                <a:latin typeface="Courier New" panose="02070309020205020404" pitchFamily="49" charset="0"/>
-                <a:cs typeface="Courier New" panose="02070309020205020404" pitchFamily="49" charset="0"/>
-              </a:rPr>
-              <a:t>- </a:t>
-            </a:r>
-            <a:r>
-              <a:rPr lang="nl-NL" sz="1400" dirty="0" err="1">
-                <a:latin typeface="Courier New" panose="02070309020205020404" pitchFamily="49" charset="0"/>
-                <a:cs typeface="Courier New" panose="02070309020205020404" pitchFamily="49" charset="0"/>
-              </a:rPr>
-              <a:t>read</a:t>
-            </a:r>
-            <a:r>
-              <a:rPr lang="nl-NL" sz="1400" dirty="0">
-                <a:latin typeface="Courier New" panose="02070309020205020404" pitchFamily="49" charset="0"/>
-                <a:cs typeface="Courier New" panose="02070309020205020404" pitchFamily="49" charset="0"/>
-              </a:rPr>
-              <a:t>()</a:t>
-            </a:r>
-          </a:p>
-          <a:p>
-            <a:r>
-              <a:rPr lang="nl-NL" sz="1400" dirty="0">
-                <a:latin typeface="Courier New" panose="02070309020205020404" pitchFamily="49" charset="0"/>
-                <a:cs typeface="Courier New" panose="02070309020205020404" pitchFamily="49" charset="0"/>
-              </a:rPr>
-              <a:t>- </a:t>
-            </a:r>
-            <a:r>
-              <a:rPr lang="nl-NL" sz="1400" dirty="0" err="1">
-                <a:latin typeface="Courier New" panose="02070309020205020404" pitchFamily="49" charset="0"/>
-                <a:cs typeface="Courier New" panose="02070309020205020404" pitchFamily="49" charset="0"/>
-              </a:rPr>
-              <a:t>write</a:t>
-            </a:r>
-            <a:r>
-              <a:rPr lang="nl-NL" sz="1400" dirty="0">
-                <a:latin typeface="Courier New" panose="02070309020205020404" pitchFamily="49" charset="0"/>
-                <a:cs typeface="Courier New" panose="02070309020205020404" pitchFamily="49" charset="0"/>
-              </a:rPr>
-              <a:t>()</a:t>
-            </a:r>
-          </a:p>
-        </p:txBody>
-      </p:sp>
-      <p:sp>
-        <p:nvSpPr>
-          <p:cNvPr id="39" name="Content Placeholder 2">
-            <a:extLst>
-              <a:ext uri="{FF2B5EF4-FFF2-40B4-BE49-F238E27FC236}">
-                <a16:creationId xmlns:a16="http://schemas.microsoft.com/office/drawing/2014/main" id="{0D9BB673-766C-2B9E-E2A1-0A38CF168E71}"/>
+                <a16:creationId xmlns:a16="http://schemas.microsoft.com/office/drawing/2014/main" id="{F4C2D286-E049-0AAB-1360-B7157E11AD7E}"/>
               </a:ext>
             </a:extLst>
           </p:cNvPr>
@@ -36733,7 +37490,7 @@
         <p:spPr>
           <a:xfrm>
             <a:off x="838200" y="1456267"/>
-            <a:ext cx="4940300" cy="4720696"/>
+            <a:ext cx="10375900" cy="4720696"/>
           </a:xfrm>
         </p:spPr>
         <p:txBody>
@@ -36742,42 +37499,330 @@
           </a:bodyPr>
           <a:lstStyle/>
           <a:p>
-            <a:pPr marL="0" indent="0">
-              <a:buNone/>
-            </a:pPr>
-            <a:r>
-              <a:rPr lang="nl-NL" sz="1800" noProof="0" dirty="0"/>
-              <a:t>Overerving: eigenschappen overnemen van een andere class.</a:t>
-            </a:r>
-          </a:p>
-          <a:p>
-            <a:pPr marL="0" indent="0">
-              <a:buNone/>
-            </a:pPr>
-            <a:endParaRPr lang="nl-NL" sz="1800" dirty="0"/>
-          </a:p>
-          <a:p>
-            <a:pPr marL="0" indent="0">
-              <a:buNone/>
-            </a:pPr>
-            <a:r>
-              <a:rPr lang="nl-NL" sz="1800" noProof="0" dirty="0" err="1">
-                <a:latin typeface="Courier New" panose="02070309020205020404" pitchFamily="49" charset="0"/>
-                <a:cs typeface="Courier New" panose="02070309020205020404" pitchFamily="49" charset="0"/>
-              </a:rPr>
-              <a:t>TextReader</a:t>
-            </a:r>
-            <a:r>
-              <a:rPr lang="nl-NL" sz="1800" noProof="0" dirty="0"/>
-              <a:t> is een </a:t>
-            </a:r>
-            <a:r>
-              <a:rPr lang="nl-NL" sz="1800" u="sng" noProof="0" dirty="0"/>
-              <a:t>basis class</a:t>
-            </a:r>
-            <a:r>
-              <a:rPr lang="nl-NL" sz="1800" noProof="0" dirty="0"/>
-              <a:t> en bevat methodes om tekstbestanden te verwerken.</a:t>
+            <a:pPr marL="457200" indent="-457200">
+              <a:buFont typeface="Arial" panose="020B0604020202020204" pitchFamily="34" charset="0"/>
+              <a:buAutoNum type="arabicPeriod"/>
+            </a:pPr>
+            <a:r>
+              <a:rPr lang="nl-NL" sz="2000" dirty="0"/>
+              <a:t>Open Notebook </a:t>
+            </a:r>
+            <a:r>
+              <a:rPr lang="nl-NL" sz="2000" dirty="0" err="1">
+                <a:latin typeface="Courier New" panose="02070309020205020404" pitchFamily="49" charset="0"/>
+                <a:cs typeface="Courier New" panose="02070309020205020404" pitchFamily="49" charset="0"/>
+              </a:rPr>
+              <a:t>exercises</a:t>
+            </a:r>
+            <a:r>
+              <a:rPr lang="nl-NL" sz="2000" dirty="0">
+                <a:latin typeface="Courier New" panose="02070309020205020404" pitchFamily="49" charset="0"/>
+                <a:cs typeface="Courier New" panose="02070309020205020404" pitchFamily="49" charset="0"/>
+              </a:rPr>
+              <a:t>/4_fuzzy_dict.ipynb</a:t>
+            </a:r>
+          </a:p>
+          <a:p>
+            <a:pPr marL="457200" indent="-457200">
+              <a:buFont typeface="Arial" panose="020B0604020202020204" pitchFamily="34" charset="0"/>
+              <a:buAutoNum type="arabicPeriod"/>
+            </a:pPr>
+            <a:endParaRPr lang="nl-NL" sz="2000" dirty="0"/>
+          </a:p>
+          <a:p>
+            <a:pPr marL="457200" indent="-457200">
+              <a:buFont typeface="Arial" panose="020B0604020202020204" pitchFamily="34" charset="0"/>
+              <a:buAutoNum type="arabicPeriod"/>
+            </a:pPr>
+            <a:r>
+              <a:rPr lang="nl-NL" sz="2000" dirty="0" err="1">
+                <a:latin typeface="Courier New" panose="02070309020205020404" pitchFamily="49" charset="0"/>
+                <a:cs typeface="Courier New" panose="02070309020205020404" pitchFamily="49" charset="0"/>
+              </a:rPr>
+              <a:t>FuzzyDict</a:t>
+            </a:r>
+            <a:r>
+              <a:rPr lang="nl-NL" sz="2000" dirty="0">
+                <a:latin typeface="Courier New" panose="02070309020205020404" pitchFamily="49" charset="0"/>
+                <a:cs typeface="Courier New" panose="02070309020205020404" pitchFamily="49" charset="0"/>
+              </a:rPr>
+              <a:t>;</a:t>
+            </a:r>
+            <a:r>
+              <a:rPr lang="nl-NL" sz="2000" dirty="0"/>
+              <a:t> </a:t>
+            </a:r>
+            <a:r>
+              <a:rPr lang="nl-NL" sz="2000" dirty="0" err="1"/>
+              <a:t>dict</a:t>
+            </a:r>
+            <a:r>
+              <a:rPr lang="nl-NL" sz="2000" dirty="0"/>
+              <a:t> dat niet hoofdlettergevoelig is:</a:t>
+            </a:r>
+          </a:p>
+          <a:p>
+            <a:pPr lvl="1"/>
+            <a:r>
+              <a:rPr lang="nl-NL" sz="2000" dirty="0" err="1">
+                <a:latin typeface="Courier New" panose="02070309020205020404" pitchFamily="49" charset="0"/>
+                <a:cs typeface="Courier New" panose="02070309020205020404" pitchFamily="49" charset="0"/>
+              </a:rPr>
+              <a:t>fuzzydict</a:t>
+            </a:r>
+            <a:r>
+              <a:rPr lang="nl-NL" sz="2000" dirty="0">
+                <a:latin typeface="Courier New" panose="02070309020205020404" pitchFamily="49" charset="0"/>
+                <a:cs typeface="Courier New" panose="02070309020205020404" pitchFamily="49" charset="0"/>
+              </a:rPr>
+              <a:t>[</a:t>
+            </a:r>
+            <a:r>
+              <a:rPr lang="nl-NL" sz="2000" dirty="0">
+                <a:solidFill>
+                  <a:schemeClr val="accent2">
+                    <a:lumMod val="75000"/>
+                  </a:schemeClr>
+                </a:solidFill>
+                <a:latin typeface="Courier New" panose="02070309020205020404" pitchFamily="49" charset="0"/>
+                <a:cs typeface="Courier New" panose="02070309020205020404" pitchFamily="49" charset="0"/>
+              </a:rPr>
+              <a:t>"NAAM"</a:t>
+            </a:r>
+            <a:r>
+              <a:rPr lang="nl-NL" sz="2000" dirty="0">
+                <a:latin typeface="Courier New" panose="02070309020205020404" pitchFamily="49" charset="0"/>
+                <a:cs typeface="Courier New" panose="02070309020205020404" pitchFamily="49" charset="0"/>
+              </a:rPr>
+              <a:t>]</a:t>
+            </a:r>
+            <a:r>
+              <a:rPr lang="nl-NL" sz="2000" dirty="0"/>
+              <a:t> is gelijk aan </a:t>
+            </a:r>
+            <a:r>
+              <a:rPr lang="nl-NL" sz="2000" dirty="0" err="1">
+                <a:latin typeface="Courier New" panose="02070309020205020404" pitchFamily="49" charset="0"/>
+                <a:cs typeface="Courier New" panose="02070309020205020404" pitchFamily="49" charset="0"/>
+              </a:rPr>
+              <a:t>fuzzydict</a:t>
+            </a:r>
+            <a:r>
+              <a:rPr lang="nl-NL" sz="2000" dirty="0">
+                <a:latin typeface="Courier New" panose="02070309020205020404" pitchFamily="49" charset="0"/>
+                <a:cs typeface="Courier New" panose="02070309020205020404" pitchFamily="49" charset="0"/>
+              </a:rPr>
+              <a:t>[</a:t>
+            </a:r>
+            <a:r>
+              <a:rPr lang="nl-NL" sz="2000" dirty="0">
+                <a:solidFill>
+                  <a:schemeClr val="accent2">
+                    <a:lumMod val="75000"/>
+                  </a:schemeClr>
+                </a:solidFill>
+                <a:latin typeface="Courier New" panose="02070309020205020404" pitchFamily="49" charset="0"/>
+                <a:cs typeface="Courier New" panose="02070309020205020404" pitchFamily="49" charset="0"/>
+              </a:rPr>
+              <a:t>"naam"</a:t>
+            </a:r>
+            <a:r>
+              <a:rPr lang="nl-NL" sz="2000" dirty="0">
+                <a:latin typeface="Courier New" panose="02070309020205020404" pitchFamily="49" charset="0"/>
+                <a:cs typeface="Courier New" panose="02070309020205020404" pitchFamily="49" charset="0"/>
+              </a:rPr>
+              <a:t>]</a:t>
+            </a:r>
+            <a:r>
+              <a:rPr lang="nl-NL" sz="2000" dirty="0">
+                <a:cs typeface="Courier New" panose="02070309020205020404" pitchFamily="49" charset="0"/>
+              </a:rPr>
+              <a:t>.</a:t>
+            </a:r>
+            <a:endParaRPr lang="nl-NL" sz="2000" dirty="0"/>
+          </a:p>
+          <a:p>
+            <a:pPr lvl="1"/>
+            <a:r>
+              <a:rPr lang="nl-NL" sz="2000" dirty="0">
+                <a:cs typeface="Courier New" panose="02070309020205020404" pitchFamily="49" charset="0"/>
+              </a:rPr>
+              <a:t>Zowel bij ophalen als wegschrijven van waardes.</a:t>
+            </a:r>
+            <a:endParaRPr lang="nl-NL" sz="2000" dirty="0"/>
+          </a:p>
+          <a:p>
+            <a:pPr marL="457200" indent="-457200">
+              <a:buFont typeface="Arial" panose="020B0604020202020204" pitchFamily="34" charset="0"/>
+              <a:buAutoNum type="arabicPeriod"/>
+            </a:pPr>
+            <a:endParaRPr lang="nl-NL" sz="2000" dirty="0"/>
+          </a:p>
+          <a:p>
+            <a:pPr marL="457200" indent="-457200">
+              <a:buFont typeface="Arial" panose="020B0604020202020204" pitchFamily="34" charset="0"/>
+              <a:buAutoNum type="arabicPeriod"/>
+            </a:pPr>
+            <a:r>
+              <a:rPr lang="nl-NL" sz="2000" dirty="0"/>
+              <a:t>Gebruik:</a:t>
+            </a:r>
+          </a:p>
+          <a:p>
+            <a:pPr marL="0" indent="0">
+              <a:buNone/>
+            </a:pPr>
+            <a:r>
+              <a:rPr lang="nl-NL" sz="2000" dirty="0">
+                <a:latin typeface="Courier New" panose="02070309020205020404" pitchFamily="49" charset="0"/>
+                <a:cs typeface="Courier New" panose="02070309020205020404" pitchFamily="49" charset="0"/>
+              </a:rPr>
+              <a:t>   __</a:t>
+            </a:r>
+            <a:r>
+              <a:rPr lang="nl-NL" sz="2000" dirty="0" err="1">
+                <a:latin typeface="Courier New" panose="02070309020205020404" pitchFamily="49" charset="0"/>
+                <a:cs typeface="Courier New" panose="02070309020205020404" pitchFamily="49" charset="0"/>
+              </a:rPr>
+              <a:t>getitem</a:t>
+            </a:r>
+            <a:r>
+              <a:rPr lang="nl-NL" sz="2000" dirty="0">
+                <a:latin typeface="Courier New" panose="02070309020205020404" pitchFamily="49" charset="0"/>
+                <a:cs typeface="Courier New" panose="02070309020205020404" pitchFamily="49" charset="0"/>
+              </a:rPr>
+              <a:t>__</a:t>
+            </a:r>
+            <a:r>
+              <a:rPr lang="nl-NL" sz="2000" dirty="0"/>
+              <a:t> om waardes op te halen.</a:t>
+            </a:r>
+          </a:p>
+          <a:p>
+            <a:pPr marL="0" indent="0">
+              <a:buNone/>
+            </a:pPr>
+            <a:r>
+              <a:rPr lang="nl-NL" sz="2000" dirty="0">
+                <a:latin typeface="Courier New" panose="02070309020205020404" pitchFamily="49" charset="0"/>
+                <a:cs typeface="Courier New" panose="02070309020205020404" pitchFamily="49" charset="0"/>
+              </a:rPr>
+              <a:t>   __</a:t>
+            </a:r>
+            <a:r>
+              <a:rPr lang="nl-NL" sz="2000" dirty="0" err="1">
+                <a:latin typeface="Courier New" panose="02070309020205020404" pitchFamily="49" charset="0"/>
+                <a:cs typeface="Courier New" panose="02070309020205020404" pitchFamily="49" charset="0"/>
+              </a:rPr>
+              <a:t>setitem</a:t>
+            </a:r>
+            <a:r>
+              <a:rPr lang="nl-NL" sz="2000" dirty="0">
+                <a:latin typeface="Courier New" panose="02070309020205020404" pitchFamily="49" charset="0"/>
+                <a:cs typeface="Courier New" panose="02070309020205020404" pitchFamily="49" charset="0"/>
+              </a:rPr>
+              <a:t>__</a:t>
+            </a:r>
+            <a:r>
+              <a:rPr lang="nl-NL" sz="2000" dirty="0"/>
+              <a:t> om waardes op te slaan.</a:t>
+            </a:r>
+          </a:p>
+          <a:p>
+            <a:pPr marL="0" indent="0">
+              <a:buNone/>
+            </a:pPr>
+            <a:endParaRPr lang="nl-NL" sz="2000" dirty="0"/>
+          </a:p>
+          <a:p>
+            <a:pPr marL="457200" indent="-457200">
+              <a:buAutoNum type="arabicPeriod" startAt="4"/>
+            </a:pPr>
+            <a:r>
+              <a:rPr lang="nl-NL" sz="2000" dirty="0"/>
+              <a:t>Bonus voor implementeren van methodes:</a:t>
+            </a:r>
+          </a:p>
+          <a:p>
+            <a:pPr marL="0" indent="0">
+              <a:buNone/>
+            </a:pPr>
+            <a:r>
+              <a:rPr lang="nl-NL" sz="2000" dirty="0">
+                <a:latin typeface="Courier New" panose="02070309020205020404" pitchFamily="49" charset="0"/>
+                <a:cs typeface="Courier New" panose="02070309020205020404" pitchFamily="49" charset="0"/>
+              </a:rPr>
+              <a:t>   __</a:t>
+            </a:r>
+            <a:r>
+              <a:rPr lang="nl-NL" sz="2000" dirty="0" err="1">
+                <a:latin typeface="Courier New" panose="02070309020205020404" pitchFamily="49" charset="0"/>
+                <a:cs typeface="Courier New" panose="02070309020205020404" pitchFamily="49" charset="0"/>
+              </a:rPr>
+              <a:t>str</a:t>
+            </a:r>
+            <a:r>
+              <a:rPr lang="nl-NL" sz="2000" dirty="0">
+                <a:latin typeface="Courier New" panose="02070309020205020404" pitchFamily="49" charset="0"/>
+                <a:cs typeface="Courier New" panose="02070309020205020404" pitchFamily="49" charset="0"/>
+              </a:rPr>
+              <a:t>__, __</a:t>
+            </a:r>
+            <a:r>
+              <a:rPr lang="nl-NL" sz="2000" dirty="0" err="1">
+                <a:latin typeface="Courier New" panose="02070309020205020404" pitchFamily="49" charset="0"/>
+                <a:cs typeface="Courier New" panose="02070309020205020404" pitchFamily="49" charset="0"/>
+              </a:rPr>
+              <a:t>repr</a:t>
+            </a:r>
+            <a:r>
+              <a:rPr lang="nl-NL" sz="2000" dirty="0">
+                <a:latin typeface="Courier New" panose="02070309020205020404" pitchFamily="49" charset="0"/>
+                <a:cs typeface="Courier New" panose="02070309020205020404" pitchFamily="49" charset="0"/>
+              </a:rPr>
+              <a:t>__, __</a:t>
+            </a:r>
+            <a:r>
+              <a:rPr lang="nl-NL" sz="2000" dirty="0" err="1">
+                <a:latin typeface="Courier New" panose="02070309020205020404" pitchFamily="49" charset="0"/>
+                <a:cs typeface="Courier New" panose="02070309020205020404" pitchFamily="49" charset="0"/>
+              </a:rPr>
+              <a:t>len</a:t>
+            </a:r>
+            <a:r>
+              <a:rPr lang="nl-NL" sz="2000" dirty="0">
+                <a:latin typeface="Courier New" panose="02070309020205020404" pitchFamily="49" charset="0"/>
+                <a:cs typeface="Courier New" panose="02070309020205020404" pitchFamily="49" charset="0"/>
+              </a:rPr>
+              <a:t>__, </a:t>
+            </a:r>
+            <a:r>
+              <a:rPr lang="nl-NL" sz="2000" dirty="0" err="1">
+                <a:latin typeface="Courier New" panose="02070309020205020404" pitchFamily="49" charset="0"/>
+                <a:cs typeface="Courier New" panose="02070309020205020404" pitchFamily="49" charset="0"/>
+              </a:rPr>
+              <a:t>keys</a:t>
+            </a:r>
+            <a:r>
+              <a:rPr lang="nl-NL" sz="2000" dirty="0">
+                <a:latin typeface="Courier New" panose="02070309020205020404" pitchFamily="49" charset="0"/>
+                <a:cs typeface="Courier New" panose="02070309020205020404" pitchFamily="49" charset="0"/>
+              </a:rPr>
+              <a:t>, </a:t>
+            </a:r>
+            <a:r>
+              <a:rPr lang="nl-NL" sz="2000" dirty="0" err="1">
+                <a:latin typeface="Courier New" panose="02070309020205020404" pitchFamily="49" charset="0"/>
+                <a:cs typeface="Courier New" panose="02070309020205020404" pitchFamily="49" charset="0"/>
+              </a:rPr>
+              <a:t>values</a:t>
+            </a:r>
+            <a:r>
+              <a:rPr lang="nl-NL" sz="2000" dirty="0">
+                <a:latin typeface="Courier New" panose="02070309020205020404" pitchFamily="49" charset="0"/>
+                <a:cs typeface="Courier New" panose="02070309020205020404" pitchFamily="49" charset="0"/>
+              </a:rPr>
+              <a:t>, items</a:t>
             </a:r>
           </a:p>
         </p:txBody>
@@ -36785,7 +37830,7 @@
     </p:spTree>
     <p:extLst>
       <p:ext uri="{BB962C8B-B14F-4D97-AF65-F5344CB8AC3E}">
-        <p14:creationId xmlns:p14="http://schemas.microsoft.com/office/powerpoint/2010/main" val="3078479861"/>
+        <p14:creationId xmlns:p14="http://schemas.microsoft.com/office/powerpoint/2010/main" val="4287688984"/>
       </p:ext>
     </p:extLst>
   </p:cSld>
@@ -37406,6 +38451,265 @@
       </p:sp>
       <p:sp>
         <p:nvSpPr>
+          <p:cNvPr id="39" name="Content Placeholder 2">
+            <a:extLst>
+              <a:ext uri="{FF2B5EF4-FFF2-40B4-BE49-F238E27FC236}">
+                <a16:creationId xmlns:a16="http://schemas.microsoft.com/office/drawing/2014/main" id="{0D9BB673-766C-2B9E-E2A1-0A38CF168E71}"/>
+              </a:ext>
+            </a:extLst>
+          </p:cNvPr>
+          <p:cNvSpPr>
+            <a:spLocks noGrp="1"/>
+          </p:cNvSpPr>
+          <p:nvPr>
+            <p:ph idx="1"/>
+          </p:nvPr>
+        </p:nvSpPr>
+        <p:spPr>
+          <a:xfrm>
+            <a:off x="838200" y="1456267"/>
+            <a:ext cx="4940300" cy="4720696"/>
+          </a:xfrm>
+        </p:spPr>
+        <p:txBody>
+          <a:bodyPr>
+            <a:normAutofit/>
+          </a:bodyPr>
+          <a:lstStyle/>
+          <a:p>
+            <a:pPr marL="0" indent="0">
+              <a:buNone/>
+            </a:pPr>
+            <a:r>
+              <a:rPr lang="nl-NL" sz="1800" noProof="0" dirty="0"/>
+              <a:t>Overerving: eigenschappen overnemen van een andere class.</a:t>
+            </a:r>
+          </a:p>
+          <a:p>
+            <a:pPr marL="0" indent="0">
+              <a:buNone/>
+            </a:pPr>
+            <a:endParaRPr lang="nl-NL" sz="1800" dirty="0"/>
+          </a:p>
+          <a:p>
+            <a:pPr marL="0" indent="0">
+              <a:buNone/>
+            </a:pPr>
+            <a:r>
+              <a:rPr lang="nl-NL" sz="1800" noProof="0" dirty="0" err="1">
+                <a:latin typeface="Courier New" panose="02070309020205020404" pitchFamily="49" charset="0"/>
+                <a:cs typeface="Courier New" panose="02070309020205020404" pitchFamily="49" charset="0"/>
+              </a:rPr>
+              <a:t>TextReader</a:t>
+            </a:r>
+            <a:r>
+              <a:rPr lang="nl-NL" sz="1800" noProof="0" dirty="0"/>
+              <a:t> is een </a:t>
+            </a:r>
+            <a:r>
+              <a:rPr lang="nl-NL" sz="1800" u="sng" noProof="0" dirty="0"/>
+              <a:t>basis class</a:t>
+            </a:r>
+            <a:r>
+              <a:rPr lang="nl-NL" sz="1800" noProof="0" dirty="0"/>
+              <a:t> en bevat methodes om tekstbestanden te verwerken.</a:t>
+            </a:r>
+          </a:p>
+        </p:txBody>
+      </p:sp>
+    </p:spTree>
+    <p:extLst>
+      <p:ext uri="{BB962C8B-B14F-4D97-AF65-F5344CB8AC3E}">
+        <p14:creationId xmlns:p14="http://schemas.microsoft.com/office/powerpoint/2010/main" val="3078479861"/>
+      </p:ext>
+    </p:extLst>
+  </p:cSld>
+  <p:clrMapOvr>
+    <a:masterClrMapping/>
+  </p:clrMapOvr>
+</p:sld>
+</file>
+
+<file path=ppt/slides/slide61.xml><?xml version="1.0" encoding="utf-8"?>
+<p:sld xmlns:a="http://schemas.openxmlformats.org/drawingml/2006/main" xmlns:r="http://schemas.openxmlformats.org/officeDocument/2006/relationships" xmlns:p="http://schemas.openxmlformats.org/presentationml/2006/main">
+  <p:cSld>
+    <p:spTree>
+      <p:nvGrpSpPr>
+        <p:cNvPr id="1" name=""/>
+        <p:cNvGrpSpPr/>
+        <p:nvPr/>
+      </p:nvGrpSpPr>
+      <p:grpSpPr>
+        <a:xfrm>
+          <a:off x="0" y="0"/>
+          <a:ext cx="0" cy="0"/>
+          <a:chOff x="0" y="0"/>
+          <a:chExt cx="0" cy="0"/>
+        </a:xfrm>
+      </p:grpSpPr>
+      <p:sp>
+        <p:nvSpPr>
+          <p:cNvPr id="2" name="Title 1">
+            <a:extLst>
+              <a:ext uri="{FF2B5EF4-FFF2-40B4-BE49-F238E27FC236}">
+                <a16:creationId xmlns:a16="http://schemas.microsoft.com/office/drawing/2014/main" id="{39A1D606-8DD1-369C-5C09-471CDD551AD5}"/>
+              </a:ext>
+            </a:extLst>
+          </p:cNvPr>
+          <p:cNvSpPr>
+            <a:spLocks noGrp="1"/>
+          </p:cNvSpPr>
+          <p:nvPr>
+            <p:ph type="title"/>
+          </p:nvPr>
+        </p:nvSpPr>
+        <p:spPr>
+          <a:xfrm>
+            <a:off x="838200" y="365126"/>
+            <a:ext cx="10515600" cy="718608"/>
+          </a:xfrm>
+        </p:spPr>
+        <p:txBody>
+          <a:bodyPr>
+            <a:normAutofit/>
+          </a:bodyPr>
+          <a:lstStyle/>
+          <a:p>
+            <a:r>
+              <a:rPr lang="nl-NL" sz="3600" noProof="0" dirty="0"/>
+              <a:t>Overerving</a:t>
+            </a:r>
+          </a:p>
+        </p:txBody>
+      </p:sp>
+      <p:sp>
+        <p:nvSpPr>
+          <p:cNvPr id="8" name="Rectangle 7">
+            <a:extLst>
+              <a:ext uri="{FF2B5EF4-FFF2-40B4-BE49-F238E27FC236}">
+                <a16:creationId xmlns:a16="http://schemas.microsoft.com/office/drawing/2014/main" id="{8F8A90BB-468A-6D0A-002C-262602B18B4B}"/>
+              </a:ext>
+            </a:extLst>
+          </p:cNvPr>
+          <p:cNvSpPr/>
+          <p:nvPr/>
+        </p:nvSpPr>
+        <p:spPr>
+          <a:xfrm>
+            <a:off x="8119533" y="724430"/>
+            <a:ext cx="2368547" cy="2189973"/>
+          </a:xfrm>
+          <a:prstGeom prst="rect">
+            <a:avLst/>
+          </a:prstGeom>
+        </p:spPr>
+        <p:style>
+          <a:lnRef idx="1">
+            <a:schemeClr val="accent3"/>
+          </a:lnRef>
+          <a:fillRef idx="2">
+            <a:schemeClr val="accent3"/>
+          </a:fillRef>
+          <a:effectRef idx="1">
+            <a:schemeClr val="accent3"/>
+          </a:effectRef>
+          <a:fontRef idx="minor">
+            <a:schemeClr val="dk1"/>
+          </a:fontRef>
+        </p:style>
+        <p:txBody>
+          <a:bodyPr lIns="180000" tIns="180000" rIns="180000" bIns="180000" rtlCol="0" anchor="t"/>
+          <a:lstStyle/>
+          <a:p>
+            <a:pPr algn="ctr"/>
+            <a:r>
+              <a:rPr lang="nl-NL" sz="1400" b="1" dirty="0" err="1">
+                <a:latin typeface="Courier New" panose="02070309020205020404" pitchFamily="49" charset="0"/>
+                <a:cs typeface="Courier New" panose="02070309020205020404" pitchFamily="49" charset="0"/>
+              </a:rPr>
+              <a:t>TextReader</a:t>
+            </a:r>
+            <a:endParaRPr lang="nl-NL" sz="1400" b="1" dirty="0">
+              <a:latin typeface="Courier New" panose="02070309020205020404" pitchFamily="49" charset="0"/>
+              <a:cs typeface="Courier New" panose="02070309020205020404" pitchFamily="49" charset="0"/>
+            </a:endParaRPr>
+          </a:p>
+          <a:p>
+            <a:endParaRPr lang="nl-NL" sz="1400" dirty="0">
+              <a:latin typeface="Courier New" panose="02070309020205020404" pitchFamily="49" charset="0"/>
+              <a:cs typeface="Courier New" panose="02070309020205020404" pitchFamily="49" charset="0"/>
+            </a:endParaRPr>
+          </a:p>
+          <a:p>
+            <a:r>
+              <a:rPr lang="nl-NL" sz="1400" dirty="0">
+                <a:latin typeface="Courier New" panose="02070309020205020404" pitchFamily="49" charset="0"/>
+                <a:cs typeface="Courier New" panose="02070309020205020404" pitchFamily="49" charset="0"/>
+              </a:rPr>
+              <a:t>- </a:t>
+            </a:r>
+            <a:r>
+              <a:rPr lang="nl-NL" sz="1400" dirty="0" err="1">
+                <a:latin typeface="Courier New" panose="02070309020205020404" pitchFamily="49" charset="0"/>
+                <a:cs typeface="Courier New" panose="02070309020205020404" pitchFamily="49" charset="0"/>
+              </a:rPr>
+              <a:t>file_path</a:t>
+            </a:r>
+            <a:endParaRPr lang="nl-NL" sz="1400" dirty="0">
+              <a:latin typeface="Courier New" panose="02070309020205020404" pitchFamily="49" charset="0"/>
+              <a:cs typeface="Courier New" panose="02070309020205020404" pitchFamily="49" charset="0"/>
+            </a:endParaRPr>
+          </a:p>
+          <a:p>
+            <a:r>
+              <a:rPr lang="nl-NL" sz="1400" dirty="0">
+                <a:latin typeface="Courier New" panose="02070309020205020404" pitchFamily="49" charset="0"/>
+                <a:cs typeface="Courier New" panose="02070309020205020404" pitchFamily="49" charset="0"/>
+              </a:rPr>
+              <a:t>- </a:t>
+            </a:r>
+            <a:r>
+              <a:rPr lang="nl-NL" sz="1400" dirty="0" err="1">
+                <a:latin typeface="Courier New" panose="02070309020205020404" pitchFamily="49" charset="0"/>
+                <a:cs typeface="Courier New" panose="02070309020205020404" pitchFamily="49" charset="0"/>
+              </a:rPr>
+              <a:t>read</a:t>
+            </a:r>
+            <a:r>
+              <a:rPr lang="nl-NL" sz="1400" dirty="0">
+                <a:latin typeface="Courier New" panose="02070309020205020404" pitchFamily="49" charset="0"/>
+                <a:cs typeface="Courier New" panose="02070309020205020404" pitchFamily="49" charset="0"/>
+              </a:rPr>
+              <a:t>()</a:t>
+            </a:r>
+          </a:p>
+          <a:p>
+            <a:r>
+              <a:rPr lang="nl-NL" sz="1400" dirty="0">
+                <a:latin typeface="Courier New" panose="02070309020205020404" pitchFamily="49" charset="0"/>
+                <a:cs typeface="Courier New" panose="02070309020205020404" pitchFamily="49" charset="0"/>
+              </a:rPr>
+              <a:t>- </a:t>
+            </a:r>
+            <a:r>
+              <a:rPr lang="nl-NL" sz="1400" dirty="0" err="1">
+                <a:latin typeface="Courier New" panose="02070309020205020404" pitchFamily="49" charset="0"/>
+                <a:cs typeface="Courier New" panose="02070309020205020404" pitchFamily="49" charset="0"/>
+              </a:rPr>
+              <a:t>write</a:t>
+            </a:r>
+            <a:r>
+              <a:rPr lang="nl-NL" sz="1400" dirty="0">
+                <a:latin typeface="Courier New" panose="02070309020205020404" pitchFamily="49" charset="0"/>
+                <a:cs typeface="Courier New" panose="02070309020205020404" pitchFamily="49" charset="0"/>
+              </a:rPr>
+              <a:t>()</a:t>
+            </a:r>
+          </a:p>
+        </p:txBody>
+      </p:sp>
+      <p:sp>
+        <p:nvSpPr>
           <p:cNvPr id="9" name="Rectangle 8">
             <a:extLst>
               <a:ext uri="{FF2B5EF4-FFF2-40B4-BE49-F238E27FC236}">
@@ -37729,7 +39033,7 @@
 </p:sld>
 </file>
 
-<file path=ppt/slides/slide61.xml><?xml version="1.0" encoding="utf-8"?>
+<file path=ppt/slides/slide62.xml><?xml version="1.0" encoding="utf-8"?>
 <p:sld xmlns:a="http://schemas.openxmlformats.org/drawingml/2006/main" xmlns:r="http://schemas.openxmlformats.org/officeDocument/2006/relationships" xmlns:p="http://schemas.openxmlformats.org/presentationml/2006/main">
   <p:cSld>
     <p:spTree>
@@ -38334,7 +39638,7 @@
 </p:sld>
 </file>
 
-<file path=ppt/slides/slide62.xml><?xml version="1.0" encoding="utf-8"?>
+<file path=ppt/slides/slide63.xml><?xml version="1.0" encoding="utf-8"?>
 <p:sld xmlns:a="http://schemas.openxmlformats.org/drawingml/2006/main" xmlns:r="http://schemas.openxmlformats.org/officeDocument/2006/relationships" xmlns:p="http://schemas.openxmlformats.org/presentationml/2006/main">
   <p:cSld>
     <p:spTree>
@@ -38983,7 +40287,7 @@
 </p:sld>
 </file>
 
-<file path=ppt/slides/slide63.xml><?xml version="1.0" encoding="utf-8"?>
+<file path=ppt/slides/slide64.xml><?xml version="1.0" encoding="utf-8"?>
 <p:sld xmlns:a="http://schemas.openxmlformats.org/drawingml/2006/main" xmlns:r="http://schemas.openxmlformats.org/officeDocument/2006/relationships" xmlns:p="http://schemas.openxmlformats.org/presentationml/2006/main">
   <p:cSld>
     <p:spTree>
@@ -40388,7 +41692,7 @@
 </p:sld>
 </file>
 
-<file path=ppt/slides/slide64.xml><?xml version="1.0" encoding="utf-8"?>
+<file path=ppt/slides/slide65.xml><?xml version="1.0" encoding="utf-8"?>
 <p:sld xmlns:a="http://schemas.openxmlformats.org/drawingml/2006/main" xmlns:r="http://schemas.openxmlformats.org/officeDocument/2006/relationships" xmlns:p="http://schemas.openxmlformats.org/presentationml/2006/main">
   <p:cSld>
     <p:spTree>
@@ -41625,7 +42929,7 @@
 </p:sld>
 </file>
 
-<file path=ppt/slides/slide65.xml><?xml version="1.0" encoding="utf-8"?>
+<file path=ppt/slides/slide66.xml><?xml version="1.0" encoding="utf-8"?>
 <p:sld xmlns:a="http://schemas.openxmlformats.org/drawingml/2006/main" xmlns:r="http://schemas.openxmlformats.org/officeDocument/2006/relationships" xmlns:p="http://schemas.openxmlformats.org/presentationml/2006/main">
   <p:cSld>
     <p:spTree>
@@ -41853,7 +43157,7 @@
 </p:sld>
 </file>
 
-<file path=ppt/slides/slide66.xml><?xml version="1.0" encoding="utf-8"?>
+<file path=ppt/slides/slide67.xml><?xml version="1.0" encoding="utf-8"?>
 <p:sld xmlns:a="http://schemas.openxmlformats.org/drawingml/2006/main" xmlns:r="http://schemas.openxmlformats.org/officeDocument/2006/relationships" xmlns:p="http://schemas.openxmlformats.org/presentationml/2006/main" show="0">
   <p:cSld>
     <p:spTree>
@@ -43440,7 +44744,7 @@
 </p:sld>
 </file>
 
-<file path=ppt/slides/slide67.xml><?xml version="1.0" encoding="utf-8"?>
+<file path=ppt/slides/slide68.xml><?xml version="1.0" encoding="utf-8"?>
 <p:sld xmlns:a="http://schemas.openxmlformats.org/drawingml/2006/main" xmlns:r="http://schemas.openxmlformats.org/officeDocument/2006/relationships" xmlns:p="http://schemas.openxmlformats.org/presentationml/2006/main" show="0">
   <p:cSld>
     <p:spTree>

</xml_diff>